<commit_message>
Docs for DNS creation
</commit_message>
<xml_diff>
--- a/ICT-171 Documentation.pptx
+++ b/ICT-171 Documentation.pptx
@@ -6,12 +6,13 @@
   </p:sldMasterIdLst>
   <p:sldIdLst>
     <p:sldId id="257" r:id="rId2"/>
-    <p:sldId id="258" r:id="rId3"/>
-    <p:sldId id="259" r:id="rId4"/>
-    <p:sldId id="260" r:id="rId5"/>
-    <p:sldId id="261" r:id="rId6"/>
-    <p:sldId id="262" r:id="rId7"/>
-    <p:sldId id="263" r:id="rId8"/>
+    <p:sldId id="264" r:id="rId3"/>
+    <p:sldId id="258" r:id="rId4"/>
+    <p:sldId id="259" r:id="rId5"/>
+    <p:sldId id="260" r:id="rId6"/>
+    <p:sldId id="261" r:id="rId7"/>
+    <p:sldId id="262" r:id="rId8"/>
+    <p:sldId id="263" r:id="rId9"/>
   </p:sldIdLst>
   <p:sldSz cx="6858000" cy="9906000" type="A4"/>
   <p:notesSz cx="6858000" cy="9144000"/>
@@ -3945,6 +3946,702 @@
         <p:spPr>
           <a:xfrm>
             <a:off x="132399" y="184239"/>
+            <a:ext cx="6593205" cy="8433078"/>
+          </a:xfrm>
+          <a:prstGeom prst="rect">
+            <a:avLst/>
+          </a:prstGeom>
+          <a:noFill/>
+        </p:spPr>
+        <p:txBody>
+          <a:bodyPr wrap="square" rtlCol="0">
+            <a:spAutoFit/>
+          </a:bodyPr>
+          <a:lstStyle/>
+          <a:p>
+            <a:pPr marL="342900" indent="-342900">
+              <a:buFont typeface="+mj-lt"/>
+              <a:buAutoNum type="arabicParenR" startAt="4"/>
+            </a:pPr>
+            <a:r>
+              <a:rPr lang="en-US" sz="1400" dirty="0">
+                <a:solidFill>
+                  <a:schemeClr val="accent1"/>
+                </a:solidFill>
+                <a:latin typeface="Noto Sans" panose="020B0502040504020204" pitchFamily="34" charset="0"/>
+                <a:ea typeface="Noto Sans" panose="020B0502040504020204" pitchFamily="34" charset="0"/>
+                <a:cs typeface="Noto Sans" panose="020B0502040504020204" pitchFamily="34" charset="0"/>
+              </a:rPr>
+              <a:t>Creating the domain</a:t>
+            </a:r>
+          </a:p>
+          <a:p>
+            <a:pPr marL="342900" indent="-342900">
+              <a:buFont typeface="+mj-lt"/>
+              <a:buAutoNum type="arabicParenR" startAt="4"/>
+            </a:pPr>
+            <a:endParaRPr lang="en-US" sz="1200" dirty="0">
+              <a:latin typeface="Noto Sans" panose="020B0502040504020204" pitchFamily="34" charset="0"/>
+              <a:ea typeface="Noto Sans" panose="020B0502040504020204" pitchFamily="34" charset="0"/>
+              <a:cs typeface="Noto Sans" panose="020B0502040504020204" pitchFamily="34" charset="0"/>
+            </a:endParaRPr>
+          </a:p>
+          <a:p>
+            <a:pPr marL="800100" lvl="1" indent="-342900" algn="just">
+              <a:buFont typeface="Arial" panose="020B0604020202020204" pitchFamily="34" charset="0"/>
+              <a:buChar char="•"/>
+            </a:pPr>
+            <a:r>
+              <a:rPr lang="en-US" sz="1200" dirty="0">
+                <a:latin typeface="Noto Sans" panose="020B0502040504020204" pitchFamily="34" charset="0"/>
+                <a:ea typeface="Noto Sans" panose="020B0502040504020204" pitchFamily="34" charset="0"/>
+                <a:cs typeface="Noto Sans" panose="020B0502040504020204" pitchFamily="34" charset="0"/>
+              </a:rPr>
+              <a:t>I have decided to use name.com for this project, but the procedure should be similar across all DNS providers</a:t>
+            </a:r>
+          </a:p>
+          <a:p>
+            <a:pPr marL="800100" lvl="1" indent="-342900" algn="just">
+              <a:buFont typeface="Arial" panose="020B0604020202020204" pitchFamily="34" charset="0"/>
+              <a:buChar char="•"/>
+            </a:pPr>
+            <a:r>
+              <a:rPr lang="en-US" sz="1200" dirty="0">
+                <a:latin typeface="Noto Sans" panose="020B0502040504020204" pitchFamily="34" charset="0"/>
+                <a:ea typeface="Noto Sans" panose="020B0502040504020204" pitchFamily="34" charset="0"/>
+                <a:cs typeface="Noto Sans" panose="020B0502040504020204" pitchFamily="34" charset="0"/>
+              </a:rPr>
+              <a:t>Go to name.com, search for the desired domain, and purchase it </a:t>
+            </a:r>
+          </a:p>
+          <a:p>
+            <a:pPr marL="800100" lvl="1" indent="-342900" algn="just">
+              <a:buFont typeface="Arial" panose="020B0604020202020204" pitchFamily="34" charset="0"/>
+              <a:buChar char="•"/>
+            </a:pPr>
+            <a:endParaRPr lang="en-US" sz="1200" dirty="0">
+              <a:latin typeface="Noto Sans" panose="020B0502040504020204" pitchFamily="34" charset="0"/>
+              <a:ea typeface="Noto Sans" panose="020B0502040504020204" pitchFamily="34" charset="0"/>
+              <a:cs typeface="Noto Sans" panose="020B0502040504020204" pitchFamily="34" charset="0"/>
+            </a:endParaRPr>
+          </a:p>
+          <a:p>
+            <a:pPr marL="800100" lvl="1" indent="-342900" algn="just">
+              <a:buFont typeface="Arial" panose="020B0604020202020204" pitchFamily="34" charset="0"/>
+              <a:buChar char="•"/>
+            </a:pPr>
+            <a:endParaRPr lang="en-US" sz="1200" dirty="0">
+              <a:latin typeface="Noto Sans" panose="020B0502040504020204" pitchFamily="34" charset="0"/>
+              <a:ea typeface="Noto Sans" panose="020B0502040504020204" pitchFamily="34" charset="0"/>
+              <a:cs typeface="Noto Sans" panose="020B0502040504020204" pitchFamily="34" charset="0"/>
+            </a:endParaRPr>
+          </a:p>
+          <a:p>
+            <a:pPr marL="800100" lvl="1" indent="-342900" algn="just">
+              <a:buFont typeface="Arial" panose="020B0604020202020204" pitchFamily="34" charset="0"/>
+              <a:buChar char="•"/>
+            </a:pPr>
+            <a:endParaRPr lang="en-US" sz="1200" dirty="0">
+              <a:latin typeface="Noto Sans" panose="020B0502040504020204" pitchFamily="34" charset="0"/>
+              <a:ea typeface="Noto Sans" panose="020B0502040504020204" pitchFamily="34" charset="0"/>
+              <a:cs typeface="Noto Sans" panose="020B0502040504020204" pitchFamily="34" charset="0"/>
+            </a:endParaRPr>
+          </a:p>
+          <a:p>
+            <a:pPr marL="800100" lvl="1" indent="-342900" algn="just">
+              <a:buFont typeface="Arial" panose="020B0604020202020204" pitchFamily="34" charset="0"/>
+              <a:buChar char="•"/>
+            </a:pPr>
+            <a:endParaRPr lang="en-US" sz="1200" dirty="0">
+              <a:latin typeface="Noto Sans" panose="020B0502040504020204" pitchFamily="34" charset="0"/>
+              <a:ea typeface="Noto Sans" panose="020B0502040504020204" pitchFamily="34" charset="0"/>
+              <a:cs typeface="Noto Sans" panose="020B0502040504020204" pitchFamily="34" charset="0"/>
+            </a:endParaRPr>
+          </a:p>
+          <a:p>
+            <a:pPr marL="800100" lvl="1" indent="-342900" algn="just">
+              <a:buFont typeface="Arial" panose="020B0604020202020204" pitchFamily="34" charset="0"/>
+              <a:buChar char="•"/>
+            </a:pPr>
+            <a:endParaRPr lang="en-US" sz="1200" dirty="0">
+              <a:latin typeface="Noto Sans" panose="020B0502040504020204" pitchFamily="34" charset="0"/>
+              <a:ea typeface="Noto Sans" panose="020B0502040504020204" pitchFamily="34" charset="0"/>
+              <a:cs typeface="Noto Sans" panose="020B0502040504020204" pitchFamily="34" charset="0"/>
+            </a:endParaRPr>
+          </a:p>
+          <a:p>
+            <a:pPr marL="800100" lvl="1" indent="-342900" algn="just">
+              <a:buFont typeface="Arial" panose="020B0604020202020204" pitchFamily="34" charset="0"/>
+              <a:buChar char="•"/>
+            </a:pPr>
+            <a:endParaRPr lang="en-US" sz="1200" dirty="0">
+              <a:latin typeface="Noto Sans" panose="020B0502040504020204" pitchFamily="34" charset="0"/>
+              <a:ea typeface="Noto Sans" panose="020B0502040504020204" pitchFamily="34" charset="0"/>
+              <a:cs typeface="Noto Sans" panose="020B0502040504020204" pitchFamily="34" charset="0"/>
+            </a:endParaRPr>
+          </a:p>
+          <a:p>
+            <a:pPr marL="800100" lvl="1" indent="-342900" algn="just">
+              <a:buFont typeface="Arial" panose="020B0604020202020204" pitchFamily="34" charset="0"/>
+              <a:buChar char="•"/>
+            </a:pPr>
+            <a:endParaRPr lang="en-US" sz="1200" dirty="0">
+              <a:latin typeface="Noto Sans" panose="020B0502040504020204" pitchFamily="34" charset="0"/>
+              <a:ea typeface="Noto Sans" panose="020B0502040504020204" pitchFamily="34" charset="0"/>
+              <a:cs typeface="Noto Sans" panose="020B0502040504020204" pitchFamily="34" charset="0"/>
+            </a:endParaRPr>
+          </a:p>
+          <a:p>
+            <a:pPr marL="800100" lvl="1" indent="-342900" algn="just">
+              <a:buFont typeface="Arial" panose="020B0604020202020204" pitchFamily="34" charset="0"/>
+              <a:buChar char="•"/>
+            </a:pPr>
+            <a:endParaRPr lang="en-US" sz="1200" dirty="0">
+              <a:latin typeface="Noto Sans" panose="020B0502040504020204" pitchFamily="34" charset="0"/>
+              <a:ea typeface="Noto Sans" panose="020B0502040504020204" pitchFamily="34" charset="0"/>
+              <a:cs typeface="Noto Sans" panose="020B0502040504020204" pitchFamily="34" charset="0"/>
+            </a:endParaRPr>
+          </a:p>
+          <a:p>
+            <a:pPr marL="800100" lvl="1" indent="-342900" algn="just">
+              <a:buFont typeface="Arial" panose="020B0604020202020204" pitchFamily="34" charset="0"/>
+              <a:buChar char="•"/>
+            </a:pPr>
+            <a:endParaRPr lang="en-US" sz="1200" dirty="0">
+              <a:latin typeface="Noto Sans" panose="020B0502040504020204" pitchFamily="34" charset="0"/>
+              <a:ea typeface="Noto Sans" panose="020B0502040504020204" pitchFamily="34" charset="0"/>
+              <a:cs typeface="Noto Sans" panose="020B0502040504020204" pitchFamily="34" charset="0"/>
+            </a:endParaRPr>
+          </a:p>
+          <a:p>
+            <a:pPr marL="800100" lvl="1" indent="-342900" algn="just">
+              <a:buFont typeface="Arial" panose="020B0604020202020204" pitchFamily="34" charset="0"/>
+              <a:buChar char="•"/>
+            </a:pPr>
+            <a:endParaRPr lang="en-US" sz="1200" dirty="0">
+              <a:latin typeface="Noto Sans" panose="020B0502040504020204" pitchFamily="34" charset="0"/>
+              <a:ea typeface="Noto Sans" panose="020B0502040504020204" pitchFamily="34" charset="0"/>
+              <a:cs typeface="Noto Sans" panose="020B0502040504020204" pitchFamily="34" charset="0"/>
+            </a:endParaRPr>
+          </a:p>
+          <a:p>
+            <a:pPr marL="800100" lvl="1" indent="-342900" algn="just">
+              <a:buFont typeface="Arial" panose="020B0604020202020204" pitchFamily="34" charset="0"/>
+              <a:buChar char="•"/>
+            </a:pPr>
+            <a:endParaRPr lang="en-US" sz="1200" dirty="0">
+              <a:latin typeface="Noto Sans" panose="020B0502040504020204" pitchFamily="34" charset="0"/>
+              <a:ea typeface="Noto Sans" panose="020B0502040504020204" pitchFamily="34" charset="0"/>
+              <a:cs typeface="Noto Sans" panose="020B0502040504020204" pitchFamily="34" charset="0"/>
+            </a:endParaRPr>
+          </a:p>
+          <a:p>
+            <a:pPr marL="800100" lvl="1" indent="-342900" algn="just">
+              <a:buFont typeface="Arial" panose="020B0604020202020204" pitchFamily="34" charset="0"/>
+              <a:buChar char="•"/>
+            </a:pPr>
+            <a:endParaRPr lang="en-US" sz="1200" dirty="0">
+              <a:latin typeface="Noto Sans" panose="020B0502040504020204" pitchFamily="34" charset="0"/>
+              <a:ea typeface="Noto Sans" panose="020B0502040504020204" pitchFamily="34" charset="0"/>
+              <a:cs typeface="Noto Sans" panose="020B0502040504020204" pitchFamily="34" charset="0"/>
+            </a:endParaRPr>
+          </a:p>
+          <a:p>
+            <a:pPr marL="800100" lvl="1" indent="-342900" algn="just">
+              <a:buFont typeface="Arial" panose="020B0604020202020204" pitchFamily="34" charset="0"/>
+              <a:buChar char="•"/>
+            </a:pPr>
+            <a:endParaRPr lang="en-US" sz="1200" dirty="0">
+              <a:latin typeface="Noto Sans" panose="020B0502040504020204" pitchFamily="34" charset="0"/>
+              <a:ea typeface="Noto Sans" panose="020B0502040504020204" pitchFamily="34" charset="0"/>
+              <a:cs typeface="Noto Sans" panose="020B0502040504020204" pitchFamily="34" charset="0"/>
+            </a:endParaRPr>
+          </a:p>
+          <a:p>
+            <a:pPr marL="800100" lvl="1" indent="-342900" algn="just">
+              <a:buFont typeface="Arial" panose="020B0604020202020204" pitchFamily="34" charset="0"/>
+              <a:buChar char="•"/>
+            </a:pPr>
+            <a:endParaRPr lang="en-US" sz="1200" dirty="0">
+              <a:latin typeface="Noto Sans" panose="020B0502040504020204" pitchFamily="34" charset="0"/>
+              <a:ea typeface="Noto Sans" panose="020B0502040504020204" pitchFamily="34" charset="0"/>
+              <a:cs typeface="Noto Sans" panose="020B0502040504020204" pitchFamily="34" charset="0"/>
+            </a:endParaRPr>
+          </a:p>
+          <a:p>
+            <a:pPr marL="800100" lvl="1" indent="-342900" algn="just">
+              <a:buFont typeface="Arial" panose="020B0604020202020204" pitchFamily="34" charset="0"/>
+              <a:buChar char="•"/>
+            </a:pPr>
+            <a:endParaRPr lang="en-US" sz="1200" dirty="0">
+              <a:latin typeface="Noto Sans" panose="020B0502040504020204" pitchFamily="34" charset="0"/>
+              <a:ea typeface="Noto Sans" panose="020B0502040504020204" pitchFamily="34" charset="0"/>
+              <a:cs typeface="Noto Sans" panose="020B0502040504020204" pitchFamily="34" charset="0"/>
+            </a:endParaRPr>
+          </a:p>
+          <a:p>
+            <a:pPr marL="800100" lvl="1" indent="-342900" algn="just">
+              <a:buFont typeface="Arial" panose="020B0604020202020204" pitchFamily="34" charset="0"/>
+              <a:buChar char="•"/>
+            </a:pPr>
+            <a:endParaRPr lang="en-US" sz="1200" dirty="0">
+              <a:latin typeface="Noto Sans" panose="020B0502040504020204" pitchFamily="34" charset="0"/>
+              <a:ea typeface="Noto Sans" panose="020B0502040504020204" pitchFamily="34" charset="0"/>
+              <a:cs typeface="Noto Sans" panose="020B0502040504020204" pitchFamily="34" charset="0"/>
+            </a:endParaRPr>
+          </a:p>
+          <a:p>
+            <a:pPr marL="800100" lvl="1" indent="-342900" algn="just">
+              <a:buFont typeface="Arial" panose="020B0604020202020204" pitchFamily="34" charset="0"/>
+              <a:buChar char="•"/>
+            </a:pPr>
+            <a:endParaRPr lang="en-US" sz="1200" dirty="0">
+              <a:latin typeface="Noto Sans" panose="020B0502040504020204" pitchFamily="34" charset="0"/>
+              <a:ea typeface="Noto Sans" panose="020B0502040504020204" pitchFamily="34" charset="0"/>
+              <a:cs typeface="Noto Sans" panose="020B0502040504020204" pitchFamily="34" charset="0"/>
+            </a:endParaRPr>
+          </a:p>
+          <a:p>
+            <a:pPr marL="800100" lvl="1" indent="-342900" algn="just">
+              <a:buFont typeface="Arial" panose="020B0604020202020204" pitchFamily="34" charset="0"/>
+              <a:buChar char="•"/>
+            </a:pPr>
+            <a:endParaRPr lang="en-US" sz="1200" dirty="0">
+              <a:latin typeface="Noto Sans" panose="020B0502040504020204" pitchFamily="34" charset="0"/>
+              <a:ea typeface="Noto Sans" panose="020B0502040504020204" pitchFamily="34" charset="0"/>
+              <a:cs typeface="Noto Sans" panose="020B0502040504020204" pitchFamily="34" charset="0"/>
+            </a:endParaRPr>
+          </a:p>
+          <a:p>
+            <a:pPr marL="800100" lvl="1" indent="-342900" algn="just">
+              <a:buFont typeface="Arial" panose="020B0604020202020204" pitchFamily="34" charset="0"/>
+              <a:buChar char="•"/>
+            </a:pPr>
+            <a:endParaRPr lang="en-US" sz="1200" dirty="0">
+              <a:latin typeface="Noto Sans" panose="020B0502040504020204" pitchFamily="34" charset="0"/>
+              <a:ea typeface="Noto Sans" panose="020B0502040504020204" pitchFamily="34" charset="0"/>
+              <a:cs typeface="Noto Sans" panose="020B0502040504020204" pitchFamily="34" charset="0"/>
+            </a:endParaRPr>
+          </a:p>
+          <a:p>
+            <a:pPr marL="800100" lvl="1" indent="-342900" algn="just">
+              <a:buFont typeface="Arial" panose="020B0604020202020204" pitchFamily="34" charset="0"/>
+              <a:buChar char="•"/>
+            </a:pPr>
+            <a:r>
+              <a:rPr lang="en-US" sz="1200" dirty="0">
+                <a:latin typeface="Noto Sans" panose="020B0502040504020204" pitchFamily="34" charset="0"/>
+                <a:ea typeface="Noto Sans" panose="020B0502040504020204" pitchFamily="34" charset="0"/>
+                <a:cs typeface="Noto Sans" panose="020B0502040504020204" pitchFamily="34" charset="0"/>
+              </a:rPr>
+              <a:t>After purchasing the domain, go to </a:t>
+            </a:r>
+            <a:r>
+              <a:rPr lang="en-US" sz="1200" dirty="0">
+                <a:latin typeface="Noto Sans" panose="020B0502040504020204" pitchFamily="34" charset="0"/>
+                <a:ea typeface="Noto Sans" panose="020B0502040504020204" pitchFamily="34" charset="0"/>
+                <a:cs typeface="Noto Sans" panose="020B0502040504020204" pitchFamily="34" charset="0"/>
+                <a:hlinkClick r:id="rId2"/>
+              </a:rPr>
+              <a:t>My Domains</a:t>
+            </a:r>
+            <a:endParaRPr lang="en-US" sz="1200" dirty="0">
+              <a:latin typeface="Noto Sans" panose="020B0502040504020204" pitchFamily="34" charset="0"/>
+              <a:ea typeface="Noto Sans" panose="020B0502040504020204" pitchFamily="34" charset="0"/>
+              <a:cs typeface="Noto Sans" panose="020B0502040504020204" pitchFamily="34" charset="0"/>
+            </a:endParaRPr>
+          </a:p>
+          <a:p>
+            <a:pPr marL="800100" lvl="1" indent="-342900" algn="just">
+              <a:buFont typeface="Arial" panose="020B0604020202020204" pitchFamily="34" charset="0"/>
+              <a:buChar char="•"/>
+            </a:pPr>
+            <a:endParaRPr lang="en-US" sz="1200" dirty="0">
+              <a:latin typeface="Noto Sans" panose="020B0502040504020204" pitchFamily="34" charset="0"/>
+              <a:ea typeface="Noto Sans" panose="020B0502040504020204" pitchFamily="34" charset="0"/>
+              <a:cs typeface="Noto Sans" panose="020B0502040504020204" pitchFamily="34" charset="0"/>
+            </a:endParaRPr>
+          </a:p>
+          <a:p>
+            <a:pPr marL="800100" lvl="1" indent="-342900" algn="just">
+              <a:buFont typeface="Arial" panose="020B0604020202020204" pitchFamily="34" charset="0"/>
+              <a:buChar char="•"/>
+            </a:pPr>
+            <a:endParaRPr lang="en-US" sz="1200" dirty="0">
+              <a:latin typeface="Noto Sans" panose="020B0502040504020204" pitchFamily="34" charset="0"/>
+              <a:ea typeface="Noto Sans" panose="020B0502040504020204" pitchFamily="34" charset="0"/>
+              <a:cs typeface="Noto Sans" panose="020B0502040504020204" pitchFamily="34" charset="0"/>
+            </a:endParaRPr>
+          </a:p>
+          <a:p>
+            <a:pPr marL="800100" lvl="1" indent="-342900" algn="just">
+              <a:buFont typeface="Arial" panose="020B0604020202020204" pitchFamily="34" charset="0"/>
+              <a:buChar char="•"/>
+            </a:pPr>
+            <a:endParaRPr lang="en-US" sz="1200" dirty="0">
+              <a:latin typeface="Noto Sans" panose="020B0502040504020204" pitchFamily="34" charset="0"/>
+              <a:ea typeface="Noto Sans" panose="020B0502040504020204" pitchFamily="34" charset="0"/>
+              <a:cs typeface="Noto Sans" panose="020B0502040504020204" pitchFamily="34" charset="0"/>
+            </a:endParaRPr>
+          </a:p>
+          <a:p>
+            <a:pPr marL="800100" lvl="1" indent="-342900" algn="just">
+              <a:buFont typeface="Arial" panose="020B0604020202020204" pitchFamily="34" charset="0"/>
+              <a:buChar char="•"/>
+            </a:pPr>
+            <a:endParaRPr lang="en-US" sz="1200" dirty="0">
+              <a:latin typeface="Noto Sans" panose="020B0502040504020204" pitchFamily="34" charset="0"/>
+              <a:ea typeface="Noto Sans" panose="020B0502040504020204" pitchFamily="34" charset="0"/>
+              <a:cs typeface="Noto Sans" panose="020B0502040504020204" pitchFamily="34" charset="0"/>
+            </a:endParaRPr>
+          </a:p>
+          <a:p>
+            <a:pPr marL="800100" lvl="1" indent="-342900" algn="just">
+              <a:buFont typeface="Arial" panose="020B0604020202020204" pitchFamily="34" charset="0"/>
+              <a:buChar char="•"/>
+            </a:pPr>
+            <a:endParaRPr lang="en-US" sz="1200" dirty="0">
+              <a:latin typeface="Noto Sans" panose="020B0502040504020204" pitchFamily="34" charset="0"/>
+              <a:ea typeface="Noto Sans" panose="020B0502040504020204" pitchFamily="34" charset="0"/>
+              <a:cs typeface="Noto Sans" panose="020B0502040504020204" pitchFamily="34" charset="0"/>
+            </a:endParaRPr>
+          </a:p>
+          <a:p>
+            <a:pPr marL="800100" lvl="1" indent="-342900" algn="just">
+              <a:buFont typeface="Arial" panose="020B0604020202020204" pitchFamily="34" charset="0"/>
+              <a:buChar char="•"/>
+            </a:pPr>
+            <a:r>
+              <a:rPr lang="en-US" sz="1200" dirty="0">
+                <a:latin typeface="Noto Sans" panose="020B0502040504020204" pitchFamily="34" charset="0"/>
+                <a:ea typeface="Noto Sans" panose="020B0502040504020204" pitchFamily="34" charset="0"/>
+                <a:cs typeface="Noto Sans" panose="020B0502040504020204" pitchFamily="34" charset="0"/>
+              </a:rPr>
+              <a:t>Go to your domain settings &gt; Manage DNS records</a:t>
+            </a:r>
+          </a:p>
+          <a:p>
+            <a:pPr marL="800100" lvl="1" indent="-342900" algn="just">
+              <a:buFont typeface="Arial" panose="020B0604020202020204" pitchFamily="34" charset="0"/>
+              <a:buChar char="•"/>
+            </a:pPr>
+            <a:endParaRPr lang="en-US" sz="1200" dirty="0">
+              <a:latin typeface="Noto Sans" panose="020B0502040504020204" pitchFamily="34" charset="0"/>
+              <a:ea typeface="Noto Sans" panose="020B0502040504020204" pitchFamily="34" charset="0"/>
+              <a:cs typeface="Noto Sans" panose="020B0502040504020204" pitchFamily="34" charset="0"/>
+            </a:endParaRPr>
+          </a:p>
+          <a:p>
+            <a:pPr marL="800100" lvl="1" indent="-342900" algn="just">
+              <a:buFont typeface="Arial" panose="020B0604020202020204" pitchFamily="34" charset="0"/>
+              <a:buChar char="•"/>
+            </a:pPr>
+            <a:r>
+              <a:rPr lang="en-US" sz="1200" dirty="0">
+                <a:latin typeface="Noto Sans" panose="020B0502040504020204" pitchFamily="34" charset="0"/>
+                <a:ea typeface="Noto Sans" panose="020B0502040504020204" pitchFamily="34" charset="0"/>
+                <a:cs typeface="Noto Sans" panose="020B0502040504020204" pitchFamily="34" charset="0"/>
+              </a:rPr>
+              <a:t>Add a type A record, leaving the host field blank, and enter your IP in the answer field </a:t>
+            </a:r>
+          </a:p>
+          <a:p>
+            <a:pPr marL="800100" lvl="1" indent="-342900" algn="just">
+              <a:buFont typeface="Arial" panose="020B0604020202020204" pitchFamily="34" charset="0"/>
+              <a:buChar char="•"/>
+            </a:pPr>
+            <a:endParaRPr lang="en-US" sz="1200" dirty="0">
+              <a:latin typeface="Noto Sans" panose="020B0502040504020204" pitchFamily="34" charset="0"/>
+              <a:ea typeface="Noto Sans" panose="020B0502040504020204" pitchFamily="34" charset="0"/>
+              <a:cs typeface="Noto Sans" panose="020B0502040504020204" pitchFamily="34" charset="0"/>
+            </a:endParaRPr>
+          </a:p>
+          <a:p>
+            <a:pPr marL="800100" lvl="1" indent="-342900" algn="just">
+              <a:buFont typeface="Arial" panose="020B0604020202020204" pitchFamily="34" charset="0"/>
+              <a:buChar char="•"/>
+            </a:pPr>
+            <a:endParaRPr lang="en-US" sz="1200" dirty="0">
+              <a:latin typeface="Noto Sans" panose="020B0502040504020204" pitchFamily="34" charset="0"/>
+              <a:ea typeface="Noto Sans" panose="020B0502040504020204" pitchFamily="34" charset="0"/>
+              <a:cs typeface="Noto Sans" panose="020B0502040504020204" pitchFamily="34" charset="0"/>
+            </a:endParaRPr>
+          </a:p>
+          <a:p>
+            <a:pPr marL="800100" lvl="1" indent="-342900" algn="just">
+              <a:buFont typeface="Arial" panose="020B0604020202020204" pitchFamily="34" charset="0"/>
+              <a:buChar char="•"/>
+            </a:pPr>
+            <a:endParaRPr lang="en-US" sz="1200" dirty="0">
+              <a:latin typeface="Noto Sans" panose="020B0502040504020204" pitchFamily="34" charset="0"/>
+              <a:ea typeface="Noto Sans" panose="020B0502040504020204" pitchFamily="34" charset="0"/>
+              <a:cs typeface="Noto Sans" panose="020B0502040504020204" pitchFamily="34" charset="0"/>
+            </a:endParaRPr>
+          </a:p>
+          <a:p>
+            <a:pPr marL="800100" lvl="1" indent="-342900" algn="just">
+              <a:buFont typeface="Arial" panose="020B0604020202020204" pitchFamily="34" charset="0"/>
+              <a:buChar char="•"/>
+            </a:pPr>
+            <a:endParaRPr lang="en-US" sz="1200" dirty="0">
+              <a:latin typeface="Noto Sans" panose="020B0502040504020204" pitchFamily="34" charset="0"/>
+              <a:ea typeface="Noto Sans" panose="020B0502040504020204" pitchFamily="34" charset="0"/>
+              <a:cs typeface="Noto Sans" panose="020B0502040504020204" pitchFamily="34" charset="0"/>
+            </a:endParaRPr>
+          </a:p>
+          <a:p>
+            <a:pPr marL="800100" lvl="1" indent="-342900" algn="just">
+              <a:buFont typeface="Arial" panose="020B0604020202020204" pitchFamily="34" charset="0"/>
+              <a:buChar char="•"/>
+            </a:pPr>
+            <a:endParaRPr lang="en-US" sz="1200" dirty="0">
+              <a:latin typeface="Noto Sans" panose="020B0502040504020204" pitchFamily="34" charset="0"/>
+              <a:ea typeface="Noto Sans" panose="020B0502040504020204" pitchFamily="34" charset="0"/>
+              <a:cs typeface="Noto Sans" panose="020B0502040504020204" pitchFamily="34" charset="0"/>
+            </a:endParaRPr>
+          </a:p>
+          <a:p>
+            <a:pPr marL="800100" lvl="1" indent="-342900" algn="just">
+              <a:buFont typeface="Arial" panose="020B0604020202020204" pitchFamily="34" charset="0"/>
+              <a:buChar char="•"/>
+            </a:pPr>
+            <a:r>
+              <a:rPr lang="en-US" sz="1200" dirty="0">
+                <a:latin typeface="Noto Sans" panose="020B0502040504020204" pitchFamily="34" charset="0"/>
+                <a:ea typeface="Noto Sans" panose="020B0502040504020204" pitchFamily="34" charset="0"/>
+                <a:cs typeface="Noto Sans" panose="020B0502040504020204" pitchFamily="34" charset="0"/>
+                <a:hlinkClick r:id="rId3"/>
+              </a:rPr>
+              <a:t>www.gilfoodiehub.live</a:t>
+            </a:r>
+            <a:r>
+              <a:rPr lang="en-US" sz="1200" dirty="0">
+                <a:latin typeface="Noto Sans" panose="020B0502040504020204" pitchFamily="34" charset="0"/>
+                <a:ea typeface="Noto Sans" panose="020B0502040504020204" pitchFamily="34" charset="0"/>
+                <a:cs typeface="Noto Sans" panose="020B0502040504020204" pitchFamily="34" charset="0"/>
+              </a:rPr>
+              <a:t> will now point to our IP (52.166.192.249)</a:t>
+            </a:r>
+          </a:p>
+          <a:p>
+            <a:pPr marL="800100" lvl="1" indent="-342900" algn="just">
+              <a:buFont typeface="Arial" panose="020B0604020202020204" pitchFamily="34" charset="0"/>
+              <a:buChar char="•"/>
+            </a:pPr>
+            <a:endParaRPr lang="en-US" sz="1200" dirty="0">
+              <a:latin typeface="Noto Sans" panose="020B0502040504020204" pitchFamily="34" charset="0"/>
+              <a:ea typeface="Noto Sans" panose="020B0502040504020204" pitchFamily="34" charset="0"/>
+              <a:cs typeface="Noto Sans" panose="020B0502040504020204" pitchFamily="34" charset="0"/>
+            </a:endParaRPr>
+          </a:p>
+          <a:p>
+            <a:pPr marL="800100" lvl="1" indent="-342900" algn="just">
+              <a:buFont typeface="Arial" panose="020B0604020202020204" pitchFamily="34" charset="0"/>
+              <a:buChar char="•"/>
+            </a:pPr>
+            <a:r>
+              <a:rPr lang="en-US" sz="1200" dirty="0">
+                <a:latin typeface="Noto Sans" panose="020B0502040504020204" pitchFamily="34" charset="0"/>
+                <a:ea typeface="Noto Sans" panose="020B0502040504020204" pitchFamily="34" charset="0"/>
+                <a:cs typeface="Noto Sans" panose="020B0502040504020204" pitchFamily="34" charset="0"/>
+              </a:rPr>
+              <a:t>DNS records can take up to a few hours to update. We can use </a:t>
+            </a:r>
+            <a:r>
+              <a:rPr lang="en-US" sz="1200" dirty="0">
+                <a:latin typeface="Noto Sans" panose="020B0502040504020204" pitchFamily="34" charset="0"/>
+                <a:ea typeface="Noto Sans" panose="020B0502040504020204" pitchFamily="34" charset="0"/>
+                <a:cs typeface="Noto Sans" panose="020B0502040504020204" pitchFamily="34" charset="0"/>
+                <a:hlinkClick r:id="rId4"/>
+              </a:rPr>
+              <a:t>www.whatismydnsnet</a:t>
+            </a:r>
+            <a:r>
+              <a:rPr lang="en-US" sz="1200" dirty="0">
+                <a:latin typeface="Noto Sans" panose="020B0502040504020204" pitchFamily="34" charset="0"/>
+                <a:ea typeface="Noto Sans" panose="020B0502040504020204" pitchFamily="34" charset="0"/>
+                <a:cs typeface="Noto Sans" panose="020B0502040504020204" pitchFamily="34" charset="0"/>
+              </a:rPr>
+              <a:t> to perform lookup on multiple name servers</a:t>
+            </a:r>
+          </a:p>
+          <a:p>
+            <a:pPr marL="342900" indent="-342900" algn="just">
+              <a:buFont typeface="+mj-lt"/>
+              <a:buAutoNum type="arabicParenR" startAt="4"/>
+            </a:pPr>
+            <a:endParaRPr lang="en-US" sz="1200" dirty="0">
+              <a:latin typeface="Noto Sans" panose="020B0502040504020204" pitchFamily="34" charset="0"/>
+              <a:ea typeface="Noto Sans" panose="020B0502040504020204" pitchFamily="34" charset="0"/>
+              <a:cs typeface="Noto Sans" panose="020B0502040504020204" pitchFamily="34" charset="0"/>
+            </a:endParaRPr>
+          </a:p>
+        </p:txBody>
+      </p:sp>
+      <p:pic>
+        <p:nvPicPr>
+          <p:cNvPr id="4" name="Picture 3">
+            <a:extLst>
+              <a:ext uri="{FF2B5EF4-FFF2-40B4-BE49-F238E27FC236}">
+                <a16:creationId xmlns:a16="http://schemas.microsoft.com/office/drawing/2014/main" id="{C50E9670-A43F-1357-424E-193213FF8E3A}"/>
+              </a:ext>
+            </a:extLst>
+          </p:cNvPr>
+          <p:cNvPicPr>
+            <a:picLocks noChangeAspect="1"/>
+          </p:cNvPicPr>
+          <p:nvPr/>
+        </p:nvPicPr>
+        <p:blipFill rotWithShape="1">
+          <a:blip r:embed="rId5"/>
+          <a:srcRect r="7674"/>
+          <a:stretch/>
+        </p:blipFill>
+        <p:spPr>
+          <a:xfrm>
+            <a:off x="393855" y="5011488"/>
+            <a:ext cx="6331743" cy="492628"/>
+          </a:xfrm>
+          <a:prstGeom prst="rect">
+            <a:avLst/>
+          </a:prstGeom>
+        </p:spPr>
+      </p:pic>
+      <p:pic>
+        <p:nvPicPr>
+          <p:cNvPr id="8" name="Picture 7">
+            <a:extLst>
+              <a:ext uri="{FF2B5EF4-FFF2-40B4-BE49-F238E27FC236}">
+                <a16:creationId xmlns:a16="http://schemas.microsoft.com/office/drawing/2014/main" id="{5B186D3D-5B74-5CEB-F5CE-38420B2C9E5E}"/>
+              </a:ext>
+            </a:extLst>
+          </p:cNvPr>
+          <p:cNvPicPr>
+            <a:picLocks noChangeAspect="1"/>
+          </p:cNvPicPr>
+          <p:nvPr/>
+        </p:nvPicPr>
+        <p:blipFill>
+          <a:blip r:embed="rId6"/>
+          <a:stretch>
+            <a:fillRect/>
+          </a:stretch>
+        </p:blipFill>
+        <p:spPr>
+          <a:xfrm>
+            <a:off x="285825" y="6638111"/>
+            <a:ext cx="6547801" cy="622387"/>
+          </a:xfrm>
+          <a:prstGeom prst="rect">
+            <a:avLst/>
+          </a:prstGeom>
+        </p:spPr>
+      </p:pic>
+      <p:pic>
+        <p:nvPicPr>
+          <p:cNvPr id="12" name="Picture 11">
+            <a:extLst>
+              <a:ext uri="{FF2B5EF4-FFF2-40B4-BE49-F238E27FC236}">
+                <a16:creationId xmlns:a16="http://schemas.microsoft.com/office/drawing/2014/main" id="{F593F361-0F57-8170-B6ED-6F61F03351E0}"/>
+              </a:ext>
+            </a:extLst>
+          </p:cNvPr>
+          <p:cNvPicPr>
+            <a:picLocks noChangeAspect="1"/>
+          </p:cNvPicPr>
+          <p:nvPr/>
+        </p:nvPicPr>
+        <p:blipFill>
+          <a:blip r:embed="rId7"/>
+          <a:stretch>
+            <a:fillRect/>
+          </a:stretch>
+        </p:blipFill>
+        <p:spPr>
+          <a:xfrm>
+            <a:off x="465162" y="1298322"/>
+            <a:ext cx="6189133" cy="3128970"/>
+          </a:xfrm>
+          <a:prstGeom prst="rect">
+            <a:avLst/>
+          </a:prstGeom>
+        </p:spPr>
+      </p:pic>
+      <p:pic>
+        <p:nvPicPr>
+          <p:cNvPr id="14" name="Picture 13">
+            <a:extLst>
+              <a:ext uri="{FF2B5EF4-FFF2-40B4-BE49-F238E27FC236}">
+                <a16:creationId xmlns:a16="http://schemas.microsoft.com/office/drawing/2014/main" id="{5CD61C5A-5CC9-9A34-E1D0-5F3BF513936E}"/>
+              </a:ext>
+            </a:extLst>
+          </p:cNvPr>
+          <p:cNvPicPr>
+            <a:picLocks noChangeAspect="1"/>
+          </p:cNvPicPr>
+          <p:nvPr/>
+        </p:nvPicPr>
+        <p:blipFill>
+          <a:blip r:embed="rId8"/>
+          <a:stretch>
+            <a:fillRect/>
+          </a:stretch>
+        </p:blipFill>
+        <p:spPr>
+          <a:xfrm>
+            <a:off x="1443693" y="8272702"/>
+            <a:ext cx="3970614" cy="1449059"/>
+          </a:xfrm>
+          <a:prstGeom prst="rect">
+            <a:avLst/>
+          </a:prstGeom>
+        </p:spPr>
+      </p:pic>
+    </p:spTree>
+    <p:extLst>
+      <p:ext uri="{BB962C8B-B14F-4D97-AF65-F5344CB8AC3E}">
+        <p14:creationId xmlns:p14="http://schemas.microsoft.com/office/powerpoint/2010/main" val="2012541042"/>
+      </p:ext>
+    </p:extLst>
+  </p:cSld>
+  <p:clrMapOvr>
+    <a:masterClrMapping/>
+  </p:clrMapOvr>
+</p:sld>
+</file>
+
+<file path=ppt/slides/slide3.xml><?xml version="1.0" encoding="utf-8"?>
+<p:sld xmlns:a="http://schemas.openxmlformats.org/drawingml/2006/main" xmlns:r="http://schemas.openxmlformats.org/officeDocument/2006/relationships" xmlns:p="http://schemas.openxmlformats.org/presentationml/2006/main">
+  <p:cSld>
+    <p:spTree>
+      <p:nvGrpSpPr>
+        <p:cNvPr id="1" name=""/>
+        <p:cNvGrpSpPr/>
+        <p:nvPr/>
+      </p:nvGrpSpPr>
+      <p:grpSpPr>
+        <a:xfrm>
+          <a:off x="0" y="0"/>
+          <a:ext cx="0" cy="0"/>
+          <a:chOff x="0" y="0"/>
+          <a:chExt cx="0" cy="0"/>
+        </a:xfrm>
+      </p:grpSpPr>
+      <p:sp>
+        <p:nvSpPr>
+          <p:cNvPr id="2" name="TextBox 1">
+            <a:extLst>
+              <a:ext uri="{FF2B5EF4-FFF2-40B4-BE49-F238E27FC236}">
+                <a16:creationId xmlns:a16="http://schemas.microsoft.com/office/drawing/2014/main" id="{63A20924-FA2B-3EA5-7150-886A7F095C02}"/>
+              </a:ext>
+            </a:extLst>
+          </p:cNvPr>
+          <p:cNvSpPr txBox="1"/>
+          <p:nvPr/>
+        </p:nvSpPr>
+        <p:spPr>
+          <a:xfrm>
+            <a:off x="132399" y="184239"/>
             <a:ext cx="6593205" cy="9541073"/>
           </a:xfrm>
           <a:prstGeom prst="rect">
@@ -3960,10 +4657,10 @@
           <a:p>
             <a:pPr marL="342900" indent="-342900">
               <a:buFont typeface="+mj-lt"/>
-              <a:buAutoNum type="arabicParenR" startAt="4"/>
-            </a:pPr>
-            <a:r>
-              <a:rPr lang="en-US" sz="1400">
+              <a:buAutoNum type="arabicParenR" startAt="5"/>
+            </a:pPr>
+            <a:r>
+              <a:rPr lang="en-US" sz="1400" dirty="0">
                 <a:solidFill>
                   <a:schemeClr val="accent1"/>
                 </a:solidFill>
@@ -3977,21 +4674,21 @@
           <a:p>
             <a:pPr marL="342900" indent="-342900">
               <a:buFont typeface="+mj-lt"/>
-              <a:buAutoNum type="arabicParenR" startAt="4"/>
-            </a:pPr>
-            <a:endParaRPr lang="en-US" sz="1200">
-              <a:latin typeface="Noto Sans" panose="020B0502040504020204" pitchFamily="34" charset="0"/>
-              <a:ea typeface="Noto Sans" panose="020B0502040504020204" pitchFamily="34" charset="0"/>
-              <a:cs typeface="Noto Sans" panose="020B0502040504020204" pitchFamily="34" charset="0"/>
-            </a:endParaRPr>
-          </a:p>
-          <a:p>
-            <a:pPr marL="800100" lvl="1" indent="-342900" algn="just">
-              <a:buFont typeface="Arial" panose="020B0604020202020204" pitchFamily="34" charset="0"/>
-              <a:buChar char="•"/>
-            </a:pPr>
-            <a:r>
-              <a:rPr lang="en-US" sz="1200">
+              <a:buAutoNum type="arabicParenR" startAt="5"/>
+            </a:pPr>
+            <a:endParaRPr lang="en-US" sz="1200" dirty="0">
+              <a:latin typeface="Noto Sans" panose="020B0502040504020204" pitchFamily="34" charset="0"/>
+              <a:ea typeface="Noto Sans" panose="020B0502040504020204" pitchFamily="34" charset="0"/>
+              <a:cs typeface="Noto Sans" panose="020B0502040504020204" pitchFamily="34" charset="0"/>
+            </a:endParaRPr>
+          </a:p>
+          <a:p>
+            <a:pPr marL="800100" lvl="1" indent="-342900" algn="just">
+              <a:buFont typeface="Arial" panose="020B0604020202020204" pitchFamily="34" charset="0"/>
+              <a:buChar char="•"/>
+            </a:pPr>
+            <a:r>
+              <a:rPr lang="en-US" sz="1200" dirty="0">
                 <a:latin typeface="Noto Sans" panose="020B0502040504020204" pitchFamily="34" charset="0"/>
                 <a:ea typeface="Noto Sans" panose="020B0502040504020204" pitchFamily="34" charset="0"/>
                 <a:cs typeface="Noto Sans" panose="020B0502040504020204" pitchFamily="34" charset="0"/>
@@ -4005,7 +4702,7 @@
               <a:buChar char="•"/>
             </a:pPr>
             <a:r>
-              <a:rPr lang="en-US" sz="1200">
+              <a:rPr lang="en-US" sz="1200" dirty="0">
                 <a:latin typeface="Noto Sans" panose="020B0502040504020204" pitchFamily="34" charset="0"/>
                 <a:ea typeface="Noto Sans" panose="020B0502040504020204" pitchFamily="34" charset="0"/>
                 <a:cs typeface="Noto Sans" panose="020B0502040504020204" pitchFamily="34" charset="0"/>
@@ -4019,7 +4716,7 @@
               <a:buChar char="•"/>
             </a:pPr>
             <a:r>
-              <a:rPr lang="en-US" sz="1200">
+              <a:rPr lang="en-US" sz="1200" dirty="0">
                 <a:latin typeface="Noto Sans" panose="020B0502040504020204" pitchFamily="34" charset="0"/>
                 <a:ea typeface="Noto Sans" panose="020B0502040504020204" pitchFamily="34" charset="0"/>
                 <a:cs typeface="Noto Sans" panose="020B0502040504020204" pitchFamily="34" charset="0"/>
@@ -4032,103 +4729,116 @@
               <a:buFont typeface="Arial" panose="020B0604020202020204" pitchFamily="34" charset="0"/>
               <a:buChar char="•"/>
             </a:pPr>
-            <a:endParaRPr lang="en-US" sz="1200">
-              <a:latin typeface="Noto Sans" panose="020B0502040504020204" pitchFamily="34" charset="0"/>
-              <a:ea typeface="Noto Sans" panose="020B0502040504020204" pitchFamily="34" charset="0"/>
-              <a:cs typeface="Noto Sans" panose="020B0502040504020204" pitchFamily="34" charset="0"/>
-            </a:endParaRPr>
-          </a:p>
-          <a:p>
-            <a:pPr marL="800100" lvl="1" indent="-342900" algn="just">
-              <a:buFont typeface="Arial" panose="020B0604020202020204" pitchFamily="34" charset="0"/>
-              <a:buChar char="•"/>
-            </a:pPr>
-            <a:endParaRPr lang="en-US" sz="1200">
-              <a:latin typeface="Noto Sans" panose="020B0502040504020204" pitchFamily="34" charset="0"/>
-              <a:ea typeface="Noto Sans" panose="020B0502040504020204" pitchFamily="34" charset="0"/>
-              <a:cs typeface="Noto Sans" panose="020B0502040504020204" pitchFamily="34" charset="0"/>
-            </a:endParaRPr>
-          </a:p>
-          <a:p>
-            <a:pPr marL="800100" lvl="1" indent="-342900" algn="just">
-              <a:buFont typeface="Arial" panose="020B0604020202020204" pitchFamily="34" charset="0"/>
-              <a:buChar char="•"/>
-            </a:pPr>
-            <a:endParaRPr lang="en-US" sz="1200">
-              <a:latin typeface="Noto Sans" panose="020B0502040504020204" pitchFamily="34" charset="0"/>
-              <a:ea typeface="Noto Sans" panose="020B0502040504020204" pitchFamily="34" charset="0"/>
-              <a:cs typeface="Noto Sans" panose="020B0502040504020204" pitchFamily="34" charset="0"/>
-            </a:endParaRPr>
-          </a:p>
-          <a:p>
-            <a:pPr marL="800100" lvl="1" indent="-342900" algn="just">
-              <a:buFont typeface="Arial" panose="020B0604020202020204" pitchFamily="34" charset="0"/>
-              <a:buChar char="•"/>
-            </a:pPr>
-            <a:endParaRPr lang="en-US" sz="1200">
-              <a:latin typeface="Noto Sans" panose="020B0502040504020204" pitchFamily="34" charset="0"/>
-              <a:ea typeface="Noto Sans" panose="020B0502040504020204" pitchFamily="34" charset="0"/>
-              <a:cs typeface="Noto Sans" panose="020B0502040504020204" pitchFamily="34" charset="0"/>
-            </a:endParaRPr>
-          </a:p>
-          <a:p>
-            <a:pPr marL="800100" lvl="1" indent="-342900" algn="just">
-              <a:buFont typeface="Arial" panose="020B0604020202020204" pitchFamily="34" charset="0"/>
-              <a:buChar char="•"/>
-            </a:pPr>
-            <a:endParaRPr lang="en-US" sz="1200">
-              <a:latin typeface="Noto Sans" panose="020B0502040504020204" pitchFamily="34" charset="0"/>
-              <a:ea typeface="Noto Sans" panose="020B0502040504020204" pitchFamily="34" charset="0"/>
-              <a:cs typeface="Noto Sans" panose="020B0502040504020204" pitchFamily="34" charset="0"/>
-            </a:endParaRPr>
-          </a:p>
-          <a:p>
-            <a:pPr marL="800100" lvl="1" indent="-342900" algn="just">
-              <a:buFont typeface="Arial" panose="020B0604020202020204" pitchFamily="34" charset="0"/>
-              <a:buChar char="•"/>
-            </a:pPr>
-            <a:endParaRPr lang="en-US" sz="1200">
-              <a:latin typeface="Noto Sans" panose="020B0502040504020204" pitchFamily="34" charset="0"/>
-              <a:ea typeface="Noto Sans" panose="020B0502040504020204" pitchFamily="34" charset="0"/>
-              <a:cs typeface="Noto Sans" panose="020B0502040504020204" pitchFamily="34" charset="0"/>
-            </a:endParaRPr>
-          </a:p>
-          <a:p>
-            <a:pPr marL="800100" lvl="1" indent="-342900" algn="just">
-              <a:buFont typeface="Arial" panose="020B0604020202020204" pitchFamily="34" charset="0"/>
-              <a:buChar char="•"/>
-            </a:pPr>
-            <a:endParaRPr lang="en-US" sz="1200">
-              <a:latin typeface="Noto Sans" panose="020B0502040504020204" pitchFamily="34" charset="0"/>
-              <a:ea typeface="Noto Sans" panose="020B0502040504020204" pitchFamily="34" charset="0"/>
-              <a:cs typeface="Noto Sans" panose="020B0502040504020204" pitchFamily="34" charset="0"/>
-            </a:endParaRPr>
-          </a:p>
-          <a:p>
-            <a:pPr marL="800100" lvl="1" indent="-342900" algn="just">
-              <a:buFont typeface="Arial" panose="020B0604020202020204" pitchFamily="34" charset="0"/>
-              <a:buChar char="•"/>
-            </a:pPr>
-            <a:r>
-              <a:rPr lang="en-US" sz="1200">
+            <a:endParaRPr lang="en-US" sz="1200" dirty="0">
+              <a:latin typeface="Noto Sans" panose="020B0502040504020204" pitchFamily="34" charset="0"/>
+              <a:ea typeface="Noto Sans" panose="020B0502040504020204" pitchFamily="34" charset="0"/>
+              <a:cs typeface="Noto Sans" panose="020B0502040504020204" pitchFamily="34" charset="0"/>
+            </a:endParaRPr>
+          </a:p>
+          <a:p>
+            <a:pPr marL="800100" lvl="1" indent="-342900" algn="just">
+              <a:buFont typeface="Arial" panose="020B0604020202020204" pitchFamily="34" charset="0"/>
+              <a:buChar char="•"/>
+            </a:pPr>
+            <a:endParaRPr lang="en-US" sz="1200" dirty="0">
+              <a:latin typeface="Noto Sans" panose="020B0502040504020204" pitchFamily="34" charset="0"/>
+              <a:ea typeface="Noto Sans" panose="020B0502040504020204" pitchFamily="34" charset="0"/>
+              <a:cs typeface="Noto Sans" panose="020B0502040504020204" pitchFamily="34" charset="0"/>
+            </a:endParaRPr>
+          </a:p>
+          <a:p>
+            <a:pPr marL="800100" lvl="1" indent="-342900" algn="just">
+              <a:buFont typeface="Arial" panose="020B0604020202020204" pitchFamily="34" charset="0"/>
+              <a:buChar char="•"/>
+            </a:pPr>
+            <a:endParaRPr lang="en-US" sz="1200" dirty="0">
+              <a:latin typeface="Noto Sans" panose="020B0502040504020204" pitchFamily="34" charset="0"/>
+              <a:ea typeface="Noto Sans" panose="020B0502040504020204" pitchFamily="34" charset="0"/>
+              <a:cs typeface="Noto Sans" panose="020B0502040504020204" pitchFamily="34" charset="0"/>
+            </a:endParaRPr>
+          </a:p>
+          <a:p>
+            <a:pPr marL="800100" lvl="1" indent="-342900" algn="just">
+              <a:buFont typeface="Arial" panose="020B0604020202020204" pitchFamily="34" charset="0"/>
+              <a:buChar char="•"/>
+            </a:pPr>
+            <a:endParaRPr lang="en-US" sz="1200" dirty="0">
+              <a:latin typeface="Noto Sans" panose="020B0502040504020204" pitchFamily="34" charset="0"/>
+              <a:ea typeface="Noto Sans" panose="020B0502040504020204" pitchFamily="34" charset="0"/>
+              <a:cs typeface="Noto Sans" panose="020B0502040504020204" pitchFamily="34" charset="0"/>
+            </a:endParaRPr>
+          </a:p>
+          <a:p>
+            <a:pPr marL="800100" lvl="1" indent="-342900" algn="just">
+              <a:buFont typeface="Arial" panose="020B0604020202020204" pitchFamily="34" charset="0"/>
+              <a:buChar char="•"/>
+            </a:pPr>
+            <a:endParaRPr lang="en-US" sz="1200" dirty="0">
+              <a:latin typeface="Noto Sans" panose="020B0502040504020204" pitchFamily="34" charset="0"/>
+              <a:ea typeface="Noto Sans" panose="020B0502040504020204" pitchFamily="34" charset="0"/>
+              <a:cs typeface="Noto Sans" panose="020B0502040504020204" pitchFamily="34" charset="0"/>
+            </a:endParaRPr>
+          </a:p>
+          <a:p>
+            <a:pPr marL="800100" lvl="1" indent="-342900" algn="just">
+              <a:buFont typeface="Arial" panose="020B0604020202020204" pitchFamily="34" charset="0"/>
+              <a:buChar char="•"/>
+            </a:pPr>
+            <a:endParaRPr lang="en-US" sz="1200" dirty="0">
+              <a:latin typeface="Noto Sans" panose="020B0502040504020204" pitchFamily="34" charset="0"/>
+              <a:ea typeface="Noto Sans" panose="020B0502040504020204" pitchFamily="34" charset="0"/>
+              <a:cs typeface="Noto Sans" panose="020B0502040504020204" pitchFamily="34" charset="0"/>
+            </a:endParaRPr>
+          </a:p>
+          <a:p>
+            <a:pPr marL="800100" lvl="1" indent="-342900" algn="just">
+              <a:buFont typeface="Arial" panose="020B0604020202020204" pitchFamily="34" charset="0"/>
+              <a:buChar char="•"/>
+            </a:pPr>
+            <a:endParaRPr lang="en-US" sz="1200" dirty="0">
+              <a:latin typeface="Noto Sans" panose="020B0502040504020204" pitchFamily="34" charset="0"/>
+              <a:ea typeface="Noto Sans" panose="020B0502040504020204" pitchFamily="34" charset="0"/>
+              <a:cs typeface="Noto Sans" panose="020B0502040504020204" pitchFamily="34" charset="0"/>
+            </a:endParaRPr>
+          </a:p>
+          <a:p>
+            <a:pPr marL="800100" lvl="1" indent="-342900" algn="just">
+              <a:buFont typeface="Arial" panose="020B0604020202020204" pitchFamily="34" charset="0"/>
+              <a:buChar char="•"/>
+            </a:pPr>
+            <a:r>
+              <a:rPr lang="en-US" sz="1200" dirty="0">
                 <a:latin typeface="Noto Sans" panose="020B0502040504020204" pitchFamily="34" charset="0"/>
                 <a:ea typeface="Noto Sans" panose="020B0502040504020204" pitchFamily="34" charset="0"/>
                 <a:cs typeface="Noto Sans" panose="020B0502040504020204" pitchFamily="34" charset="0"/>
               </a:rPr>
-              <a:t>Using the cat command, you need to copy the contents of domain.csr</a:t>
-            </a:r>
-          </a:p>
-          <a:p>
-            <a:pPr marL="800100" lvl="1" indent="-342900" algn="just">
-              <a:buFont typeface="Arial" panose="020B0604020202020204" pitchFamily="34" charset="0"/>
-              <a:buChar char="•"/>
-            </a:pPr>
-            <a:r>
-              <a:rPr lang="en-US" sz="1200">
+              <a:t>Using the cat command, you need to copy the contents of </a:t>
+            </a:r>
+            <a:r>
+              <a:rPr lang="en-US" sz="1200" dirty="0" err="1">
                 <a:latin typeface="Noto Sans" panose="020B0502040504020204" pitchFamily="34" charset="0"/>
                 <a:ea typeface="Noto Sans" panose="020B0502040504020204" pitchFamily="34" charset="0"/>
                 <a:cs typeface="Noto Sans" panose="020B0502040504020204" pitchFamily="34" charset="0"/>
               </a:rPr>
+              <a:t>domain.csr</a:t>
+            </a:r>
+            <a:endParaRPr lang="en-US" sz="1200" dirty="0">
+              <a:latin typeface="Noto Sans" panose="020B0502040504020204" pitchFamily="34" charset="0"/>
+              <a:ea typeface="Noto Sans" panose="020B0502040504020204" pitchFamily="34" charset="0"/>
+              <a:cs typeface="Noto Sans" panose="020B0502040504020204" pitchFamily="34" charset="0"/>
+            </a:endParaRPr>
+          </a:p>
+          <a:p>
+            <a:pPr marL="800100" lvl="1" indent="-342900" algn="just">
+              <a:buFont typeface="Arial" panose="020B0604020202020204" pitchFamily="34" charset="0"/>
+              <a:buChar char="•"/>
+            </a:pPr>
+            <a:r>
+              <a:rPr lang="en-US" sz="1200" dirty="0">
+                <a:latin typeface="Noto Sans" panose="020B0502040504020204" pitchFamily="34" charset="0"/>
+                <a:ea typeface="Noto Sans" panose="020B0502040504020204" pitchFamily="34" charset="0"/>
+                <a:cs typeface="Noto Sans" panose="020B0502040504020204" pitchFamily="34" charset="0"/>
+              </a:rPr>
               <a:t>For this project, I was using Name.com, which offers an option to generate SSL certificates</a:t>
             </a:r>
           </a:p>
@@ -4138,300 +4848,316 @@
               <a:buChar char="•"/>
             </a:pPr>
             <a:r>
-              <a:rPr lang="en-US" sz="1200">
+              <a:rPr lang="en-US" sz="1200" dirty="0">
                 <a:latin typeface="Noto Sans" panose="020B0502040504020204" pitchFamily="34" charset="0"/>
                 <a:ea typeface="Noto Sans" panose="020B0502040504020204" pitchFamily="34" charset="0"/>
                 <a:cs typeface="Noto Sans" panose="020B0502040504020204" pitchFamily="34" charset="0"/>
               </a:rPr>
-              <a:t>Paste the contents of domain.csr in the form and fill in the details</a:t>
-            </a:r>
-          </a:p>
-          <a:p>
-            <a:pPr marL="800100" lvl="1" indent="-342900" algn="just">
-              <a:buFont typeface="Arial" panose="020B0604020202020204" pitchFamily="34" charset="0"/>
-              <a:buChar char="•"/>
-            </a:pPr>
-            <a:endParaRPr lang="en-US" sz="1200">
-              <a:latin typeface="Noto Sans" panose="020B0502040504020204" pitchFamily="34" charset="0"/>
-              <a:ea typeface="Noto Sans" panose="020B0502040504020204" pitchFamily="34" charset="0"/>
-              <a:cs typeface="Noto Sans" panose="020B0502040504020204" pitchFamily="34" charset="0"/>
-            </a:endParaRPr>
-          </a:p>
-          <a:p>
-            <a:pPr marL="800100" lvl="1" indent="-342900" algn="just">
-              <a:buFont typeface="Arial" panose="020B0604020202020204" pitchFamily="34" charset="0"/>
-              <a:buChar char="•"/>
-            </a:pPr>
-            <a:endParaRPr lang="en-US" sz="1200">
-              <a:latin typeface="Noto Sans" panose="020B0502040504020204" pitchFamily="34" charset="0"/>
-              <a:ea typeface="Noto Sans" panose="020B0502040504020204" pitchFamily="34" charset="0"/>
-              <a:cs typeface="Noto Sans" panose="020B0502040504020204" pitchFamily="34" charset="0"/>
-            </a:endParaRPr>
-          </a:p>
-          <a:p>
-            <a:pPr marL="800100" lvl="1" indent="-342900" algn="just">
-              <a:buFont typeface="Arial" panose="020B0604020202020204" pitchFamily="34" charset="0"/>
-              <a:buChar char="•"/>
-            </a:pPr>
-            <a:endParaRPr lang="en-US" sz="1200">
-              <a:latin typeface="Noto Sans" panose="020B0502040504020204" pitchFamily="34" charset="0"/>
-              <a:ea typeface="Noto Sans" panose="020B0502040504020204" pitchFamily="34" charset="0"/>
-              <a:cs typeface="Noto Sans" panose="020B0502040504020204" pitchFamily="34" charset="0"/>
-            </a:endParaRPr>
-          </a:p>
-          <a:p>
-            <a:pPr marL="800100" lvl="1" indent="-342900" algn="just">
-              <a:buFont typeface="Arial" panose="020B0604020202020204" pitchFamily="34" charset="0"/>
-              <a:buChar char="•"/>
-            </a:pPr>
-            <a:endParaRPr lang="en-US" sz="1200">
-              <a:latin typeface="Noto Sans" panose="020B0502040504020204" pitchFamily="34" charset="0"/>
-              <a:ea typeface="Noto Sans" panose="020B0502040504020204" pitchFamily="34" charset="0"/>
-              <a:cs typeface="Noto Sans" panose="020B0502040504020204" pitchFamily="34" charset="0"/>
-            </a:endParaRPr>
-          </a:p>
-          <a:p>
-            <a:pPr marL="800100" lvl="1" indent="-342900" algn="just">
-              <a:buFont typeface="Arial" panose="020B0604020202020204" pitchFamily="34" charset="0"/>
-              <a:buChar char="•"/>
-            </a:pPr>
-            <a:endParaRPr lang="en-US" sz="1200">
-              <a:latin typeface="Noto Sans" panose="020B0502040504020204" pitchFamily="34" charset="0"/>
-              <a:ea typeface="Noto Sans" panose="020B0502040504020204" pitchFamily="34" charset="0"/>
-              <a:cs typeface="Noto Sans" panose="020B0502040504020204" pitchFamily="34" charset="0"/>
-            </a:endParaRPr>
-          </a:p>
-          <a:p>
-            <a:pPr marL="800100" lvl="1" indent="-342900" algn="just">
-              <a:buFont typeface="Arial" panose="020B0604020202020204" pitchFamily="34" charset="0"/>
-              <a:buChar char="•"/>
-            </a:pPr>
-            <a:endParaRPr lang="en-US" sz="1200">
-              <a:latin typeface="Noto Sans" panose="020B0502040504020204" pitchFamily="34" charset="0"/>
-              <a:ea typeface="Noto Sans" panose="020B0502040504020204" pitchFamily="34" charset="0"/>
-              <a:cs typeface="Noto Sans" panose="020B0502040504020204" pitchFamily="34" charset="0"/>
-            </a:endParaRPr>
-          </a:p>
-          <a:p>
-            <a:pPr marL="800100" lvl="1" indent="-342900" algn="just">
-              <a:buFont typeface="Arial" panose="020B0604020202020204" pitchFamily="34" charset="0"/>
-              <a:buChar char="•"/>
-            </a:pPr>
-            <a:endParaRPr lang="en-US" sz="1200">
-              <a:latin typeface="Noto Sans" panose="020B0502040504020204" pitchFamily="34" charset="0"/>
-              <a:ea typeface="Noto Sans" panose="020B0502040504020204" pitchFamily="34" charset="0"/>
-              <a:cs typeface="Noto Sans" panose="020B0502040504020204" pitchFamily="34" charset="0"/>
-            </a:endParaRPr>
-          </a:p>
-          <a:p>
-            <a:pPr marL="800100" lvl="1" indent="-342900" algn="just">
-              <a:buFont typeface="Arial" panose="020B0604020202020204" pitchFamily="34" charset="0"/>
-              <a:buChar char="•"/>
-            </a:pPr>
-            <a:endParaRPr lang="en-US" sz="1200">
-              <a:latin typeface="Noto Sans" panose="020B0502040504020204" pitchFamily="34" charset="0"/>
-              <a:ea typeface="Noto Sans" panose="020B0502040504020204" pitchFamily="34" charset="0"/>
-              <a:cs typeface="Noto Sans" panose="020B0502040504020204" pitchFamily="34" charset="0"/>
-            </a:endParaRPr>
-          </a:p>
-          <a:p>
-            <a:pPr marL="800100" lvl="1" indent="-342900" algn="just">
-              <a:buFont typeface="Arial" panose="020B0604020202020204" pitchFamily="34" charset="0"/>
-              <a:buChar char="•"/>
-            </a:pPr>
-            <a:endParaRPr lang="en-US" sz="1200">
-              <a:latin typeface="Noto Sans" panose="020B0502040504020204" pitchFamily="34" charset="0"/>
-              <a:ea typeface="Noto Sans" panose="020B0502040504020204" pitchFamily="34" charset="0"/>
-              <a:cs typeface="Noto Sans" panose="020B0502040504020204" pitchFamily="34" charset="0"/>
-            </a:endParaRPr>
-          </a:p>
-          <a:p>
-            <a:pPr marL="800100" lvl="1" indent="-342900" algn="just">
-              <a:buFont typeface="Arial" panose="020B0604020202020204" pitchFamily="34" charset="0"/>
-              <a:buChar char="•"/>
-            </a:pPr>
-            <a:endParaRPr lang="en-US" sz="1200">
-              <a:latin typeface="Noto Sans" panose="020B0502040504020204" pitchFamily="34" charset="0"/>
-              <a:ea typeface="Noto Sans" panose="020B0502040504020204" pitchFamily="34" charset="0"/>
-              <a:cs typeface="Noto Sans" panose="020B0502040504020204" pitchFamily="34" charset="0"/>
-            </a:endParaRPr>
-          </a:p>
-          <a:p>
-            <a:pPr marL="800100" lvl="1" indent="-342900" algn="just">
-              <a:buFont typeface="Arial" panose="020B0604020202020204" pitchFamily="34" charset="0"/>
-              <a:buChar char="•"/>
-            </a:pPr>
-            <a:endParaRPr lang="en-US" sz="1200">
-              <a:latin typeface="Noto Sans" panose="020B0502040504020204" pitchFamily="34" charset="0"/>
-              <a:ea typeface="Noto Sans" panose="020B0502040504020204" pitchFamily="34" charset="0"/>
-              <a:cs typeface="Noto Sans" panose="020B0502040504020204" pitchFamily="34" charset="0"/>
-            </a:endParaRPr>
-          </a:p>
-          <a:p>
-            <a:pPr marL="800100" lvl="1" indent="-342900" algn="just">
-              <a:buFont typeface="Arial" panose="020B0604020202020204" pitchFamily="34" charset="0"/>
-              <a:buChar char="•"/>
-            </a:pPr>
-            <a:endParaRPr lang="en-US" sz="1200">
-              <a:latin typeface="Noto Sans" panose="020B0502040504020204" pitchFamily="34" charset="0"/>
-              <a:ea typeface="Noto Sans" panose="020B0502040504020204" pitchFamily="34" charset="0"/>
-              <a:cs typeface="Noto Sans" panose="020B0502040504020204" pitchFamily="34" charset="0"/>
-            </a:endParaRPr>
-          </a:p>
-          <a:p>
-            <a:pPr marL="800100" lvl="1" indent="-342900" algn="just">
-              <a:buFont typeface="Arial" panose="020B0604020202020204" pitchFamily="34" charset="0"/>
-              <a:buChar char="•"/>
-            </a:pPr>
-            <a:endParaRPr lang="en-US" sz="1200">
-              <a:latin typeface="Noto Sans" panose="020B0502040504020204" pitchFamily="34" charset="0"/>
-              <a:ea typeface="Noto Sans" panose="020B0502040504020204" pitchFamily="34" charset="0"/>
-              <a:cs typeface="Noto Sans" panose="020B0502040504020204" pitchFamily="34" charset="0"/>
-            </a:endParaRPr>
-          </a:p>
-          <a:p>
-            <a:pPr marL="800100" lvl="1" indent="-342900" algn="just">
-              <a:buFont typeface="Arial" panose="020B0604020202020204" pitchFamily="34" charset="0"/>
-              <a:buChar char="•"/>
-            </a:pPr>
-            <a:endParaRPr lang="en-US" sz="1200">
-              <a:latin typeface="Noto Sans" panose="020B0502040504020204" pitchFamily="34" charset="0"/>
-              <a:ea typeface="Noto Sans" panose="020B0502040504020204" pitchFamily="34" charset="0"/>
-              <a:cs typeface="Noto Sans" panose="020B0502040504020204" pitchFamily="34" charset="0"/>
-            </a:endParaRPr>
-          </a:p>
-          <a:p>
-            <a:pPr marL="800100" lvl="1" indent="-342900" algn="just">
-              <a:buFont typeface="Arial" panose="020B0604020202020204" pitchFamily="34" charset="0"/>
-              <a:buChar char="•"/>
-            </a:pPr>
-            <a:endParaRPr lang="en-US" sz="1200">
-              <a:latin typeface="Noto Sans" panose="020B0502040504020204" pitchFamily="34" charset="0"/>
-              <a:ea typeface="Noto Sans" panose="020B0502040504020204" pitchFamily="34" charset="0"/>
-              <a:cs typeface="Noto Sans" panose="020B0502040504020204" pitchFamily="34" charset="0"/>
-            </a:endParaRPr>
-          </a:p>
-          <a:p>
-            <a:pPr marL="800100" lvl="1" indent="-342900" algn="just">
-              <a:buFont typeface="Arial" panose="020B0604020202020204" pitchFamily="34" charset="0"/>
-              <a:buChar char="•"/>
-            </a:pPr>
-            <a:endParaRPr lang="en-US" sz="1200">
-              <a:latin typeface="Noto Sans" panose="020B0502040504020204" pitchFamily="34" charset="0"/>
-              <a:ea typeface="Noto Sans" panose="020B0502040504020204" pitchFamily="34" charset="0"/>
-              <a:cs typeface="Noto Sans" panose="020B0502040504020204" pitchFamily="34" charset="0"/>
-            </a:endParaRPr>
-          </a:p>
-          <a:p>
-            <a:pPr marL="800100" lvl="1" indent="-342900" algn="just">
-              <a:buFont typeface="Arial" panose="020B0604020202020204" pitchFamily="34" charset="0"/>
-              <a:buChar char="•"/>
-            </a:pPr>
-            <a:endParaRPr lang="en-US" sz="1200">
-              <a:latin typeface="Noto Sans" panose="020B0502040504020204" pitchFamily="34" charset="0"/>
-              <a:ea typeface="Noto Sans" panose="020B0502040504020204" pitchFamily="34" charset="0"/>
-              <a:cs typeface="Noto Sans" panose="020B0502040504020204" pitchFamily="34" charset="0"/>
-            </a:endParaRPr>
-          </a:p>
-          <a:p>
-            <a:pPr marL="800100" lvl="1" indent="-342900" algn="just">
-              <a:buFont typeface="Arial" panose="020B0604020202020204" pitchFamily="34" charset="0"/>
-              <a:buChar char="•"/>
-            </a:pPr>
-            <a:endParaRPr lang="en-US" sz="1200">
-              <a:latin typeface="Noto Sans" panose="020B0502040504020204" pitchFamily="34" charset="0"/>
-              <a:ea typeface="Noto Sans" panose="020B0502040504020204" pitchFamily="34" charset="0"/>
-              <a:cs typeface="Noto Sans" panose="020B0502040504020204" pitchFamily="34" charset="0"/>
-            </a:endParaRPr>
-          </a:p>
-          <a:p>
-            <a:pPr marL="800100" lvl="1" indent="-342900" algn="just">
-              <a:buFont typeface="Arial" panose="020B0604020202020204" pitchFamily="34" charset="0"/>
-              <a:buChar char="•"/>
-            </a:pPr>
-            <a:endParaRPr lang="en-US" sz="1200">
-              <a:latin typeface="Noto Sans" panose="020B0502040504020204" pitchFamily="34" charset="0"/>
-              <a:ea typeface="Noto Sans" panose="020B0502040504020204" pitchFamily="34" charset="0"/>
-              <a:cs typeface="Noto Sans" panose="020B0502040504020204" pitchFamily="34" charset="0"/>
-            </a:endParaRPr>
-          </a:p>
-          <a:p>
-            <a:pPr marL="800100" lvl="1" indent="-342900" algn="just">
-              <a:buFont typeface="Arial" panose="020B0604020202020204" pitchFamily="34" charset="0"/>
-              <a:buChar char="•"/>
-            </a:pPr>
-            <a:endParaRPr lang="en-US" sz="1200">
-              <a:latin typeface="Noto Sans" panose="020B0502040504020204" pitchFamily="34" charset="0"/>
-              <a:ea typeface="Noto Sans" panose="020B0502040504020204" pitchFamily="34" charset="0"/>
-              <a:cs typeface="Noto Sans" panose="020B0502040504020204" pitchFamily="34" charset="0"/>
-            </a:endParaRPr>
-          </a:p>
-          <a:p>
-            <a:pPr marL="800100" lvl="1" indent="-342900" algn="just">
-              <a:buFont typeface="Arial" panose="020B0604020202020204" pitchFamily="34" charset="0"/>
-              <a:buChar char="•"/>
-            </a:pPr>
-            <a:endParaRPr lang="en-US" sz="1200">
-              <a:latin typeface="Noto Sans" panose="020B0502040504020204" pitchFamily="34" charset="0"/>
-              <a:ea typeface="Noto Sans" panose="020B0502040504020204" pitchFamily="34" charset="0"/>
-              <a:cs typeface="Noto Sans" panose="020B0502040504020204" pitchFamily="34" charset="0"/>
-            </a:endParaRPr>
-          </a:p>
-          <a:p>
-            <a:pPr marL="800100" lvl="1" indent="-342900" algn="just">
-              <a:buFont typeface="Arial" panose="020B0604020202020204" pitchFamily="34" charset="0"/>
-              <a:buChar char="•"/>
-            </a:pPr>
-            <a:endParaRPr lang="en-US" sz="1200">
-              <a:latin typeface="Noto Sans" panose="020B0502040504020204" pitchFamily="34" charset="0"/>
-              <a:ea typeface="Noto Sans" panose="020B0502040504020204" pitchFamily="34" charset="0"/>
-              <a:cs typeface="Noto Sans" panose="020B0502040504020204" pitchFamily="34" charset="0"/>
-            </a:endParaRPr>
-          </a:p>
-          <a:p>
-            <a:pPr marL="800100" lvl="1" indent="-342900" algn="just">
-              <a:buFont typeface="Arial" panose="020B0604020202020204" pitchFamily="34" charset="0"/>
-              <a:buChar char="•"/>
-            </a:pPr>
-            <a:endParaRPr lang="en-US" sz="1200">
-              <a:latin typeface="Noto Sans" panose="020B0502040504020204" pitchFamily="34" charset="0"/>
-              <a:ea typeface="Noto Sans" panose="020B0502040504020204" pitchFamily="34" charset="0"/>
-              <a:cs typeface="Noto Sans" panose="020B0502040504020204" pitchFamily="34" charset="0"/>
-            </a:endParaRPr>
-          </a:p>
-          <a:p>
-            <a:pPr marL="800100" lvl="1" indent="-342900" algn="just">
-              <a:buFont typeface="Arial" panose="020B0604020202020204" pitchFamily="34" charset="0"/>
-              <a:buChar char="•"/>
-            </a:pPr>
-            <a:endParaRPr lang="en-US" sz="1200">
-              <a:latin typeface="Noto Sans" panose="020B0502040504020204" pitchFamily="34" charset="0"/>
-              <a:ea typeface="Noto Sans" panose="020B0502040504020204" pitchFamily="34" charset="0"/>
-              <a:cs typeface="Noto Sans" panose="020B0502040504020204" pitchFamily="34" charset="0"/>
-            </a:endParaRPr>
-          </a:p>
-          <a:p>
-            <a:pPr marL="800100" lvl="1" indent="-342900" algn="just">
-              <a:buFont typeface="Arial" panose="020B0604020202020204" pitchFamily="34" charset="0"/>
-              <a:buChar char="•"/>
-            </a:pPr>
-            <a:endParaRPr lang="en-US" sz="1200">
-              <a:latin typeface="Noto Sans" panose="020B0502040504020204" pitchFamily="34" charset="0"/>
-              <a:ea typeface="Noto Sans" panose="020B0502040504020204" pitchFamily="34" charset="0"/>
-              <a:cs typeface="Noto Sans" panose="020B0502040504020204" pitchFamily="34" charset="0"/>
-            </a:endParaRPr>
-          </a:p>
-          <a:p>
-            <a:pPr marL="800100" lvl="1" indent="-342900" algn="just">
-              <a:buFont typeface="Arial" panose="020B0604020202020204" pitchFamily="34" charset="0"/>
-              <a:buChar char="•"/>
-            </a:pPr>
-            <a:r>
-              <a:rPr lang="en-US" sz="1200">
+              <a:t>Paste the contents of </a:t>
+            </a:r>
+            <a:r>
+              <a:rPr lang="en-US" sz="1200" dirty="0" err="1">
                 <a:latin typeface="Noto Sans" panose="020B0502040504020204" pitchFamily="34" charset="0"/>
                 <a:ea typeface="Noto Sans" panose="020B0502040504020204" pitchFamily="34" charset="0"/>
                 <a:cs typeface="Noto Sans" panose="020B0502040504020204" pitchFamily="34" charset="0"/>
               </a:rPr>
+              <a:t>domain.csr</a:t>
+            </a:r>
+            <a:r>
+              <a:rPr lang="en-US" sz="1200" dirty="0">
+                <a:latin typeface="Noto Sans" panose="020B0502040504020204" pitchFamily="34" charset="0"/>
+                <a:ea typeface="Noto Sans" panose="020B0502040504020204" pitchFamily="34" charset="0"/>
+                <a:cs typeface="Noto Sans" panose="020B0502040504020204" pitchFamily="34" charset="0"/>
+              </a:rPr>
+              <a:t> in the form and fill in the details</a:t>
+            </a:r>
+          </a:p>
+          <a:p>
+            <a:pPr marL="800100" lvl="1" indent="-342900" algn="just">
+              <a:buFont typeface="Arial" panose="020B0604020202020204" pitchFamily="34" charset="0"/>
+              <a:buChar char="•"/>
+            </a:pPr>
+            <a:endParaRPr lang="en-US" sz="1200" dirty="0">
+              <a:latin typeface="Noto Sans" panose="020B0502040504020204" pitchFamily="34" charset="0"/>
+              <a:ea typeface="Noto Sans" panose="020B0502040504020204" pitchFamily="34" charset="0"/>
+              <a:cs typeface="Noto Sans" panose="020B0502040504020204" pitchFamily="34" charset="0"/>
+            </a:endParaRPr>
+          </a:p>
+          <a:p>
+            <a:pPr marL="800100" lvl="1" indent="-342900" algn="just">
+              <a:buFont typeface="Arial" panose="020B0604020202020204" pitchFamily="34" charset="0"/>
+              <a:buChar char="•"/>
+            </a:pPr>
+            <a:endParaRPr lang="en-US" sz="1200" dirty="0">
+              <a:latin typeface="Noto Sans" panose="020B0502040504020204" pitchFamily="34" charset="0"/>
+              <a:ea typeface="Noto Sans" panose="020B0502040504020204" pitchFamily="34" charset="0"/>
+              <a:cs typeface="Noto Sans" panose="020B0502040504020204" pitchFamily="34" charset="0"/>
+            </a:endParaRPr>
+          </a:p>
+          <a:p>
+            <a:pPr marL="800100" lvl="1" indent="-342900" algn="just">
+              <a:buFont typeface="Arial" panose="020B0604020202020204" pitchFamily="34" charset="0"/>
+              <a:buChar char="•"/>
+            </a:pPr>
+            <a:endParaRPr lang="en-US" sz="1200" dirty="0">
+              <a:latin typeface="Noto Sans" panose="020B0502040504020204" pitchFamily="34" charset="0"/>
+              <a:ea typeface="Noto Sans" panose="020B0502040504020204" pitchFamily="34" charset="0"/>
+              <a:cs typeface="Noto Sans" panose="020B0502040504020204" pitchFamily="34" charset="0"/>
+            </a:endParaRPr>
+          </a:p>
+          <a:p>
+            <a:pPr marL="800100" lvl="1" indent="-342900" algn="just">
+              <a:buFont typeface="Arial" panose="020B0604020202020204" pitchFamily="34" charset="0"/>
+              <a:buChar char="•"/>
+            </a:pPr>
+            <a:endParaRPr lang="en-US" sz="1200" dirty="0">
+              <a:latin typeface="Noto Sans" panose="020B0502040504020204" pitchFamily="34" charset="0"/>
+              <a:ea typeface="Noto Sans" panose="020B0502040504020204" pitchFamily="34" charset="0"/>
+              <a:cs typeface="Noto Sans" panose="020B0502040504020204" pitchFamily="34" charset="0"/>
+            </a:endParaRPr>
+          </a:p>
+          <a:p>
+            <a:pPr marL="800100" lvl="1" indent="-342900" algn="just">
+              <a:buFont typeface="Arial" panose="020B0604020202020204" pitchFamily="34" charset="0"/>
+              <a:buChar char="•"/>
+            </a:pPr>
+            <a:endParaRPr lang="en-US" sz="1200" dirty="0">
+              <a:latin typeface="Noto Sans" panose="020B0502040504020204" pitchFamily="34" charset="0"/>
+              <a:ea typeface="Noto Sans" panose="020B0502040504020204" pitchFamily="34" charset="0"/>
+              <a:cs typeface="Noto Sans" panose="020B0502040504020204" pitchFamily="34" charset="0"/>
+            </a:endParaRPr>
+          </a:p>
+          <a:p>
+            <a:pPr marL="800100" lvl="1" indent="-342900" algn="just">
+              <a:buFont typeface="Arial" panose="020B0604020202020204" pitchFamily="34" charset="0"/>
+              <a:buChar char="•"/>
+            </a:pPr>
+            <a:endParaRPr lang="en-US" sz="1200" dirty="0">
+              <a:latin typeface="Noto Sans" panose="020B0502040504020204" pitchFamily="34" charset="0"/>
+              <a:ea typeface="Noto Sans" panose="020B0502040504020204" pitchFamily="34" charset="0"/>
+              <a:cs typeface="Noto Sans" panose="020B0502040504020204" pitchFamily="34" charset="0"/>
+            </a:endParaRPr>
+          </a:p>
+          <a:p>
+            <a:pPr marL="800100" lvl="1" indent="-342900" algn="just">
+              <a:buFont typeface="Arial" panose="020B0604020202020204" pitchFamily="34" charset="0"/>
+              <a:buChar char="•"/>
+            </a:pPr>
+            <a:endParaRPr lang="en-US" sz="1200" dirty="0">
+              <a:latin typeface="Noto Sans" panose="020B0502040504020204" pitchFamily="34" charset="0"/>
+              <a:ea typeface="Noto Sans" panose="020B0502040504020204" pitchFamily="34" charset="0"/>
+              <a:cs typeface="Noto Sans" panose="020B0502040504020204" pitchFamily="34" charset="0"/>
+            </a:endParaRPr>
+          </a:p>
+          <a:p>
+            <a:pPr marL="800100" lvl="1" indent="-342900" algn="just">
+              <a:buFont typeface="Arial" panose="020B0604020202020204" pitchFamily="34" charset="0"/>
+              <a:buChar char="•"/>
+            </a:pPr>
+            <a:endParaRPr lang="en-US" sz="1200" dirty="0">
+              <a:latin typeface="Noto Sans" panose="020B0502040504020204" pitchFamily="34" charset="0"/>
+              <a:ea typeface="Noto Sans" panose="020B0502040504020204" pitchFamily="34" charset="0"/>
+              <a:cs typeface="Noto Sans" panose="020B0502040504020204" pitchFamily="34" charset="0"/>
+            </a:endParaRPr>
+          </a:p>
+          <a:p>
+            <a:pPr marL="800100" lvl="1" indent="-342900" algn="just">
+              <a:buFont typeface="Arial" panose="020B0604020202020204" pitchFamily="34" charset="0"/>
+              <a:buChar char="•"/>
+            </a:pPr>
+            <a:endParaRPr lang="en-US" sz="1200" dirty="0">
+              <a:latin typeface="Noto Sans" panose="020B0502040504020204" pitchFamily="34" charset="0"/>
+              <a:ea typeface="Noto Sans" panose="020B0502040504020204" pitchFamily="34" charset="0"/>
+              <a:cs typeface="Noto Sans" panose="020B0502040504020204" pitchFamily="34" charset="0"/>
+            </a:endParaRPr>
+          </a:p>
+          <a:p>
+            <a:pPr marL="800100" lvl="1" indent="-342900" algn="just">
+              <a:buFont typeface="Arial" panose="020B0604020202020204" pitchFamily="34" charset="0"/>
+              <a:buChar char="•"/>
+            </a:pPr>
+            <a:endParaRPr lang="en-US" sz="1200" dirty="0">
+              <a:latin typeface="Noto Sans" panose="020B0502040504020204" pitchFamily="34" charset="0"/>
+              <a:ea typeface="Noto Sans" panose="020B0502040504020204" pitchFamily="34" charset="0"/>
+              <a:cs typeface="Noto Sans" panose="020B0502040504020204" pitchFamily="34" charset="0"/>
+            </a:endParaRPr>
+          </a:p>
+          <a:p>
+            <a:pPr marL="800100" lvl="1" indent="-342900" algn="just">
+              <a:buFont typeface="Arial" panose="020B0604020202020204" pitchFamily="34" charset="0"/>
+              <a:buChar char="•"/>
+            </a:pPr>
+            <a:endParaRPr lang="en-US" sz="1200" dirty="0">
+              <a:latin typeface="Noto Sans" panose="020B0502040504020204" pitchFamily="34" charset="0"/>
+              <a:ea typeface="Noto Sans" panose="020B0502040504020204" pitchFamily="34" charset="0"/>
+              <a:cs typeface="Noto Sans" panose="020B0502040504020204" pitchFamily="34" charset="0"/>
+            </a:endParaRPr>
+          </a:p>
+          <a:p>
+            <a:pPr marL="800100" lvl="1" indent="-342900" algn="just">
+              <a:buFont typeface="Arial" panose="020B0604020202020204" pitchFamily="34" charset="0"/>
+              <a:buChar char="•"/>
+            </a:pPr>
+            <a:endParaRPr lang="en-US" sz="1200" dirty="0">
+              <a:latin typeface="Noto Sans" panose="020B0502040504020204" pitchFamily="34" charset="0"/>
+              <a:ea typeface="Noto Sans" panose="020B0502040504020204" pitchFamily="34" charset="0"/>
+              <a:cs typeface="Noto Sans" panose="020B0502040504020204" pitchFamily="34" charset="0"/>
+            </a:endParaRPr>
+          </a:p>
+          <a:p>
+            <a:pPr marL="800100" lvl="1" indent="-342900" algn="just">
+              <a:buFont typeface="Arial" panose="020B0604020202020204" pitchFamily="34" charset="0"/>
+              <a:buChar char="•"/>
+            </a:pPr>
+            <a:endParaRPr lang="en-US" sz="1200" dirty="0">
+              <a:latin typeface="Noto Sans" panose="020B0502040504020204" pitchFamily="34" charset="0"/>
+              <a:ea typeface="Noto Sans" panose="020B0502040504020204" pitchFamily="34" charset="0"/>
+              <a:cs typeface="Noto Sans" panose="020B0502040504020204" pitchFamily="34" charset="0"/>
+            </a:endParaRPr>
+          </a:p>
+          <a:p>
+            <a:pPr marL="800100" lvl="1" indent="-342900" algn="just">
+              <a:buFont typeface="Arial" panose="020B0604020202020204" pitchFamily="34" charset="0"/>
+              <a:buChar char="•"/>
+            </a:pPr>
+            <a:endParaRPr lang="en-US" sz="1200" dirty="0">
+              <a:latin typeface="Noto Sans" panose="020B0502040504020204" pitchFamily="34" charset="0"/>
+              <a:ea typeface="Noto Sans" panose="020B0502040504020204" pitchFamily="34" charset="0"/>
+              <a:cs typeface="Noto Sans" panose="020B0502040504020204" pitchFamily="34" charset="0"/>
+            </a:endParaRPr>
+          </a:p>
+          <a:p>
+            <a:pPr marL="800100" lvl="1" indent="-342900" algn="just">
+              <a:buFont typeface="Arial" panose="020B0604020202020204" pitchFamily="34" charset="0"/>
+              <a:buChar char="•"/>
+            </a:pPr>
+            <a:endParaRPr lang="en-US" sz="1200" dirty="0">
+              <a:latin typeface="Noto Sans" panose="020B0502040504020204" pitchFamily="34" charset="0"/>
+              <a:ea typeface="Noto Sans" panose="020B0502040504020204" pitchFamily="34" charset="0"/>
+              <a:cs typeface="Noto Sans" panose="020B0502040504020204" pitchFamily="34" charset="0"/>
+            </a:endParaRPr>
+          </a:p>
+          <a:p>
+            <a:pPr marL="800100" lvl="1" indent="-342900" algn="just">
+              <a:buFont typeface="Arial" panose="020B0604020202020204" pitchFamily="34" charset="0"/>
+              <a:buChar char="•"/>
+            </a:pPr>
+            <a:endParaRPr lang="en-US" sz="1200" dirty="0">
+              <a:latin typeface="Noto Sans" panose="020B0502040504020204" pitchFamily="34" charset="0"/>
+              <a:ea typeface="Noto Sans" panose="020B0502040504020204" pitchFamily="34" charset="0"/>
+              <a:cs typeface="Noto Sans" panose="020B0502040504020204" pitchFamily="34" charset="0"/>
+            </a:endParaRPr>
+          </a:p>
+          <a:p>
+            <a:pPr marL="800100" lvl="1" indent="-342900" algn="just">
+              <a:buFont typeface="Arial" panose="020B0604020202020204" pitchFamily="34" charset="0"/>
+              <a:buChar char="•"/>
+            </a:pPr>
+            <a:endParaRPr lang="en-US" sz="1200" dirty="0">
+              <a:latin typeface="Noto Sans" panose="020B0502040504020204" pitchFamily="34" charset="0"/>
+              <a:ea typeface="Noto Sans" panose="020B0502040504020204" pitchFamily="34" charset="0"/>
+              <a:cs typeface="Noto Sans" panose="020B0502040504020204" pitchFamily="34" charset="0"/>
+            </a:endParaRPr>
+          </a:p>
+          <a:p>
+            <a:pPr marL="800100" lvl="1" indent="-342900" algn="just">
+              <a:buFont typeface="Arial" panose="020B0604020202020204" pitchFamily="34" charset="0"/>
+              <a:buChar char="•"/>
+            </a:pPr>
+            <a:endParaRPr lang="en-US" sz="1200" dirty="0">
+              <a:latin typeface="Noto Sans" panose="020B0502040504020204" pitchFamily="34" charset="0"/>
+              <a:ea typeface="Noto Sans" panose="020B0502040504020204" pitchFamily="34" charset="0"/>
+              <a:cs typeface="Noto Sans" panose="020B0502040504020204" pitchFamily="34" charset="0"/>
+            </a:endParaRPr>
+          </a:p>
+          <a:p>
+            <a:pPr marL="800100" lvl="1" indent="-342900" algn="just">
+              <a:buFont typeface="Arial" panose="020B0604020202020204" pitchFamily="34" charset="0"/>
+              <a:buChar char="•"/>
+            </a:pPr>
+            <a:endParaRPr lang="en-US" sz="1200" dirty="0">
+              <a:latin typeface="Noto Sans" panose="020B0502040504020204" pitchFamily="34" charset="0"/>
+              <a:ea typeface="Noto Sans" panose="020B0502040504020204" pitchFamily="34" charset="0"/>
+              <a:cs typeface="Noto Sans" panose="020B0502040504020204" pitchFamily="34" charset="0"/>
+            </a:endParaRPr>
+          </a:p>
+          <a:p>
+            <a:pPr marL="800100" lvl="1" indent="-342900" algn="just">
+              <a:buFont typeface="Arial" panose="020B0604020202020204" pitchFamily="34" charset="0"/>
+              <a:buChar char="•"/>
+            </a:pPr>
+            <a:endParaRPr lang="en-US" sz="1200" dirty="0">
+              <a:latin typeface="Noto Sans" panose="020B0502040504020204" pitchFamily="34" charset="0"/>
+              <a:ea typeface="Noto Sans" panose="020B0502040504020204" pitchFamily="34" charset="0"/>
+              <a:cs typeface="Noto Sans" panose="020B0502040504020204" pitchFamily="34" charset="0"/>
+            </a:endParaRPr>
+          </a:p>
+          <a:p>
+            <a:pPr marL="800100" lvl="1" indent="-342900" algn="just">
+              <a:buFont typeface="Arial" panose="020B0604020202020204" pitchFamily="34" charset="0"/>
+              <a:buChar char="•"/>
+            </a:pPr>
+            <a:endParaRPr lang="en-US" sz="1200" dirty="0">
+              <a:latin typeface="Noto Sans" panose="020B0502040504020204" pitchFamily="34" charset="0"/>
+              <a:ea typeface="Noto Sans" panose="020B0502040504020204" pitchFamily="34" charset="0"/>
+              <a:cs typeface="Noto Sans" panose="020B0502040504020204" pitchFamily="34" charset="0"/>
+            </a:endParaRPr>
+          </a:p>
+          <a:p>
+            <a:pPr marL="800100" lvl="1" indent="-342900" algn="just">
+              <a:buFont typeface="Arial" panose="020B0604020202020204" pitchFamily="34" charset="0"/>
+              <a:buChar char="•"/>
+            </a:pPr>
+            <a:endParaRPr lang="en-US" sz="1200" dirty="0">
+              <a:latin typeface="Noto Sans" panose="020B0502040504020204" pitchFamily="34" charset="0"/>
+              <a:ea typeface="Noto Sans" panose="020B0502040504020204" pitchFamily="34" charset="0"/>
+              <a:cs typeface="Noto Sans" panose="020B0502040504020204" pitchFamily="34" charset="0"/>
+            </a:endParaRPr>
+          </a:p>
+          <a:p>
+            <a:pPr marL="800100" lvl="1" indent="-342900" algn="just">
+              <a:buFont typeface="Arial" panose="020B0604020202020204" pitchFamily="34" charset="0"/>
+              <a:buChar char="•"/>
+            </a:pPr>
+            <a:endParaRPr lang="en-US" sz="1200" dirty="0">
+              <a:latin typeface="Noto Sans" panose="020B0502040504020204" pitchFamily="34" charset="0"/>
+              <a:ea typeface="Noto Sans" panose="020B0502040504020204" pitchFamily="34" charset="0"/>
+              <a:cs typeface="Noto Sans" panose="020B0502040504020204" pitchFamily="34" charset="0"/>
+            </a:endParaRPr>
+          </a:p>
+          <a:p>
+            <a:pPr marL="800100" lvl="1" indent="-342900" algn="just">
+              <a:buFont typeface="Arial" panose="020B0604020202020204" pitchFamily="34" charset="0"/>
+              <a:buChar char="•"/>
+            </a:pPr>
+            <a:endParaRPr lang="en-US" sz="1200" dirty="0">
+              <a:latin typeface="Noto Sans" panose="020B0502040504020204" pitchFamily="34" charset="0"/>
+              <a:ea typeface="Noto Sans" panose="020B0502040504020204" pitchFamily="34" charset="0"/>
+              <a:cs typeface="Noto Sans" panose="020B0502040504020204" pitchFamily="34" charset="0"/>
+            </a:endParaRPr>
+          </a:p>
+          <a:p>
+            <a:pPr marL="800100" lvl="1" indent="-342900" algn="just">
+              <a:buFont typeface="Arial" panose="020B0604020202020204" pitchFamily="34" charset="0"/>
+              <a:buChar char="•"/>
+            </a:pPr>
+            <a:endParaRPr lang="en-US" sz="1200" dirty="0">
+              <a:latin typeface="Noto Sans" panose="020B0502040504020204" pitchFamily="34" charset="0"/>
+              <a:ea typeface="Noto Sans" panose="020B0502040504020204" pitchFamily="34" charset="0"/>
+              <a:cs typeface="Noto Sans" panose="020B0502040504020204" pitchFamily="34" charset="0"/>
+            </a:endParaRPr>
+          </a:p>
+          <a:p>
+            <a:pPr marL="800100" lvl="1" indent="-342900" algn="just">
+              <a:buFont typeface="Arial" panose="020B0604020202020204" pitchFamily="34" charset="0"/>
+              <a:buChar char="•"/>
+            </a:pPr>
+            <a:r>
+              <a:rPr lang="en-US" sz="1200" dirty="0">
+                <a:latin typeface="Noto Sans" panose="020B0502040504020204" pitchFamily="34" charset="0"/>
+                <a:ea typeface="Noto Sans" panose="020B0502040504020204" pitchFamily="34" charset="0"/>
+                <a:cs typeface="Noto Sans" panose="020B0502040504020204" pitchFamily="34" charset="0"/>
+              </a:rPr>
               <a:t>Name.com will provide you with the contents of your certificate file , you need to copy it and paste it into our server</a:t>
             </a:r>
           </a:p>
@@ -4440,18 +5166,18 @@
               <a:buFont typeface="Arial" panose="020B0604020202020204" pitchFamily="34" charset="0"/>
               <a:buChar char="•"/>
             </a:pPr>
-            <a:endParaRPr lang="en-US" sz="1200">
-              <a:latin typeface="Noto Sans" panose="020B0502040504020204" pitchFamily="34" charset="0"/>
-              <a:ea typeface="Noto Sans" panose="020B0502040504020204" pitchFamily="34" charset="0"/>
-              <a:cs typeface="Noto Sans" panose="020B0502040504020204" pitchFamily="34" charset="0"/>
-            </a:endParaRPr>
-          </a:p>
-          <a:p>
-            <a:pPr marL="800100" lvl="1" indent="-342900" algn="just">
-              <a:buFont typeface="Arial" panose="020B0604020202020204" pitchFamily="34" charset="0"/>
-              <a:buChar char="•"/>
-            </a:pPr>
-            <a:endParaRPr lang="en-US" sz="1200">
+            <a:endParaRPr lang="en-US" sz="1200" dirty="0">
+              <a:latin typeface="Noto Sans" panose="020B0502040504020204" pitchFamily="34" charset="0"/>
+              <a:ea typeface="Noto Sans" panose="020B0502040504020204" pitchFamily="34" charset="0"/>
+              <a:cs typeface="Noto Sans" panose="020B0502040504020204" pitchFamily="34" charset="0"/>
+            </a:endParaRPr>
+          </a:p>
+          <a:p>
+            <a:pPr marL="800100" lvl="1" indent="-342900" algn="just">
+              <a:buFont typeface="Arial" panose="020B0604020202020204" pitchFamily="34" charset="0"/>
+              <a:buChar char="•"/>
+            </a:pPr>
+            <a:endParaRPr lang="en-US" sz="1200" dirty="0">
               <a:latin typeface="Noto Sans" panose="020B0502040504020204" pitchFamily="34" charset="0"/>
               <a:ea typeface="Noto Sans" panose="020B0502040504020204" pitchFamily="34" charset="0"/>
               <a:cs typeface="Noto Sans" panose="020B0502040504020204" pitchFamily="34" charset="0"/>
@@ -4459,7 +5185,7 @@
           </a:p>
           <a:p>
             <a:pPr lvl="1" algn="just"/>
-            <a:endParaRPr lang="en-US" sz="1200">
+            <a:endParaRPr lang="en-US" sz="1200" dirty="0">
               <a:latin typeface="Noto Sans" panose="020B0502040504020204" pitchFamily="34" charset="0"/>
               <a:ea typeface="Noto Sans" panose="020B0502040504020204" pitchFamily="34" charset="0"/>
               <a:cs typeface="Noto Sans" panose="020B0502040504020204" pitchFamily="34" charset="0"/>
@@ -4467,18 +5193,18 @@
           </a:p>
           <a:p>
             <a:pPr lvl="1" algn="just"/>
-            <a:endParaRPr lang="en-US" sz="1200">
-              <a:latin typeface="Noto Sans" panose="020B0502040504020204" pitchFamily="34" charset="0"/>
-              <a:ea typeface="Noto Sans" panose="020B0502040504020204" pitchFamily="34" charset="0"/>
-              <a:cs typeface="Noto Sans" panose="020B0502040504020204" pitchFamily="34" charset="0"/>
-            </a:endParaRPr>
-          </a:p>
-          <a:p>
-            <a:pPr marL="800100" lvl="1" indent="-342900" algn="just">
-              <a:buFont typeface="Arial" panose="020B0604020202020204" pitchFamily="34" charset="0"/>
-              <a:buChar char="•"/>
-            </a:pPr>
-            <a:endParaRPr lang="en-US" sz="1200">
+            <a:endParaRPr lang="en-US" sz="1200" dirty="0">
+              <a:latin typeface="Noto Sans" panose="020B0502040504020204" pitchFamily="34" charset="0"/>
+              <a:ea typeface="Noto Sans" panose="020B0502040504020204" pitchFamily="34" charset="0"/>
+              <a:cs typeface="Noto Sans" panose="020B0502040504020204" pitchFamily="34" charset="0"/>
+            </a:endParaRPr>
+          </a:p>
+          <a:p>
+            <a:pPr marL="800100" lvl="1" indent="-342900" algn="just">
+              <a:buFont typeface="Arial" panose="020B0604020202020204" pitchFamily="34" charset="0"/>
+              <a:buChar char="•"/>
+            </a:pPr>
+            <a:endParaRPr lang="en-US" sz="1200" dirty="0">
               <a:latin typeface="Noto Sans" panose="020B0502040504020204" pitchFamily="34" charset="0"/>
               <a:ea typeface="Noto Sans" panose="020B0502040504020204" pitchFamily="34" charset="0"/>
               <a:cs typeface="Noto Sans" panose="020B0502040504020204" pitchFamily="34" charset="0"/>
@@ -4487,9 +5213,9 @@
           <a:p>
             <a:pPr marL="342900" indent="-342900" algn="just">
               <a:buFont typeface="+mj-lt"/>
-              <a:buAutoNum type="arabicParenR" startAt="4"/>
-            </a:pPr>
-            <a:endParaRPr lang="en-US" sz="1200">
+              <a:buAutoNum type="arabicParenR" startAt="5"/>
+            </a:pPr>
+            <a:endParaRPr lang="en-US" sz="1200" dirty="0">
               <a:latin typeface="Noto Sans" panose="020B0502040504020204" pitchFamily="34" charset="0"/>
               <a:ea typeface="Noto Sans" panose="020B0502040504020204" pitchFamily="34" charset="0"/>
               <a:cs typeface="Noto Sans" panose="020B0502040504020204" pitchFamily="34" charset="0"/>
@@ -4694,7 +5420,7 @@
 </p:sld>
 </file>
 
-<file path=ppt/slides/slide3.xml><?xml version="1.0" encoding="utf-8"?>
+<file path=ppt/slides/slide4.xml><?xml version="1.0" encoding="utf-8"?>
 <p:sld xmlns:a="http://schemas.openxmlformats.org/drawingml/2006/main" xmlns:r="http://schemas.openxmlformats.org/officeDocument/2006/relationships" xmlns:p="http://schemas.openxmlformats.org/presentationml/2006/main">
   <p:cSld>
     <p:spTree>
@@ -4741,10 +5467,10 @@
           <a:p>
             <a:pPr marL="342900" indent="-342900">
               <a:buFont typeface="+mj-lt"/>
-              <a:buAutoNum type="arabicParenR" startAt="4"/>
-            </a:pPr>
-            <a:r>
-              <a:rPr lang="en-US" sz="1400">
+              <a:buAutoNum type="arabicParenR" startAt="5"/>
+            </a:pPr>
+            <a:r>
+              <a:rPr lang="en-US" sz="1400" dirty="0">
                 <a:solidFill>
                   <a:schemeClr val="accent1"/>
                 </a:solidFill>
@@ -4757,19 +5483,19 @@
           </a:p>
           <a:p>
             <a:pPr lvl="1" algn="just"/>
-            <a:endParaRPr lang="en-US" sz="1200">
-              <a:latin typeface="Noto Sans" panose="020B0502040504020204" pitchFamily="34" charset="0"/>
-              <a:ea typeface="Noto Sans" panose="020B0502040504020204" pitchFamily="34" charset="0"/>
-              <a:cs typeface="Noto Sans" panose="020B0502040504020204" pitchFamily="34" charset="0"/>
-            </a:endParaRPr>
-          </a:p>
-          <a:p>
-            <a:pPr marL="800100" lvl="1" indent="-342900" algn="just">
-              <a:buFont typeface="Arial" panose="020B0604020202020204" pitchFamily="34" charset="0"/>
-              <a:buChar char="•"/>
-            </a:pPr>
-            <a:r>
-              <a:rPr lang="en-US" sz="1200">
+            <a:endParaRPr lang="en-US" sz="1200" dirty="0">
+              <a:latin typeface="Noto Sans" panose="020B0502040504020204" pitchFamily="34" charset="0"/>
+              <a:ea typeface="Noto Sans" panose="020B0502040504020204" pitchFamily="34" charset="0"/>
+              <a:cs typeface="Noto Sans" panose="020B0502040504020204" pitchFamily="34" charset="0"/>
+            </a:endParaRPr>
+          </a:p>
+          <a:p>
+            <a:pPr marL="800100" lvl="1" indent="-342900" algn="just">
+              <a:buFont typeface="Arial" panose="020B0604020202020204" pitchFamily="34" charset="0"/>
+              <a:buChar char="•"/>
+            </a:pPr>
+            <a:r>
+              <a:rPr lang="en-US" sz="1200" dirty="0">
                 <a:latin typeface="Noto Sans" panose="020B0502040504020204" pitchFamily="34" charset="0"/>
                 <a:ea typeface="Noto Sans" panose="020B0502040504020204" pitchFamily="34" charset="0"/>
                 <a:cs typeface="Noto Sans" panose="020B0502040504020204" pitchFamily="34" charset="0"/>
@@ -4782,360 +5508,360 @@
               <a:buFont typeface="Arial" panose="020B0604020202020204" pitchFamily="34" charset="0"/>
               <a:buChar char="•"/>
             </a:pPr>
-            <a:endParaRPr lang="en-US" sz="1200">
-              <a:latin typeface="Noto Sans" panose="020B0502040504020204" pitchFamily="34" charset="0"/>
-              <a:ea typeface="Noto Sans" panose="020B0502040504020204" pitchFamily="34" charset="0"/>
-              <a:cs typeface="Noto Sans" panose="020B0502040504020204" pitchFamily="34" charset="0"/>
-            </a:endParaRPr>
-          </a:p>
-          <a:p>
-            <a:pPr marL="800100" lvl="1" indent="-342900" algn="just">
-              <a:buFont typeface="Arial" panose="020B0604020202020204" pitchFamily="34" charset="0"/>
-              <a:buChar char="•"/>
-            </a:pPr>
-            <a:endParaRPr lang="en-US" sz="1200">
-              <a:latin typeface="Noto Sans" panose="020B0502040504020204" pitchFamily="34" charset="0"/>
-              <a:ea typeface="Noto Sans" panose="020B0502040504020204" pitchFamily="34" charset="0"/>
-              <a:cs typeface="Noto Sans" panose="020B0502040504020204" pitchFamily="34" charset="0"/>
-            </a:endParaRPr>
-          </a:p>
-          <a:p>
-            <a:pPr marL="800100" lvl="1" indent="-342900" algn="just">
-              <a:buFont typeface="Arial" panose="020B0604020202020204" pitchFamily="34" charset="0"/>
-              <a:buChar char="•"/>
-            </a:pPr>
-            <a:endParaRPr lang="en-US" sz="1200">
-              <a:latin typeface="Noto Sans" panose="020B0502040504020204" pitchFamily="34" charset="0"/>
-              <a:ea typeface="Noto Sans" panose="020B0502040504020204" pitchFamily="34" charset="0"/>
-              <a:cs typeface="Noto Sans" panose="020B0502040504020204" pitchFamily="34" charset="0"/>
-            </a:endParaRPr>
-          </a:p>
-          <a:p>
-            <a:pPr marL="800100" lvl="1" indent="-342900" algn="just">
-              <a:buFont typeface="Arial" panose="020B0604020202020204" pitchFamily="34" charset="0"/>
-              <a:buChar char="•"/>
-            </a:pPr>
-            <a:endParaRPr lang="en-US" sz="1200">
-              <a:latin typeface="Noto Sans" panose="020B0502040504020204" pitchFamily="34" charset="0"/>
-              <a:ea typeface="Noto Sans" panose="020B0502040504020204" pitchFamily="34" charset="0"/>
-              <a:cs typeface="Noto Sans" panose="020B0502040504020204" pitchFamily="34" charset="0"/>
-            </a:endParaRPr>
-          </a:p>
-          <a:p>
-            <a:pPr marL="800100" lvl="1" indent="-342900" algn="just">
-              <a:buFont typeface="Arial" panose="020B0604020202020204" pitchFamily="34" charset="0"/>
-              <a:buChar char="•"/>
-            </a:pPr>
-            <a:endParaRPr lang="en-US" sz="1200">
-              <a:latin typeface="Noto Sans" panose="020B0502040504020204" pitchFamily="34" charset="0"/>
-              <a:ea typeface="Noto Sans" panose="020B0502040504020204" pitchFamily="34" charset="0"/>
-              <a:cs typeface="Noto Sans" panose="020B0502040504020204" pitchFamily="34" charset="0"/>
-            </a:endParaRPr>
-          </a:p>
-          <a:p>
-            <a:pPr marL="800100" lvl="1" indent="-342900" algn="just">
-              <a:buFont typeface="Arial" panose="020B0604020202020204" pitchFamily="34" charset="0"/>
-              <a:buChar char="•"/>
-            </a:pPr>
-            <a:endParaRPr lang="en-US" sz="1200">
-              <a:latin typeface="Noto Sans" panose="020B0502040504020204" pitchFamily="34" charset="0"/>
-              <a:ea typeface="Noto Sans" panose="020B0502040504020204" pitchFamily="34" charset="0"/>
-              <a:cs typeface="Noto Sans" panose="020B0502040504020204" pitchFamily="34" charset="0"/>
-            </a:endParaRPr>
-          </a:p>
-          <a:p>
-            <a:pPr marL="800100" lvl="1" indent="-342900" algn="just">
-              <a:buFont typeface="Arial" panose="020B0604020202020204" pitchFamily="34" charset="0"/>
-              <a:buChar char="•"/>
-            </a:pPr>
-            <a:endParaRPr lang="en-US" sz="1200">
-              <a:latin typeface="Noto Sans" panose="020B0502040504020204" pitchFamily="34" charset="0"/>
-              <a:ea typeface="Noto Sans" panose="020B0502040504020204" pitchFamily="34" charset="0"/>
-              <a:cs typeface="Noto Sans" panose="020B0502040504020204" pitchFamily="34" charset="0"/>
-            </a:endParaRPr>
-          </a:p>
-          <a:p>
-            <a:pPr marL="800100" lvl="1" indent="-342900" algn="just">
-              <a:buFont typeface="Arial" panose="020B0604020202020204" pitchFamily="34" charset="0"/>
-              <a:buChar char="•"/>
-            </a:pPr>
-            <a:endParaRPr lang="en-US" sz="1200">
-              <a:latin typeface="Noto Sans" panose="020B0502040504020204" pitchFamily="34" charset="0"/>
-              <a:ea typeface="Noto Sans" panose="020B0502040504020204" pitchFamily="34" charset="0"/>
-              <a:cs typeface="Noto Sans" panose="020B0502040504020204" pitchFamily="34" charset="0"/>
-            </a:endParaRPr>
-          </a:p>
-          <a:p>
-            <a:pPr marL="800100" lvl="1" indent="-342900" algn="just">
-              <a:buFont typeface="Arial" panose="020B0604020202020204" pitchFamily="34" charset="0"/>
-              <a:buChar char="•"/>
-            </a:pPr>
-            <a:endParaRPr lang="en-US" sz="1200">
-              <a:latin typeface="Noto Sans" panose="020B0502040504020204" pitchFamily="34" charset="0"/>
-              <a:ea typeface="Noto Sans" panose="020B0502040504020204" pitchFamily="34" charset="0"/>
-              <a:cs typeface="Noto Sans" panose="020B0502040504020204" pitchFamily="34" charset="0"/>
-            </a:endParaRPr>
-          </a:p>
-          <a:p>
-            <a:pPr marL="800100" lvl="1" indent="-342900" algn="just">
-              <a:buFont typeface="Arial" panose="020B0604020202020204" pitchFamily="34" charset="0"/>
-              <a:buChar char="•"/>
-            </a:pPr>
-            <a:endParaRPr lang="en-US" sz="1200">
-              <a:latin typeface="Noto Sans" panose="020B0502040504020204" pitchFamily="34" charset="0"/>
-              <a:ea typeface="Noto Sans" panose="020B0502040504020204" pitchFamily="34" charset="0"/>
-              <a:cs typeface="Noto Sans" panose="020B0502040504020204" pitchFamily="34" charset="0"/>
-            </a:endParaRPr>
-          </a:p>
-          <a:p>
-            <a:pPr marL="800100" lvl="1" indent="-342900" algn="just">
-              <a:buFont typeface="Arial" panose="020B0604020202020204" pitchFamily="34" charset="0"/>
-              <a:buChar char="•"/>
-            </a:pPr>
-            <a:endParaRPr lang="en-US" sz="1200">
-              <a:latin typeface="Noto Sans" panose="020B0502040504020204" pitchFamily="34" charset="0"/>
-              <a:ea typeface="Noto Sans" panose="020B0502040504020204" pitchFamily="34" charset="0"/>
-              <a:cs typeface="Noto Sans" panose="020B0502040504020204" pitchFamily="34" charset="0"/>
-            </a:endParaRPr>
-          </a:p>
-          <a:p>
-            <a:pPr marL="800100" lvl="1" indent="-342900" algn="just">
-              <a:buFont typeface="Arial" panose="020B0604020202020204" pitchFamily="34" charset="0"/>
-              <a:buChar char="•"/>
-            </a:pPr>
-            <a:endParaRPr lang="en-US" sz="1200">
-              <a:latin typeface="Noto Sans" panose="020B0502040504020204" pitchFamily="34" charset="0"/>
-              <a:ea typeface="Noto Sans" panose="020B0502040504020204" pitchFamily="34" charset="0"/>
-              <a:cs typeface="Noto Sans" panose="020B0502040504020204" pitchFamily="34" charset="0"/>
-            </a:endParaRPr>
-          </a:p>
-          <a:p>
-            <a:pPr marL="800100" lvl="1" indent="-342900" algn="just">
-              <a:buFont typeface="Arial" panose="020B0604020202020204" pitchFamily="34" charset="0"/>
-              <a:buChar char="•"/>
-            </a:pPr>
-            <a:endParaRPr lang="en-US" sz="1200">
-              <a:latin typeface="Noto Sans" panose="020B0502040504020204" pitchFamily="34" charset="0"/>
-              <a:ea typeface="Noto Sans" panose="020B0502040504020204" pitchFamily="34" charset="0"/>
-              <a:cs typeface="Noto Sans" panose="020B0502040504020204" pitchFamily="34" charset="0"/>
-            </a:endParaRPr>
-          </a:p>
-          <a:p>
-            <a:pPr marL="800100" lvl="1" indent="-342900" algn="just">
-              <a:buFont typeface="Arial" panose="020B0604020202020204" pitchFamily="34" charset="0"/>
-              <a:buChar char="•"/>
-            </a:pPr>
-            <a:endParaRPr lang="en-US" sz="1200">
-              <a:latin typeface="Noto Sans" panose="020B0502040504020204" pitchFamily="34" charset="0"/>
-              <a:ea typeface="Noto Sans" panose="020B0502040504020204" pitchFamily="34" charset="0"/>
-              <a:cs typeface="Noto Sans" panose="020B0502040504020204" pitchFamily="34" charset="0"/>
-            </a:endParaRPr>
-          </a:p>
-          <a:p>
-            <a:pPr marL="800100" lvl="1" indent="-342900" algn="just">
-              <a:buFont typeface="Arial" panose="020B0604020202020204" pitchFamily="34" charset="0"/>
-              <a:buChar char="•"/>
-            </a:pPr>
-            <a:endParaRPr lang="en-US" sz="1200">
-              <a:latin typeface="Noto Sans" panose="020B0502040504020204" pitchFamily="34" charset="0"/>
-              <a:ea typeface="Noto Sans" panose="020B0502040504020204" pitchFamily="34" charset="0"/>
-              <a:cs typeface="Noto Sans" panose="020B0502040504020204" pitchFamily="34" charset="0"/>
-            </a:endParaRPr>
-          </a:p>
-          <a:p>
-            <a:pPr marL="800100" lvl="1" indent="-342900" algn="just">
-              <a:buFont typeface="Arial" panose="020B0604020202020204" pitchFamily="34" charset="0"/>
-              <a:buChar char="•"/>
-            </a:pPr>
-            <a:endParaRPr lang="en-US" sz="1200">
-              <a:latin typeface="Noto Sans" panose="020B0502040504020204" pitchFamily="34" charset="0"/>
-              <a:ea typeface="Noto Sans" panose="020B0502040504020204" pitchFamily="34" charset="0"/>
-              <a:cs typeface="Noto Sans" panose="020B0502040504020204" pitchFamily="34" charset="0"/>
-            </a:endParaRPr>
-          </a:p>
-          <a:p>
-            <a:pPr marL="800100" lvl="1" indent="-342900" algn="just">
-              <a:buFont typeface="Arial" panose="020B0604020202020204" pitchFamily="34" charset="0"/>
-              <a:buChar char="•"/>
-            </a:pPr>
-            <a:endParaRPr lang="en-US" sz="1200">
-              <a:latin typeface="Noto Sans" panose="020B0502040504020204" pitchFamily="34" charset="0"/>
-              <a:ea typeface="Noto Sans" panose="020B0502040504020204" pitchFamily="34" charset="0"/>
-              <a:cs typeface="Noto Sans" panose="020B0502040504020204" pitchFamily="34" charset="0"/>
-            </a:endParaRPr>
-          </a:p>
-          <a:p>
-            <a:pPr marL="800100" lvl="1" indent="-342900" algn="just">
-              <a:buFont typeface="Arial" panose="020B0604020202020204" pitchFamily="34" charset="0"/>
-              <a:buChar char="•"/>
-            </a:pPr>
-            <a:endParaRPr lang="en-US" sz="1200">
-              <a:latin typeface="Noto Sans" panose="020B0502040504020204" pitchFamily="34" charset="0"/>
-              <a:ea typeface="Noto Sans" panose="020B0502040504020204" pitchFamily="34" charset="0"/>
-              <a:cs typeface="Noto Sans" panose="020B0502040504020204" pitchFamily="34" charset="0"/>
-            </a:endParaRPr>
-          </a:p>
-          <a:p>
-            <a:pPr marL="800100" lvl="1" indent="-342900" algn="just">
-              <a:buFont typeface="Arial" panose="020B0604020202020204" pitchFamily="34" charset="0"/>
-              <a:buChar char="•"/>
-            </a:pPr>
-            <a:endParaRPr lang="en-US" sz="1200">
-              <a:latin typeface="Noto Sans" panose="020B0502040504020204" pitchFamily="34" charset="0"/>
-              <a:ea typeface="Noto Sans" panose="020B0502040504020204" pitchFamily="34" charset="0"/>
-              <a:cs typeface="Noto Sans" panose="020B0502040504020204" pitchFamily="34" charset="0"/>
-            </a:endParaRPr>
-          </a:p>
-          <a:p>
-            <a:pPr marL="800100" lvl="1" indent="-342900" algn="just">
-              <a:buFont typeface="Arial" panose="020B0604020202020204" pitchFamily="34" charset="0"/>
-              <a:buChar char="•"/>
-            </a:pPr>
-            <a:endParaRPr lang="en-US" sz="1200">
-              <a:latin typeface="Noto Sans" panose="020B0502040504020204" pitchFamily="34" charset="0"/>
-              <a:ea typeface="Noto Sans" panose="020B0502040504020204" pitchFamily="34" charset="0"/>
-              <a:cs typeface="Noto Sans" panose="020B0502040504020204" pitchFamily="34" charset="0"/>
-            </a:endParaRPr>
-          </a:p>
-          <a:p>
-            <a:pPr marL="800100" lvl="1" indent="-342900" algn="just">
-              <a:buFont typeface="Arial" panose="020B0604020202020204" pitchFamily="34" charset="0"/>
-              <a:buChar char="•"/>
-            </a:pPr>
-            <a:endParaRPr lang="en-US" sz="1200">
-              <a:latin typeface="Noto Sans" panose="020B0502040504020204" pitchFamily="34" charset="0"/>
-              <a:ea typeface="Noto Sans" panose="020B0502040504020204" pitchFamily="34" charset="0"/>
-              <a:cs typeface="Noto Sans" panose="020B0502040504020204" pitchFamily="34" charset="0"/>
-            </a:endParaRPr>
-          </a:p>
-          <a:p>
-            <a:pPr marL="800100" lvl="1" indent="-342900" algn="just">
-              <a:buFont typeface="Arial" panose="020B0604020202020204" pitchFamily="34" charset="0"/>
-              <a:buChar char="•"/>
-            </a:pPr>
-            <a:endParaRPr lang="en-US" sz="1200">
-              <a:latin typeface="Noto Sans" panose="020B0502040504020204" pitchFamily="34" charset="0"/>
-              <a:ea typeface="Noto Sans" panose="020B0502040504020204" pitchFamily="34" charset="0"/>
-              <a:cs typeface="Noto Sans" panose="020B0502040504020204" pitchFamily="34" charset="0"/>
-            </a:endParaRPr>
-          </a:p>
-          <a:p>
-            <a:pPr marL="800100" lvl="1" indent="-342900" algn="just">
-              <a:buFont typeface="Arial" panose="020B0604020202020204" pitchFamily="34" charset="0"/>
-              <a:buChar char="•"/>
-            </a:pPr>
-            <a:endParaRPr lang="en-US" sz="1200">
-              <a:latin typeface="Noto Sans" panose="020B0502040504020204" pitchFamily="34" charset="0"/>
-              <a:ea typeface="Noto Sans" panose="020B0502040504020204" pitchFamily="34" charset="0"/>
-              <a:cs typeface="Noto Sans" panose="020B0502040504020204" pitchFamily="34" charset="0"/>
-            </a:endParaRPr>
-          </a:p>
-          <a:p>
-            <a:pPr marL="800100" lvl="1" indent="-342900" algn="just">
-              <a:buFont typeface="Arial" panose="020B0604020202020204" pitchFamily="34" charset="0"/>
-              <a:buChar char="•"/>
-            </a:pPr>
-            <a:endParaRPr lang="en-US" sz="1200">
-              <a:latin typeface="Noto Sans" panose="020B0502040504020204" pitchFamily="34" charset="0"/>
-              <a:ea typeface="Noto Sans" panose="020B0502040504020204" pitchFamily="34" charset="0"/>
-              <a:cs typeface="Noto Sans" panose="020B0502040504020204" pitchFamily="34" charset="0"/>
-            </a:endParaRPr>
-          </a:p>
-          <a:p>
-            <a:pPr marL="800100" lvl="1" indent="-342900" algn="just">
-              <a:buFont typeface="Arial" panose="020B0604020202020204" pitchFamily="34" charset="0"/>
-              <a:buChar char="•"/>
-            </a:pPr>
-            <a:endParaRPr lang="en-US" sz="1200">
-              <a:latin typeface="Noto Sans" panose="020B0502040504020204" pitchFamily="34" charset="0"/>
-              <a:ea typeface="Noto Sans" panose="020B0502040504020204" pitchFamily="34" charset="0"/>
-              <a:cs typeface="Noto Sans" panose="020B0502040504020204" pitchFamily="34" charset="0"/>
-            </a:endParaRPr>
-          </a:p>
-          <a:p>
-            <a:pPr marL="800100" lvl="1" indent="-342900" algn="just">
-              <a:buFont typeface="Arial" panose="020B0604020202020204" pitchFamily="34" charset="0"/>
-              <a:buChar char="•"/>
-            </a:pPr>
-            <a:endParaRPr lang="en-US" sz="1200">
-              <a:latin typeface="Noto Sans" panose="020B0502040504020204" pitchFamily="34" charset="0"/>
-              <a:ea typeface="Noto Sans" panose="020B0502040504020204" pitchFamily="34" charset="0"/>
-              <a:cs typeface="Noto Sans" panose="020B0502040504020204" pitchFamily="34" charset="0"/>
-            </a:endParaRPr>
-          </a:p>
-          <a:p>
-            <a:pPr marL="800100" lvl="1" indent="-342900" algn="just">
-              <a:buFont typeface="Arial" panose="020B0604020202020204" pitchFamily="34" charset="0"/>
-              <a:buChar char="•"/>
-            </a:pPr>
-            <a:endParaRPr lang="en-US" sz="1200">
-              <a:latin typeface="Noto Sans" panose="020B0502040504020204" pitchFamily="34" charset="0"/>
-              <a:ea typeface="Noto Sans" panose="020B0502040504020204" pitchFamily="34" charset="0"/>
-              <a:cs typeface="Noto Sans" panose="020B0502040504020204" pitchFamily="34" charset="0"/>
-            </a:endParaRPr>
-          </a:p>
-          <a:p>
-            <a:pPr marL="800100" lvl="1" indent="-342900" algn="just">
-              <a:buFont typeface="Arial" panose="020B0604020202020204" pitchFamily="34" charset="0"/>
-              <a:buChar char="•"/>
-            </a:pPr>
-            <a:endParaRPr lang="en-US" sz="1200">
-              <a:latin typeface="Noto Sans" panose="020B0502040504020204" pitchFamily="34" charset="0"/>
-              <a:ea typeface="Noto Sans" panose="020B0502040504020204" pitchFamily="34" charset="0"/>
-              <a:cs typeface="Noto Sans" panose="020B0502040504020204" pitchFamily="34" charset="0"/>
-            </a:endParaRPr>
-          </a:p>
-          <a:p>
-            <a:pPr marL="800100" lvl="1" indent="-342900" algn="just">
-              <a:buFont typeface="Arial" panose="020B0604020202020204" pitchFamily="34" charset="0"/>
-              <a:buChar char="•"/>
-            </a:pPr>
-            <a:endParaRPr lang="en-US" sz="1200">
-              <a:latin typeface="Noto Sans" panose="020B0502040504020204" pitchFamily="34" charset="0"/>
-              <a:ea typeface="Noto Sans" panose="020B0502040504020204" pitchFamily="34" charset="0"/>
-              <a:cs typeface="Noto Sans" panose="020B0502040504020204" pitchFamily="34" charset="0"/>
-            </a:endParaRPr>
-          </a:p>
-          <a:p>
-            <a:pPr marL="800100" lvl="1" indent="-342900" algn="just">
-              <a:buFont typeface="Arial" panose="020B0604020202020204" pitchFamily="34" charset="0"/>
-              <a:buChar char="•"/>
-            </a:pPr>
-            <a:endParaRPr lang="en-US" sz="1200">
-              <a:latin typeface="Noto Sans" panose="020B0502040504020204" pitchFamily="34" charset="0"/>
-              <a:ea typeface="Noto Sans" panose="020B0502040504020204" pitchFamily="34" charset="0"/>
-              <a:cs typeface="Noto Sans" panose="020B0502040504020204" pitchFamily="34" charset="0"/>
-            </a:endParaRPr>
-          </a:p>
-          <a:p>
-            <a:pPr marL="800100" lvl="1" indent="-342900" algn="just">
-              <a:buFont typeface="Arial" panose="020B0604020202020204" pitchFamily="34" charset="0"/>
-              <a:buChar char="•"/>
-            </a:pPr>
-            <a:endParaRPr lang="en-US" sz="1200">
-              <a:latin typeface="Noto Sans" panose="020B0502040504020204" pitchFamily="34" charset="0"/>
-              <a:ea typeface="Noto Sans" panose="020B0502040504020204" pitchFamily="34" charset="0"/>
-              <a:cs typeface="Noto Sans" panose="020B0502040504020204" pitchFamily="34" charset="0"/>
-            </a:endParaRPr>
-          </a:p>
-          <a:p>
-            <a:pPr marL="800100" lvl="1" indent="-342900" algn="just">
-              <a:buFont typeface="Arial" panose="020B0604020202020204" pitchFamily="34" charset="0"/>
-              <a:buChar char="•"/>
-            </a:pPr>
-            <a:endParaRPr lang="en-US" sz="1200">
-              <a:latin typeface="Noto Sans" panose="020B0502040504020204" pitchFamily="34" charset="0"/>
-              <a:ea typeface="Noto Sans" panose="020B0502040504020204" pitchFamily="34" charset="0"/>
-              <a:cs typeface="Noto Sans" panose="020B0502040504020204" pitchFamily="34" charset="0"/>
-            </a:endParaRPr>
-          </a:p>
-          <a:p>
-            <a:pPr marL="800100" lvl="1" indent="-342900" algn="just">
-              <a:buFont typeface="Arial" panose="020B0604020202020204" pitchFamily="34" charset="0"/>
-              <a:buChar char="•"/>
-            </a:pPr>
-            <a:r>
-              <a:rPr lang="en-US" sz="1200">
+            <a:endParaRPr lang="en-US" sz="1200" dirty="0">
+              <a:latin typeface="Noto Sans" panose="020B0502040504020204" pitchFamily="34" charset="0"/>
+              <a:ea typeface="Noto Sans" panose="020B0502040504020204" pitchFamily="34" charset="0"/>
+              <a:cs typeface="Noto Sans" panose="020B0502040504020204" pitchFamily="34" charset="0"/>
+            </a:endParaRPr>
+          </a:p>
+          <a:p>
+            <a:pPr marL="800100" lvl="1" indent="-342900" algn="just">
+              <a:buFont typeface="Arial" panose="020B0604020202020204" pitchFamily="34" charset="0"/>
+              <a:buChar char="•"/>
+            </a:pPr>
+            <a:endParaRPr lang="en-US" sz="1200" dirty="0">
+              <a:latin typeface="Noto Sans" panose="020B0502040504020204" pitchFamily="34" charset="0"/>
+              <a:ea typeface="Noto Sans" panose="020B0502040504020204" pitchFamily="34" charset="0"/>
+              <a:cs typeface="Noto Sans" panose="020B0502040504020204" pitchFamily="34" charset="0"/>
+            </a:endParaRPr>
+          </a:p>
+          <a:p>
+            <a:pPr marL="800100" lvl="1" indent="-342900" algn="just">
+              <a:buFont typeface="Arial" panose="020B0604020202020204" pitchFamily="34" charset="0"/>
+              <a:buChar char="•"/>
+            </a:pPr>
+            <a:endParaRPr lang="en-US" sz="1200" dirty="0">
+              <a:latin typeface="Noto Sans" panose="020B0502040504020204" pitchFamily="34" charset="0"/>
+              <a:ea typeface="Noto Sans" panose="020B0502040504020204" pitchFamily="34" charset="0"/>
+              <a:cs typeface="Noto Sans" panose="020B0502040504020204" pitchFamily="34" charset="0"/>
+            </a:endParaRPr>
+          </a:p>
+          <a:p>
+            <a:pPr marL="800100" lvl="1" indent="-342900" algn="just">
+              <a:buFont typeface="Arial" panose="020B0604020202020204" pitchFamily="34" charset="0"/>
+              <a:buChar char="•"/>
+            </a:pPr>
+            <a:endParaRPr lang="en-US" sz="1200" dirty="0">
+              <a:latin typeface="Noto Sans" panose="020B0502040504020204" pitchFamily="34" charset="0"/>
+              <a:ea typeface="Noto Sans" panose="020B0502040504020204" pitchFamily="34" charset="0"/>
+              <a:cs typeface="Noto Sans" panose="020B0502040504020204" pitchFamily="34" charset="0"/>
+            </a:endParaRPr>
+          </a:p>
+          <a:p>
+            <a:pPr marL="800100" lvl="1" indent="-342900" algn="just">
+              <a:buFont typeface="Arial" panose="020B0604020202020204" pitchFamily="34" charset="0"/>
+              <a:buChar char="•"/>
+            </a:pPr>
+            <a:endParaRPr lang="en-US" sz="1200" dirty="0">
+              <a:latin typeface="Noto Sans" panose="020B0502040504020204" pitchFamily="34" charset="0"/>
+              <a:ea typeface="Noto Sans" panose="020B0502040504020204" pitchFamily="34" charset="0"/>
+              <a:cs typeface="Noto Sans" panose="020B0502040504020204" pitchFamily="34" charset="0"/>
+            </a:endParaRPr>
+          </a:p>
+          <a:p>
+            <a:pPr marL="800100" lvl="1" indent="-342900" algn="just">
+              <a:buFont typeface="Arial" panose="020B0604020202020204" pitchFamily="34" charset="0"/>
+              <a:buChar char="•"/>
+            </a:pPr>
+            <a:endParaRPr lang="en-US" sz="1200" dirty="0">
+              <a:latin typeface="Noto Sans" panose="020B0502040504020204" pitchFamily="34" charset="0"/>
+              <a:ea typeface="Noto Sans" panose="020B0502040504020204" pitchFamily="34" charset="0"/>
+              <a:cs typeface="Noto Sans" panose="020B0502040504020204" pitchFamily="34" charset="0"/>
+            </a:endParaRPr>
+          </a:p>
+          <a:p>
+            <a:pPr marL="800100" lvl="1" indent="-342900" algn="just">
+              <a:buFont typeface="Arial" panose="020B0604020202020204" pitchFamily="34" charset="0"/>
+              <a:buChar char="•"/>
+            </a:pPr>
+            <a:endParaRPr lang="en-US" sz="1200" dirty="0">
+              <a:latin typeface="Noto Sans" panose="020B0502040504020204" pitchFamily="34" charset="0"/>
+              <a:ea typeface="Noto Sans" panose="020B0502040504020204" pitchFamily="34" charset="0"/>
+              <a:cs typeface="Noto Sans" panose="020B0502040504020204" pitchFamily="34" charset="0"/>
+            </a:endParaRPr>
+          </a:p>
+          <a:p>
+            <a:pPr marL="800100" lvl="1" indent="-342900" algn="just">
+              <a:buFont typeface="Arial" panose="020B0604020202020204" pitchFamily="34" charset="0"/>
+              <a:buChar char="•"/>
+            </a:pPr>
+            <a:endParaRPr lang="en-US" sz="1200" dirty="0">
+              <a:latin typeface="Noto Sans" panose="020B0502040504020204" pitchFamily="34" charset="0"/>
+              <a:ea typeface="Noto Sans" panose="020B0502040504020204" pitchFamily="34" charset="0"/>
+              <a:cs typeface="Noto Sans" panose="020B0502040504020204" pitchFamily="34" charset="0"/>
+            </a:endParaRPr>
+          </a:p>
+          <a:p>
+            <a:pPr marL="800100" lvl="1" indent="-342900" algn="just">
+              <a:buFont typeface="Arial" panose="020B0604020202020204" pitchFamily="34" charset="0"/>
+              <a:buChar char="•"/>
+            </a:pPr>
+            <a:endParaRPr lang="en-US" sz="1200" dirty="0">
+              <a:latin typeface="Noto Sans" panose="020B0502040504020204" pitchFamily="34" charset="0"/>
+              <a:ea typeface="Noto Sans" panose="020B0502040504020204" pitchFamily="34" charset="0"/>
+              <a:cs typeface="Noto Sans" panose="020B0502040504020204" pitchFamily="34" charset="0"/>
+            </a:endParaRPr>
+          </a:p>
+          <a:p>
+            <a:pPr marL="800100" lvl="1" indent="-342900" algn="just">
+              <a:buFont typeface="Arial" panose="020B0604020202020204" pitchFamily="34" charset="0"/>
+              <a:buChar char="•"/>
+            </a:pPr>
+            <a:endParaRPr lang="en-US" sz="1200" dirty="0">
+              <a:latin typeface="Noto Sans" panose="020B0502040504020204" pitchFamily="34" charset="0"/>
+              <a:ea typeface="Noto Sans" panose="020B0502040504020204" pitchFamily="34" charset="0"/>
+              <a:cs typeface="Noto Sans" panose="020B0502040504020204" pitchFamily="34" charset="0"/>
+            </a:endParaRPr>
+          </a:p>
+          <a:p>
+            <a:pPr marL="800100" lvl="1" indent="-342900" algn="just">
+              <a:buFont typeface="Arial" panose="020B0604020202020204" pitchFamily="34" charset="0"/>
+              <a:buChar char="•"/>
+            </a:pPr>
+            <a:endParaRPr lang="en-US" sz="1200" dirty="0">
+              <a:latin typeface="Noto Sans" panose="020B0502040504020204" pitchFamily="34" charset="0"/>
+              <a:ea typeface="Noto Sans" panose="020B0502040504020204" pitchFamily="34" charset="0"/>
+              <a:cs typeface="Noto Sans" panose="020B0502040504020204" pitchFamily="34" charset="0"/>
+            </a:endParaRPr>
+          </a:p>
+          <a:p>
+            <a:pPr marL="800100" lvl="1" indent="-342900" algn="just">
+              <a:buFont typeface="Arial" panose="020B0604020202020204" pitchFamily="34" charset="0"/>
+              <a:buChar char="•"/>
+            </a:pPr>
+            <a:endParaRPr lang="en-US" sz="1200" dirty="0">
+              <a:latin typeface="Noto Sans" panose="020B0502040504020204" pitchFamily="34" charset="0"/>
+              <a:ea typeface="Noto Sans" panose="020B0502040504020204" pitchFamily="34" charset="0"/>
+              <a:cs typeface="Noto Sans" panose="020B0502040504020204" pitchFamily="34" charset="0"/>
+            </a:endParaRPr>
+          </a:p>
+          <a:p>
+            <a:pPr marL="800100" lvl="1" indent="-342900" algn="just">
+              <a:buFont typeface="Arial" panose="020B0604020202020204" pitchFamily="34" charset="0"/>
+              <a:buChar char="•"/>
+            </a:pPr>
+            <a:endParaRPr lang="en-US" sz="1200" dirty="0">
+              <a:latin typeface="Noto Sans" panose="020B0502040504020204" pitchFamily="34" charset="0"/>
+              <a:ea typeface="Noto Sans" panose="020B0502040504020204" pitchFamily="34" charset="0"/>
+              <a:cs typeface="Noto Sans" panose="020B0502040504020204" pitchFamily="34" charset="0"/>
+            </a:endParaRPr>
+          </a:p>
+          <a:p>
+            <a:pPr marL="800100" lvl="1" indent="-342900" algn="just">
+              <a:buFont typeface="Arial" panose="020B0604020202020204" pitchFamily="34" charset="0"/>
+              <a:buChar char="•"/>
+            </a:pPr>
+            <a:endParaRPr lang="en-US" sz="1200" dirty="0">
+              <a:latin typeface="Noto Sans" panose="020B0502040504020204" pitchFamily="34" charset="0"/>
+              <a:ea typeface="Noto Sans" panose="020B0502040504020204" pitchFamily="34" charset="0"/>
+              <a:cs typeface="Noto Sans" panose="020B0502040504020204" pitchFamily="34" charset="0"/>
+            </a:endParaRPr>
+          </a:p>
+          <a:p>
+            <a:pPr marL="800100" lvl="1" indent="-342900" algn="just">
+              <a:buFont typeface="Arial" panose="020B0604020202020204" pitchFamily="34" charset="0"/>
+              <a:buChar char="•"/>
+            </a:pPr>
+            <a:endParaRPr lang="en-US" sz="1200" dirty="0">
+              <a:latin typeface="Noto Sans" panose="020B0502040504020204" pitchFamily="34" charset="0"/>
+              <a:ea typeface="Noto Sans" panose="020B0502040504020204" pitchFamily="34" charset="0"/>
+              <a:cs typeface="Noto Sans" panose="020B0502040504020204" pitchFamily="34" charset="0"/>
+            </a:endParaRPr>
+          </a:p>
+          <a:p>
+            <a:pPr marL="800100" lvl="1" indent="-342900" algn="just">
+              <a:buFont typeface="Arial" panose="020B0604020202020204" pitchFamily="34" charset="0"/>
+              <a:buChar char="•"/>
+            </a:pPr>
+            <a:endParaRPr lang="en-US" sz="1200" dirty="0">
+              <a:latin typeface="Noto Sans" panose="020B0502040504020204" pitchFamily="34" charset="0"/>
+              <a:ea typeface="Noto Sans" panose="020B0502040504020204" pitchFamily="34" charset="0"/>
+              <a:cs typeface="Noto Sans" panose="020B0502040504020204" pitchFamily="34" charset="0"/>
+            </a:endParaRPr>
+          </a:p>
+          <a:p>
+            <a:pPr marL="800100" lvl="1" indent="-342900" algn="just">
+              <a:buFont typeface="Arial" panose="020B0604020202020204" pitchFamily="34" charset="0"/>
+              <a:buChar char="•"/>
+            </a:pPr>
+            <a:endParaRPr lang="en-US" sz="1200" dirty="0">
+              <a:latin typeface="Noto Sans" panose="020B0502040504020204" pitchFamily="34" charset="0"/>
+              <a:ea typeface="Noto Sans" panose="020B0502040504020204" pitchFamily="34" charset="0"/>
+              <a:cs typeface="Noto Sans" panose="020B0502040504020204" pitchFamily="34" charset="0"/>
+            </a:endParaRPr>
+          </a:p>
+          <a:p>
+            <a:pPr marL="800100" lvl="1" indent="-342900" algn="just">
+              <a:buFont typeface="Arial" panose="020B0604020202020204" pitchFamily="34" charset="0"/>
+              <a:buChar char="•"/>
+            </a:pPr>
+            <a:endParaRPr lang="en-US" sz="1200" dirty="0">
+              <a:latin typeface="Noto Sans" panose="020B0502040504020204" pitchFamily="34" charset="0"/>
+              <a:ea typeface="Noto Sans" panose="020B0502040504020204" pitchFamily="34" charset="0"/>
+              <a:cs typeface="Noto Sans" panose="020B0502040504020204" pitchFamily="34" charset="0"/>
+            </a:endParaRPr>
+          </a:p>
+          <a:p>
+            <a:pPr marL="800100" lvl="1" indent="-342900" algn="just">
+              <a:buFont typeface="Arial" panose="020B0604020202020204" pitchFamily="34" charset="0"/>
+              <a:buChar char="•"/>
+            </a:pPr>
+            <a:endParaRPr lang="en-US" sz="1200" dirty="0">
+              <a:latin typeface="Noto Sans" panose="020B0502040504020204" pitchFamily="34" charset="0"/>
+              <a:ea typeface="Noto Sans" panose="020B0502040504020204" pitchFamily="34" charset="0"/>
+              <a:cs typeface="Noto Sans" panose="020B0502040504020204" pitchFamily="34" charset="0"/>
+            </a:endParaRPr>
+          </a:p>
+          <a:p>
+            <a:pPr marL="800100" lvl="1" indent="-342900" algn="just">
+              <a:buFont typeface="Arial" panose="020B0604020202020204" pitchFamily="34" charset="0"/>
+              <a:buChar char="•"/>
+            </a:pPr>
+            <a:endParaRPr lang="en-US" sz="1200" dirty="0">
+              <a:latin typeface="Noto Sans" panose="020B0502040504020204" pitchFamily="34" charset="0"/>
+              <a:ea typeface="Noto Sans" panose="020B0502040504020204" pitchFamily="34" charset="0"/>
+              <a:cs typeface="Noto Sans" panose="020B0502040504020204" pitchFamily="34" charset="0"/>
+            </a:endParaRPr>
+          </a:p>
+          <a:p>
+            <a:pPr marL="800100" lvl="1" indent="-342900" algn="just">
+              <a:buFont typeface="Arial" panose="020B0604020202020204" pitchFamily="34" charset="0"/>
+              <a:buChar char="•"/>
+            </a:pPr>
+            <a:endParaRPr lang="en-US" sz="1200" dirty="0">
+              <a:latin typeface="Noto Sans" panose="020B0502040504020204" pitchFamily="34" charset="0"/>
+              <a:ea typeface="Noto Sans" panose="020B0502040504020204" pitchFamily="34" charset="0"/>
+              <a:cs typeface="Noto Sans" panose="020B0502040504020204" pitchFamily="34" charset="0"/>
+            </a:endParaRPr>
+          </a:p>
+          <a:p>
+            <a:pPr marL="800100" lvl="1" indent="-342900" algn="just">
+              <a:buFont typeface="Arial" panose="020B0604020202020204" pitchFamily="34" charset="0"/>
+              <a:buChar char="•"/>
+            </a:pPr>
+            <a:endParaRPr lang="en-US" sz="1200" dirty="0">
+              <a:latin typeface="Noto Sans" panose="020B0502040504020204" pitchFamily="34" charset="0"/>
+              <a:ea typeface="Noto Sans" panose="020B0502040504020204" pitchFamily="34" charset="0"/>
+              <a:cs typeface="Noto Sans" panose="020B0502040504020204" pitchFamily="34" charset="0"/>
+            </a:endParaRPr>
+          </a:p>
+          <a:p>
+            <a:pPr marL="800100" lvl="1" indent="-342900" algn="just">
+              <a:buFont typeface="Arial" panose="020B0604020202020204" pitchFamily="34" charset="0"/>
+              <a:buChar char="•"/>
+            </a:pPr>
+            <a:endParaRPr lang="en-US" sz="1200" dirty="0">
+              <a:latin typeface="Noto Sans" panose="020B0502040504020204" pitchFamily="34" charset="0"/>
+              <a:ea typeface="Noto Sans" panose="020B0502040504020204" pitchFamily="34" charset="0"/>
+              <a:cs typeface="Noto Sans" panose="020B0502040504020204" pitchFamily="34" charset="0"/>
+            </a:endParaRPr>
+          </a:p>
+          <a:p>
+            <a:pPr marL="800100" lvl="1" indent="-342900" algn="just">
+              <a:buFont typeface="Arial" panose="020B0604020202020204" pitchFamily="34" charset="0"/>
+              <a:buChar char="•"/>
+            </a:pPr>
+            <a:endParaRPr lang="en-US" sz="1200" dirty="0">
+              <a:latin typeface="Noto Sans" panose="020B0502040504020204" pitchFamily="34" charset="0"/>
+              <a:ea typeface="Noto Sans" panose="020B0502040504020204" pitchFamily="34" charset="0"/>
+              <a:cs typeface="Noto Sans" panose="020B0502040504020204" pitchFamily="34" charset="0"/>
+            </a:endParaRPr>
+          </a:p>
+          <a:p>
+            <a:pPr marL="800100" lvl="1" indent="-342900" algn="just">
+              <a:buFont typeface="Arial" panose="020B0604020202020204" pitchFamily="34" charset="0"/>
+              <a:buChar char="•"/>
+            </a:pPr>
+            <a:endParaRPr lang="en-US" sz="1200" dirty="0">
+              <a:latin typeface="Noto Sans" panose="020B0502040504020204" pitchFamily="34" charset="0"/>
+              <a:ea typeface="Noto Sans" panose="020B0502040504020204" pitchFamily="34" charset="0"/>
+              <a:cs typeface="Noto Sans" panose="020B0502040504020204" pitchFamily="34" charset="0"/>
+            </a:endParaRPr>
+          </a:p>
+          <a:p>
+            <a:pPr marL="800100" lvl="1" indent="-342900" algn="just">
+              <a:buFont typeface="Arial" panose="020B0604020202020204" pitchFamily="34" charset="0"/>
+              <a:buChar char="•"/>
+            </a:pPr>
+            <a:endParaRPr lang="en-US" sz="1200" dirty="0">
+              <a:latin typeface="Noto Sans" panose="020B0502040504020204" pitchFamily="34" charset="0"/>
+              <a:ea typeface="Noto Sans" panose="020B0502040504020204" pitchFamily="34" charset="0"/>
+              <a:cs typeface="Noto Sans" panose="020B0502040504020204" pitchFamily="34" charset="0"/>
+            </a:endParaRPr>
+          </a:p>
+          <a:p>
+            <a:pPr marL="800100" lvl="1" indent="-342900" algn="just">
+              <a:buFont typeface="Arial" panose="020B0604020202020204" pitchFamily="34" charset="0"/>
+              <a:buChar char="•"/>
+            </a:pPr>
+            <a:endParaRPr lang="en-US" sz="1200" dirty="0">
+              <a:latin typeface="Noto Sans" panose="020B0502040504020204" pitchFamily="34" charset="0"/>
+              <a:ea typeface="Noto Sans" panose="020B0502040504020204" pitchFamily="34" charset="0"/>
+              <a:cs typeface="Noto Sans" panose="020B0502040504020204" pitchFamily="34" charset="0"/>
+            </a:endParaRPr>
+          </a:p>
+          <a:p>
+            <a:pPr marL="800100" lvl="1" indent="-342900" algn="just">
+              <a:buFont typeface="Arial" panose="020B0604020202020204" pitchFamily="34" charset="0"/>
+              <a:buChar char="•"/>
+            </a:pPr>
+            <a:endParaRPr lang="en-US" sz="1200" dirty="0">
+              <a:latin typeface="Noto Sans" panose="020B0502040504020204" pitchFamily="34" charset="0"/>
+              <a:ea typeface="Noto Sans" panose="020B0502040504020204" pitchFamily="34" charset="0"/>
+              <a:cs typeface="Noto Sans" panose="020B0502040504020204" pitchFamily="34" charset="0"/>
+            </a:endParaRPr>
+          </a:p>
+          <a:p>
+            <a:pPr marL="800100" lvl="1" indent="-342900" algn="just">
+              <a:buFont typeface="Arial" panose="020B0604020202020204" pitchFamily="34" charset="0"/>
+              <a:buChar char="•"/>
+            </a:pPr>
+            <a:endParaRPr lang="en-US" sz="1200" dirty="0">
+              <a:latin typeface="Noto Sans" panose="020B0502040504020204" pitchFamily="34" charset="0"/>
+              <a:ea typeface="Noto Sans" panose="020B0502040504020204" pitchFamily="34" charset="0"/>
+              <a:cs typeface="Noto Sans" panose="020B0502040504020204" pitchFamily="34" charset="0"/>
+            </a:endParaRPr>
+          </a:p>
+          <a:p>
+            <a:pPr marL="800100" lvl="1" indent="-342900" algn="just">
+              <a:buFont typeface="Arial" panose="020B0604020202020204" pitchFamily="34" charset="0"/>
+              <a:buChar char="•"/>
+            </a:pPr>
+            <a:endParaRPr lang="en-US" sz="1200" dirty="0">
+              <a:latin typeface="Noto Sans" panose="020B0502040504020204" pitchFamily="34" charset="0"/>
+              <a:ea typeface="Noto Sans" panose="020B0502040504020204" pitchFamily="34" charset="0"/>
+              <a:cs typeface="Noto Sans" panose="020B0502040504020204" pitchFamily="34" charset="0"/>
+            </a:endParaRPr>
+          </a:p>
+          <a:p>
+            <a:pPr marL="800100" lvl="1" indent="-342900" algn="just">
+              <a:buFont typeface="Arial" panose="020B0604020202020204" pitchFamily="34" charset="0"/>
+              <a:buChar char="•"/>
+            </a:pPr>
+            <a:endParaRPr lang="en-US" sz="1200" dirty="0">
+              <a:latin typeface="Noto Sans" panose="020B0502040504020204" pitchFamily="34" charset="0"/>
+              <a:ea typeface="Noto Sans" panose="020B0502040504020204" pitchFamily="34" charset="0"/>
+              <a:cs typeface="Noto Sans" panose="020B0502040504020204" pitchFamily="34" charset="0"/>
+            </a:endParaRPr>
+          </a:p>
+          <a:p>
+            <a:pPr marL="800100" lvl="1" indent="-342900" algn="just">
+              <a:buFont typeface="Arial" panose="020B0604020202020204" pitchFamily="34" charset="0"/>
+              <a:buChar char="•"/>
+            </a:pPr>
+            <a:endParaRPr lang="en-US" sz="1200" dirty="0">
+              <a:latin typeface="Noto Sans" panose="020B0502040504020204" pitchFamily="34" charset="0"/>
+              <a:ea typeface="Noto Sans" panose="020B0502040504020204" pitchFamily="34" charset="0"/>
+              <a:cs typeface="Noto Sans" panose="020B0502040504020204" pitchFamily="34" charset="0"/>
+            </a:endParaRPr>
+          </a:p>
+          <a:p>
+            <a:pPr marL="800100" lvl="1" indent="-342900" algn="just">
+              <a:buFont typeface="Arial" panose="020B0604020202020204" pitchFamily="34" charset="0"/>
+              <a:buChar char="•"/>
+            </a:pPr>
+            <a:r>
+              <a:rPr lang="en-US" sz="1200" dirty="0">
                 <a:latin typeface="Noto Sans" panose="020B0502040504020204" pitchFamily="34" charset="0"/>
                 <a:ea typeface="Noto Sans" panose="020B0502040504020204" pitchFamily="34" charset="0"/>
                 <a:cs typeface="Noto Sans" panose="020B0502040504020204" pitchFamily="34" charset="0"/>
@@ -5148,40 +5874,40 @@
               <a:buFont typeface="Arial" panose="020B0604020202020204" pitchFamily="34" charset="0"/>
               <a:buChar char="•"/>
             </a:pPr>
-            <a:endParaRPr lang="en-US" sz="1200">
-              <a:latin typeface="Noto Sans" panose="020B0502040504020204" pitchFamily="34" charset="0"/>
-              <a:ea typeface="Noto Sans" panose="020B0502040504020204" pitchFamily="34" charset="0"/>
-              <a:cs typeface="Noto Sans" panose="020B0502040504020204" pitchFamily="34" charset="0"/>
-            </a:endParaRPr>
-          </a:p>
-          <a:p>
-            <a:pPr marL="800100" lvl="1" indent="-342900" algn="just">
-              <a:buFont typeface="Arial" panose="020B0604020202020204" pitchFamily="34" charset="0"/>
-              <a:buChar char="•"/>
-            </a:pPr>
-            <a:endParaRPr lang="en-US" sz="1200">
-              <a:latin typeface="Noto Sans" panose="020B0502040504020204" pitchFamily="34" charset="0"/>
-              <a:ea typeface="Noto Sans" panose="020B0502040504020204" pitchFamily="34" charset="0"/>
-              <a:cs typeface="Noto Sans" panose="020B0502040504020204" pitchFamily="34" charset="0"/>
-            </a:endParaRPr>
-          </a:p>
-          <a:p>
-            <a:pPr marL="800100" lvl="1" indent="-342900" algn="just">
-              <a:buFont typeface="Arial" panose="020B0604020202020204" pitchFamily="34" charset="0"/>
-              <a:buChar char="•"/>
-            </a:pPr>
-            <a:endParaRPr lang="en-US" sz="1200">
-              <a:latin typeface="Noto Sans" panose="020B0502040504020204" pitchFamily="34" charset="0"/>
-              <a:ea typeface="Noto Sans" panose="020B0502040504020204" pitchFamily="34" charset="0"/>
-              <a:cs typeface="Noto Sans" panose="020B0502040504020204" pitchFamily="34" charset="0"/>
-            </a:endParaRPr>
-          </a:p>
-          <a:p>
-            <a:pPr marL="800100" lvl="1" indent="-342900" algn="just">
-              <a:buFont typeface="Arial" panose="020B0604020202020204" pitchFamily="34" charset="0"/>
-              <a:buChar char="•"/>
-            </a:pPr>
-            <a:endParaRPr lang="en-US" sz="1200">
+            <a:endParaRPr lang="en-US" sz="1200" dirty="0">
+              <a:latin typeface="Noto Sans" panose="020B0502040504020204" pitchFamily="34" charset="0"/>
+              <a:ea typeface="Noto Sans" panose="020B0502040504020204" pitchFamily="34" charset="0"/>
+              <a:cs typeface="Noto Sans" panose="020B0502040504020204" pitchFamily="34" charset="0"/>
+            </a:endParaRPr>
+          </a:p>
+          <a:p>
+            <a:pPr marL="800100" lvl="1" indent="-342900" algn="just">
+              <a:buFont typeface="Arial" panose="020B0604020202020204" pitchFamily="34" charset="0"/>
+              <a:buChar char="•"/>
+            </a:pPr>
+            <a:endParaRPr lang="en-US" sz="1200" dirty="0">
+              <a:latin typeface="Noto Sans" panose="020B0502040504020204" pitchFamily="34" charset="0"/>
+              <a:ea typeface="Noto Sans" panose="020B0502040504020204" pitchFamily="34" charset="0"/>
+              <a:cs typeface="Noto Sans" panose="020B0502040504020204" pitchFamily="34" charset="0"/>
+            </a:endParaRPr>
+          </a:p>
+          <a:p>
+            <a:pPr marL="800100" lvl="1" indent="-342900" algn="just">
+              <a:buFont typeface="Arial" panose="020B0604020202020204" pitchFamily="34" charset="0"/>
+              <a:buChar char="•"/>
+            </a:pPr>
+            <a:endParaRPr lang="en-US" sz="1200" dirty="0">
+              <a:latin typeface="Noto Sans" panose="020B0502040504020204" pitchFamily="34" charset="0"/>
+              <a:ea typeface="Noto Sans" panose="020B0502040504020204" pitchFamily="34" charset="0"/>
+              <a:cs typeface="Noto Sans" panose="020B0502040504020204" pitchFamily="34" charset="0"/>
+            </a:endParaRPr>
+          </a:p>
+          <a:p>
+            <a:pPr marL="800100" lvl="1" indent="-342900" algn="just">
+              <a:buFont typeface="Arial" panose="020B0604020202020204" pitchFamily="34" charset="0"/>
+              <a:buChar char="•"/>
+            </a:pPr>
+            <a:endParaRPr lang="en-US" sz="1200" dirty="0">
               <a:latin typeface="Noto Sans" panose="020B0502040504020204" pitchFamily="34" charset="0"/>
               <a:ea typeface="Noto Sans" panose="020B0502040504020204" pitchFamily="34" charset="0"/>
               <a:cs typeface="Noto Sans" panose="020B0502040504020204" pitchFamily="34" charset="0"/>
@@ -5190,9 +5916,9 @@
           <a:p>
             <a:pPr marL="342900" indent="-342900" algn="just">
               <a:buFont typeface="+mj-lt"/>
-              <a:buAutoNum type="arabicParenR" startAt="4"/>
-            </a:pPr>
-            <a:endParaRPr lang="en-US" sz="1200">
+              <a:buAutoNum type="arabicParenR" startAt="5"/>
+            </a:pPr>
+            <a:endParaRPr lang="en-US" sz="1200" dirty="0">
               <a:latin typeface="Noto Sans" panose="020B0502040504020204" pitchFamily="34" charset="0"/>
               <a:ea typeface="Noto Sans" panose="020B0502040504020204" pitchFamily="34" charset="0"/>
               <a:cs typeface="Noto Sans" panose="020B0502040504020204" pitchFamily="34" charset="0"/>
@@ -5607,7 +6333,7 @@
 </p:sld>
 </file>
 
-<file path=ppt/slides/slide4.xml><?xml version="1.0" encoding="utf-8"?>
+<file path=ppt/slides/slide5.xml><?xml version="1.0" encoding="utf-8"?>
 <p:sld xmlns:a="http://schemas.openxmlformats.org/drawingml/2006/main" xmlns:r="http://schemas.openxmlformats.org/officeDocument/2006/relationships" xmlns:p="http://schemas.openxmlformats.org/presentationml/2006/main">
   <p:cSld>
     <p:spTree>
@@ -5654,10 +6380,10 @@
           <a:p>
             <a:pPr marL="342900" indent="-342900">
               <a:buFont typeface="+mj-lt"/>
-              <a:buAutoNum type="arabicParenR" startAt="5"/>
-            </a:pPr>
-            <a:r>
-              <a:rPr lang="en-US" sz="1400">
+              <a:buAutoNum type="arabicParenR" startAt="6"/>
+            </a:pPr>
+            <a:r>
+              <a:rPr lang="en-US" sz="1400" dirty="0">
                 <a:solidFill>
                   <a:schemeClr val="accent1"/>
                 </a:solidFill>
@@ -5670,238 +6396,286 @@
           </a:p>
           <a:p>
             <a:pPr lvl="1" algn="just"/>
-            <a:endParaRPr lang="en-US" sz="1200">
-              <a:latin typeface="Noto Sans" panose="020B0502040504020204" pitchFamily="34" charset="0"/>
-              <a:ea typeface="Noto Sans" panose="020B0502040504020204" pitchFamily="34" charset="0"/>
-              <a:cs typeface="Noto Sans" panose="020B0502040504020204" pitchFamily="34" charset="0"/>
-            </a:endParaRPr>
-          </a:p>
-          <a:p>
-            <a:pPr marL="800100" lvl="1" indent="-342900" algn="just">
-              <a:buFont typeface="Arial" panose="020B0604020202020204" pitchFamily="34" charset="0"/>
-              <a:buChar char="•"/>
-            </a:pPr>
-            <a:r>
-              <a:rPr lang="en-US" sz="1200">
+            <a:endParaRPr lang="en-US" sz="1200" dirty="0">
+              <a:latin typeface="Noto Sans" panose="020B0502040504020204" pitchFamily="34" charset="0"/>
+              <a:ea typeface="Noto Sans" panose="020B0502040504020204" pitchFamily="34" charset="0"/>
+              <a:cs typeface="Noto Sans" panose="020B0502040504020204" pitchFamily="34" charset="0"/>
+            </a:endParaRPr>
+          </a:p>
+          <a:p>
+            <a:pPr marL="800100" lvl="1" indent="-342900" algn="just">
+              <a:buFont typeface="Arial" panose="020B0604020202020204" pitchFamily="34" charset="0"/>
+              <a:buChar char="•"/>
+            </a:pPr>
+            <a:r>
+              <a:rPr lang="en-US" sz="1200" dirty="0">
                 <a:latin typeface="Noto Sans" panose="020B0502040504020204" pitchFamily="34" charset="0"/>
                 <a:ea typeface="Noto Sans" panose="020B0502040504020204" pitchFamily="34" charset="0"/>
                 <a:cs typeface="Noto Sans" panose="020B0502040504020204" pitchFamily="34" charset="0"/>
               </a:rPr>
-              <a:t>For this project, I have decided to use Supabase as a database, It is an open-source PostgreSQL database, and there is an option to locally host the database but due to the performance requirements, it would not be cost-effective to run the database ourselves at a small scale so I have decided to use supabase's free tier</a:t>
-            </a:r>
-          </a:p>
-          <a:p>
-            <a:pPr marL="800100" lvl="1" indent="-342900" algn="just">
-              <a:buFont typeface="Arial" panose="020B0604020202020204" pitchFamily="34" charset="0"/>
-              <a:buChar char="•"/>
-            </a:pPr>
-            <a:endParaRPr lang="en-US" sz="1200">
-              <a:latin typeface="Noto Sans" panose="020B0502040504020204" pitchFamily="34" charset="0"/>
-              <a:ea typeface="Noto Sans" panose="020B0502040504020204" pitchFamily="34" charset="0"/>
-              <a:cs typeface="Noto Sans" panose="020B0502040504020204" pitchFamily="34" charset="0"/>
-            </a:endParaRPr>
-          </a:p>
-          <a:p>
-            <a:pPr marL="800100" lvl="1" indent="-342900" algn="just">
-              <a:buFont typeface="Arial" panose="020B0604020202020204" pitchFamily="34" charset="0"/>
-              <a:buChar char="•"/>
-            </a:pPr>
-            <a:r>
-              <a:rPr lang="en-US" sz="1200">
+              <a:t>For this project, I have decided to use </a:t>
+            </a:r>
+            <a:r>
+              <a:rPr lang="en-US" sz="1200" dirty="0" err="1">
                 <a:latin typeface="Noto Sans" panose="020B0502040504020204" pitchFamily="34" charset="0"/>
                 <a:ea typeface="Noto Sans" panose="020B0502040504020204" pitchFamily="34" charset="0"/>
                 <a:cs typeface="Noto Sans" panose="020B0502040504020204" pitchFamily="34" charset="0"/>
               </a:rPr>
-              <a:t>Create an account with Supabase, create a new project </a:t>
-            </a:r>
-          </a:p>
-          <a:p>
-            <a:pPr marL="800100" lvl="1" indent="-342900" algn="just">
-              <a:buFont typeface="Arial" panose="020B0604020202020204" pitchFamily="34" charset="0"/>
-              <a:buChar char="•"/>
-            </a:pPr>
-            <a:endParaRPr lang="en-US" sz="1200">
-              <a:latin typeface="Noto Sans" panose="020B0502040504020204" pitchFamily="34" charset="0"/>
-              <a:ea typeface="Noto Sans" panose="020B0502040504020204" pitchFamily="34" charset="0"/>
-              <a:cs typeface="Noto Sans" panose="020B0502040504020204" pitchFamily="34" charset="0"/>
-            </a:endParaRPr>
-          </a:p>
-          <a:p>
-            <a:pPr marL="800100" lvl="1" indent="-342900" algn="just">
-              <a:buFont typeface="Arial" panose="020B0604020202020204" pitchFamily="34" charset="0"/>
-              <a:buChar char="•"/>
-            </a:pPr>
-            <a:endParaRPr lang="en-US" sz="1200">
-              <a:latin typeface="Noto Sans" panose="020B0502040504020204" pitchFamily="34" charset="0"/>
-              <a:ea typeface="Noto Sans" panose="020B0502040504020204" pitchFamily="34" charset="0"/>
-              <a:cs typeface="Noto Sans" panose="020B0502040504020204" pitchFamily="34" charset="0"/>
-            </a:endParaRPr>
-          </a:p>
-          <a:p>
-            <a:pPr marL="800100" lvl="1" indent="-342900" algn="just">
-              <a:buFont typeface="Arial" panose="020B0604020202020204" pitchFamily="34" charset="0"/>
-              <a:buChar char="•"/>
-            </a:pPr>
-            <a:endParaRPr lang="en-US" sz="1200">
-              <a:latin typeface="Noto Sans" panose="020B0502040504020204" pitchFamily="34" charset="0"/>
-              <a:ea typeface="Noto Sans" panose="020B0502040504020204" pitchFamily="34" charset="0"/>
-              <a:cs typeface="Noto Sans" panose="020B0502040504020204" pitchFamily="34" charset="0"/>
-            </a:endParaRPr>
-          </a:p>
-          <a:p>
-            <a:pPr marL="800100" lvl="1" indent="-342900" algn="just">
-              <a:buFont typeface="Arial" panose="020B0604020202020204" pitchFamily="34" charset="0"/>
-              <a:buChar char="•"/>
-            </a:pPr>
-            <a:endParaRPr lang="en-US" sz="1200">
-              <a:latin typeface="Noto Sans" panose="020B0502040504020204" pitchFamily="34" charset="0"/>
-              <a:ea typeface="Noto Sans" panose="020B0502040504020204" pitchFamily="34" charset="0"/>
-              <a:cs typeface="Noto Sans" panose="020B0502040504020204" pitchFamily="34" charset="0"/>
-            </a:endParaRPr>
-          </a:p>
-          <a:p>
-            <a:pPr marL="800100" lvl="1" indent="-342900" algn="just">
-              <a:buFont typeface="Arial" panose="020B0604020202020204" pitchFamily="34" charset="0"/>
-              <a:buChar char="•"/>
-            </a:pPr>
-            <a:endParaRPr lang="en-US" sz="1200">
-              <a:latin typeface="Noto Sans" panose="020B0502040504020204" pitchFamily="34" charset="0"/>
-              <a:ea typeface="Noto Sans" panose="020B0502040504020204" pitchFamily="34" charset="0"/>
-              <a:cs typeface="Noto Sans" panose="020B0502040504020204" pitchFamily="34" charset="0"/>
-            </a:endParaRPr>
-          </a:p>
-          <a:p>
-            <a:pPr marL="800100" lvl="1" indent="-342900" algn="just">
-              <a:buFont typeface="Arial" panose="020B0604020202020204" pitchFamily="34" charset="0"/>
-              <a:buChar char="•"/>
-            </a:pPr>
-            <a:endParaRPr lang="en-US" sz="1200">
-              <a:latin typeface="Noto Sans" panose="020B0502040504020204" pitchFamily="34" charset="0"/>
-              <a:ea typeface="Noto Sans" panose="020B0502040504020204" pitchFamily="34" charset="0"/>
-              <a:cs typeface="Noto Sans" panose="020B0502040504020204" pitchFamily="34" charset="0"/>
-            </a:endParaRPr>
-          </a:p>
-          <a:p>
-            <a:pPr marL="800100" lvl="1" indent="-342900" algn="just">
-              <a:buFont typeface="Arial" panose="020B0604020202020204" pitchFamily="34" charset="0"/>
-              <a:buChar char="•"/>
-            </a:pPr>
-            <a:endParaRPr lang="en-US" sz="1200">
-              <a:latin typeface="Noto Sans" panose="020B0502040504020204" pitchFamily="34" charset="0"/>
-              <a:ea typeface="Noto Sans" panose="020B0502040504020204" pitchFamily="34" charset="0"/>
-              <a:cs typeface="Noto Sans" panose="020B0502040504020204" pitchFamily="34" charset="0"/>
-            </a:endParaRPr>
-          </a:p>
-          <a:p>
-            <a:pPr marL="800100" lvl="1" indent="-342900" algn="just">
-              <a:buFont typeface="Arial" panose="020B0604020202020204" pitchFamily="34" charset="0"/>
-              <a:buChar char="•"/>
-            </a:pPr>
-            <a:endParaRPr lang="en-US" sz="1200">
-              <a:latin typeface="Noto Sans" panose="020B0502040504020204" pitchFamily="34" charset="0"/>
-              <a:ea typeface="Noto Sans" panose="020B0502040504020204" pitchFamily="34" charset="0"/>
-              <a:cs typeface="Noto Sans" panose="020B0502040504020204" pitchFamily="34" charset="0"/>
-            </a:endParaRPr>
-          </a:p>
-          <a:p>
-            <a:pPr marL="800100" lvl="1" indent="-342900" algn="just">
-              <a:buFont typeface="Arial" panose="020B0604020202020204" pitchFamily="34" charset="0"/>
-              <a:buChar char="•"/>
-            </a:pPr>
-            <a:endParaRPr lang="en-US" sz="1200">
-              <a:latin typeface="Noto Sans" panose="020B0502040504020204" pitchFamily="34" charset="0"/>
-              <a:ea typeface="Noto Sans" panose="020B0502040504020204" pitchFamily="34" charset="0"/>
-              <a:cs typeface="Noto Sans" panose="020B0502040504020204" pitchFamily="34" charset="0"/>
-            </a:endParaRPr>
-          </a:p>
-          <a:p>
-            <a:pPr marL="800100" lvl="1" indent="-342900" algn="just">
-              <a:buFont typeface="Arial" panose="020B0604020202020204" pitchFamily="34" charset="0"/>
-              <a:buChar char="•"/>
-            </a:pPr>
-            <a:endParaRPr lang="en-US" sz="1200">
-              <a:latin typeface="Noto Sans" panose="020B0502040504020204" pitchFamily="34" charset="0"/>
-              <a:ea typeface="Noto Sans" panose="020B0502040504020204" pitchFamily="34" charset="0"/>
-              <a:cs typeface="Noto Sans" panose="020B0502040504020204" pitchFamily="34" charset="0"/>
-            </a:endParaRPr>
-          </a:p>
-          <a:p>
-            <a:pPr marL="800100" lvl="1" indent="-342900" algn="just">
-              <a:buFont typeface="Arial" panose="020B0604020202020204" pitchFamily="34" charset="0"/>
-              <a:buChar char="•"/>
-            </a:pPr>
-            <a:endParaRPr lang="en-US" sz="1200">
-              <a:latin typeface="Noto Sans" panose="020B0502040504020204" pitchFamily="34" charset="0"/>
-              <a:ea typeface="Noto Sans" panose="020B0502040504020204" pitchFamily="34" charset="0"/>
-              <a:cs typeface="Noto Sans" panose="020B0502040504020204" pitchFamily="34" charset="0"/>
-            </a:endParaRPr>
-          </a:p>
-          <a:p>
-            <a:pPr marL="800100" lvl="1" indent="-342900" algn="just">
-              <a:buFont typeface="Arial" panose="020B0604020202020204" pitchFamily="34" charset="0"/>
-              <a:buChar char="•"/>
-            </a:pPr>
-            <a:endParaRPr lang="en-US" sz="1200">
-              <a:latin typeface="Noto Sans" panose="020B0502040504020204" pitchFamily="34" charset="0"/>
-              <a:ea typeface="Noto Sans" panose="020B0502040504020204" pitchFamily="34" charset="0"/>
-              <a:cs typeface="Noto Sans" panose="020B0502040504020204" pitchFamily="34" charset="0"/>
-            </a:endParaRPr>
-          </a:p>
-          <a:p>
-            <a:pPr marL="800100" lvl="1" indent="-342900" algn="just">
-              <a:buFont typeface="Arial" panose="020B0604020202020204" pitchFamily="34" charset="0"/>
-              <a:buChar char="•"/>
-            </a:pPr>
-            <a:endParaRPr lang="en-US" sz="1200">
-              <a:latin typeface="Noto Sans" panose="020B0502040504020204" pitchFamily="34" charset="0"/>
-              <a:ea typeface="Noto Sans" panose="020B0502040504020204" pitchFamily="34" charset="0"/>
-              <a:cs typeface="Noto Sans" panose="020B0502040504020204" pitchFamily="34" charset="0"/>
-            </a:endParaRPr>
-          </a:p>
-          <a:p>
-            <a:pPr marL="800100" lvl="1" indent="-342900" algn="just">
-              <a:buFont typeface="Arial" panose="020B0604020202020204" pitchFamily="34" charset="0"/>
-              <a:buChar char="•"/>
-            </a:pPr>
-            <a:endParaRPr lang="en-US" sz="1200">
-              <a:latin typeface="Noto Sans" panose="020B0502040504020204" pitchFamily="34" charset="0"/>
-              <a:ea typeface="Noto Sans" panose="020B0502040504020204" pitchFamily="34" charset="0"/>
-              <a:cs typeface="Noto Sans" panose="020B0502040504020204" pitchFamily="34" charset="0"/>
-            </a:endParaRPr>
-          </a:p>
-          <a:p>
-            <a:pPr marL="800100" lvl="1" indent="-342900" algn="just">
-              <a:buFont typeface="Arial" panose="020B0604020202020204" pitchFamily="34" charset="0"/>
-              <a:buChar char="•"/>
-            </a:pPr>
-            <a:endParaRPr lang="en-US" sz="1200">
-              <a:latin typeface="Noto Sans" panose="020B0502040504020204" pitchFamily="34" charset="0"/>
-              <a:ea typeface="Noto Sans" panose="020B0502040504020204" pitchFamily="34" charset="0"/>
-              <a:cs typeface="Noto Sans" panose="020B0502040504020204" pitchFamily="34" charset="0"/>
-            </a:endParaRPr>
-          </a:p>
-          <a:p>
-            <a:pPr marL="800100" lvl="1" indent="-342900" algn="just">
-              <a:buFont typeface="Arial" panose="020B0604020202020204" pitchFamily="34" charset="0"/>
-              <a:buChar char="•"/>
-            </a:pPr>
-            <a:endParaRPr lang="en-US" sz="1200">
-              <a:latin typeface="Noto Sans" panose="020B0502040504020204" pitchFamily="34" charset="0"/>
-              <a:ea typeface="Noto Sans" panose="020B0502040504020204" pitchFamily="34" charset="0"/>
-              <a:cs typeface="Noto Sans" panose="020B0502040504020204" pitchFamily="34" charset="0"/>
-            </a:endParaRPr>
-          </a:p>
-          <a:p>
-            <a:pPr marL="800100" lvl="1" indent="-342900" algn="just">
-              <a:buFont typeface="Arial" panose="020B0604020202020204" pitchFamily="34" charset="0"/>
-              <a:buChar char="•"/>
-            </a:pPr>
-            <a:r>
-              <a:rPr lang="en-US" sz="1200">
+              <a:t>Supabase</a:t>
+            </a:r>
+            <a:r>
+              <a:rPr lang="en-US" sz="1200" dirty="0">
                 <a:latin typeface="Noto Sans" panose="020B0502040504020204" pitchFamily="34" charset="0"/>
                 <a:ea typeface="Noto Sans" panose="020B0502040504020204" pitchFamily="34" charset="0"/>
                 <a:cs typeface="Noto Sans" panose="020B0502040504020204" pitchFamily="34" charset="0"/>
               </a:rPr>
+              <a:t> as a database, It is an open-source PostgreSQL database, and there is an option to locally host the database but due to the performance requirements, it would not be cost-effective to run the database ourselves at a small scale so I have decided to use </a:t>
+            </a:r>
+            <a:r>
+              <a:rPr lang="en-US" sz="1200" dirty="0" err="1">
+                <a:latin typeface="Noto Sans" panose="020B0502040504020204" pitchFamily="34" charset="0"/>
+                <a:ea typeface="Noto Sans" panose="020B0502040504020204" pitchFamily="34" charset="0"/>
+                <a:cs typeface="Noto Sans" panose="020B0502040504020204" pitchFamily="34" charset="0"/>
+              </a:rPr>
+              <a:t>supabase's</a:t>
+            </a:r>
+            <a:r>
+              <a:rPr lang="en-US" sz="1200" dirty="0">
+                <a:latin typeface="Noto Sans" panose="020B0502040504020204" pitchFamily="34" charset="0"/>
+                <a:ea typeface="Noto Sans" panose="020B0502040504020204" pitchFamily="34" charset="0"/>
+                <a:cs typeface="Noto Sans" panose="020B0502040504020204" pitchFamily="34" charset="0"/>
+              </a:rPr>
+              <a:t> free tier</a:t>
+            </a:r>
+          </a:p>
+          <a:p>
+            <a:pPr marL="800100" lvl="1" indent="-342900" algn="just">
+              <a:buFont typeface="Arial" panose="020B0604020202020204" pitchFamily="34" charset="0"/>
+              <a:buChar char="•"/>
+            </a:pPr>
+            <a:endParaRPr lang="en-US" sz="1200" dirty="0">
+              <a:latin typeface="Noto Sans" panose="020B0502040504020204" pitchFamily="34" charset="0"/>
+              <a:ea typeface="Noto Sans" panose="020B0502040504020204" pitchFamily="34" charset="0"/>
+              <a:cs typeface="Noto Sans" panose="020B0502040504020204" pitchFamily="34" charset="0"/>
+            </a:endParaRPr>
+          </a:p>
+          <a:p>
+            <a:pPr marL="800100" lvl="1" indent="-342900" algn="just">
+              <a:buFont typeface="Arial" panose="020B0604020202020204" pitchFamily="34" charset="0"/>
+              <a:buChar char="•"/>
+            </a:pPr>
+            <a:r>
+              <a:rPr lang="en-US" sz="1200" dirty="0">
+                <a:latin typeface="Noto Sans" panose="020B0502040504020204" pitchFamily="34" charset="0"/>
+                <a:ea typeface="Noto Sans" panose="020B0502040504020204" pitchFamily="34" charset="0"/>
+                <a:cs typeface="Noto Sans" panose="020B0502040504020204" pitchFamily="34" charset="0"/>
+              </a:rPr>
+              <a:t>Create an account with </a:t>
+            </a:r>
+            <a:r>
+              <a:rPr lang="en-US" sz="1200" dirty="0" err="1">
+                <a:latin typeface="Noto Sans" panose="020B0502040504020204" pitchFamily="34" charset="0"/>
+                <a:ea typeface="Noto Sans" panose="020B0502040504020204" pitchFamily="34" charset="0"/>
+                <a:cs typeface="Noto Sans" panose="020B0502040504020204" pitchFamily="34" charset="0"/>
+              </a:rPr>
+              <a:t>Supabase</a:t>
+            </a:r>
+            <a:r>
+              <a:rPr lang="en-US" sz="1200" dirty="0">
+                <a:latin typeface="Noto Sans" panose="020B0502040504020204" pitchFamily="34" charset="0"/>
+                <a:ea typeface="Noto Sans" panose="020B0502040504020204" pitchFamily="34" charset="0"/>
+                <a:cs typeface="Noto Sans" panose="020B0502040504020204" pitchFamily="34" charset="0"/>
+              </a:rPr>
+              <a:t>, create a new project </a:t>
+            </a:r>
+          </a:p>
+          <a:p>
+            <a:pPr marL="800100" lvl="1" indent="-342900" algn="just">
+              <a:buFont typeface="Arial" panose="020B0604020202020204" pitchFamily="34" charset="0"/>
+              <a:buChar char="•"/>
+            </a:pPr>
+            <a:endParaRPr lang="en-US" sz="1200" dirty="0">
+              <a:latin typeface="Noto Sans" panose="020B0502040504020204" pitchFamily="34" charset="0"/>
+              <a:ea typeface="Noto Sans" panose="020B0502040504020204" pitchFamily="34" charset="0"/>
+              <a:cs typeface="Noto Sans" panose="020B0502040504020204" pitchFamily="34" charset="0"/>
+            </a:endParaRPr>
+          </a:p>
+          <a:p>
+            <a:pPr marL="800100" lvl="1" indent="-342900" algn="just">
+              <a:buFont typeface="Arial" panose="020B0604020202020204" pitchFamily="34" charset="0"/>
+              <a:buChar char="•"/>
+            </a:pPr>
+            <a:endParaRPr lang="en-US" sz="1200" dirty="0">
+              <a:latin typeface="Noto Sans" panose="020B0502040504020204" pitchFamily="34" charset="0"/>
+              <a:ea typeface="Noto Sans" panose="020B0502040504020204" pitchFamily="34" charset="0"/>
+              <a:cs typeface="Noto Sans" panose="020B0502040504020204" pitchFamily="34" charset="0"/>
+            </a:endParaRPr>
+          </a:p>
+          <a:p>
+            <a:pPr marL="800100" lvl="1" indent="-342900" algn="just">
+              <a:buFont typeface="Arial" panose="020B0604020202020204" pitchFamily="34" charset="0"/>
+              <a:buChar char="•"/>
+            </a:pPr>
+            <a:endParaRPr lang="en-US" sz="1200" dirty="0">
+              <a:latin typeface="Noto Sans" panose="020B0502040504020204" pitchFamily="34" charset="0"/>
+              <a:ea typeface="Noto Sans" panose="020B0502040504020204" pitchFamily="34" charset="0"/>
+              <a:cs typeface="Noto Sans" panose="020B0502040504020204" pitchFamily="34" charset="0"/>
+            </a:endParaRPr>
+          </a:p>
+          <a:p>
+            <a:pPr marL="800100" lvl="1" indent="-342900" algn="just">
+              <a:buFont typeface="Arial" panose="020B0604020202020204" pitchFamily="34" charset="0"/>
+              <a:buChar char="•"/>
+            </a:pPr>
+            <a:endParaRPr lang="en-US" sz="1200" dirty="0">
+              <a:latin typeface="Noto Sans" panose="020B0502040504020204" pitchFamily="34" charset="0"/>
+              <a:ea typeface="Noto Sans" panose="020B0502040504020204" pitchFamily="34" charset="0"/>
+              <a:cs typeface="Noto Sans" panose="020B0502040504020204" pitchFamily="34" charset="0"/>
+            </a:endParaRPr>
+          </a:p>
+          <a:p>
+            <a:pPr marL="800100" lvl="1" indent="-342900" algn="just">
+              <a:buFont typeface="Arial" panose="020B0604020202020204" pitchFamily="34" charset="0"/>
+              <a:buChar char="•"/>
+            </a:pPr>
+            <a:endParaRPr lang="en-US" sz="1200" dirty="0">
+              <a:latin typeface="Noto Sans" panose="020B0502040504020204" pitchFamily="34" charset="0"/>
+              <a:ea typeface="Noto Sans" panose="020B0502040504020204" pitchFamily="34" charset="0"/>
+              <a:cs typeface="Noto Sans" panose="020B0502040504020204" pitchFamily="34" charset="0"/>
+            </a:endParaRPr>
+          </a:p>
+          <a:p>
+            <a:pPr marL="800100" lvl="1" indent="-342900" algn="just">
+              <a:buFont typeface="Arial" panose="020B0604020202020204" pitchFamily="34" charset="0"/>
+              <a:buChar char="•"/>
+            </a:pPr>
+            <a:endParaRPr lang="en-US" sz="1200" dirty="0">
+              <a:latin typeface="Noto Sans" panose="020B0502040504020204" pitchFamily="34" charset="0"/>
+              <a:ea typeface="Noto Sans" panose="020B0502040504020204" pitchFamily="34" charset="0"/>
+              <a:cs typeface="Noto Sans" panose="020B0502040504020204" pitchFamily="34" charset="0"/>
+            </a:endParaRPr>
+          </a:p>
+          <a:p>
+            <a:pPr marL="800100" lvl="1" indent="-342900" algn="just">
+              <a:buFont typeface="Arial" panose="020B0604020202020204" pitchFamily="34" charset="0"/>
+              <a:buChar char="•"/>
+            </a:pPr>
+            <a:endParaRPr lang="en-US" sz="1200" dirty="0">
+              <a:latin typeface="Noto Sans" panose="020B0502040504020204" pitchFamily="34" charset="0"/>
+              <a:ea typeface="Noto Sans" panose="020B0502040504020204" pitchFamily="34" charset="0"/>
+              <a:cs typeface="Noto Sans" panose="020B0502040504020204" pitchFamily="34" charset="0"/>
+            </a:endParaRPr>
+          </a:p>
+          <a:p>
+            <a:pPr marL="800100" lvl="1" indent="-342900" algn="just">
+              <a:buFont typeface="Arial" panose="020B0604020202020204" pitchFamily="34" charset="0"/>
+              <a:buChar char="•"/>
+            </a:pPr>
+            <a:endParaRPr lang="en-US" sz="1200" dirty="0">
+              <a:latin typeface="Noto Sans" panose="020B0502040504020204" pitchFamily="34" charset="0"/>
+              <a:ea typeface="Noto Sans" panose="020B0502040504020204" pitchFamily="34" charset="0"/>
+              <a:cs typeface="Noto Sans" panose="020B0502040504020204" pitchFamily="34" charset="0"/>
+            </a:endParaRPr>
+          </a:p>
+          <a:p>
+            <a:pPr marL="800100" lvl="1" indent="-342900" algn="just">
+              <a:buFont typeface="Arial" panose="020B0604020202020204" pitchFamily="34" charset="0"/>
+              <a:buChar char="•"/>
+            </a:pPr>
+            <a:endParaRPr lang="en-US" sz="1200" dirty="0">
+              <a:latin typeface="Noto Sans" panose="020B0502040504020204" pitchFamily="34" charset="0"/>
+              <a:ea typeface="Noto Sans" panose="020B0502040504020204" pitchFamily="34" charset="0"/>
+              <a:cs typeface="Noto Sans" panose="020B0502040504020204" pitchFamily="34" charset="0"/>
+            </a:endParaRPr>
+          </a:p>
+          <a:p>
+            <a:pPr marL="800100" lvl="1" indent="-342900" algn="just">
+              <a:buFont typeface="Arial" panose="020B0604020202020204" pitchFamily="34" charset="0"/>
+              <a:buChar char="•"/>
+            </a:pPr>
+            <a:endParaRPr lang="en-US" sz="1200" dirty="0">
+              <a:latin typeface="Noto Sans" panose="020B0502040504020204" pitchFamily="34" charset="0"/>
+              <a:ea typeface="Noto Sans" panose="020B0502040504020204" pitchFamily="34" charset="0"/>
+              <a:cs typeface="Noto Sans" panose="020B0502040504020204" pitchFamily="34" charset="0"/>
+            </a:endParaRPr>
+          </a:p>
+          <a:p>
+            <a:pPr marL="800100" lvl="1" indent="-342900" algn="just">
+              <a:buFont typeface="Arial" panose="020B0604020202020204" pitchFamily="34" charset="0"/>
+              <a:buChar char="•"/>
+            </a:pPr>
+            <a:endParaRPr lang="en-US" sz="1200" dirty="0">
+              <a:latin typeface="Noto Sans" panose="020B0502040504020204" pitchFamily="34" charset="0"/>
+              <a:ea typeface="Noto Sans" panose="020B0502040504020204" pitchFamily="34" charset="0"/>
+              <a:cs typeface="Noto Sans" panose="020B0502040504020204" pitchFamily="34" charset="0"/>
+            </a:endParaRPr>
+          </a:p>
+          <a:p>
+            <a:pPr marL="800100" lvl="1" indent="-342900" algn="just">
+              <a:buFont typeface="Arial" panose="020B0604020202020204" pitchFamily="34" charset="0"/>
+              <a:buChar char="•"/>
+            </a:pPr>
+            <a:endParaRPr lang="en-US" sz="1200" dirty="0">
+              <a:latin typeface="Noto Sans" panose="020B0502040504020204" pitchFamily="34" charset="0"/>
+              <a:ea typeface="Noto Sans" panose="020B0502040504020204" pitchFamily="34" charset="0"/>
+              <a:cs typeface="Noto Sans" panose="020B0502040504020204" pitchFamily="34" charset="0"/>
+            </a:endParaRPr>
+          </a:p>
+          <a:p>
+            <a:pPr marL="800100" lvl="1" indent="-342900" algn="just">
+              <a:buFont typeface="Arial" panose="020B0604020202020204" pitchFamily="34" charset="0"/>
+              <a:buChar char="•"/>
+            </a:pPr>
+            <a:endParaRPr lang="en-US" sz="1200" dirty="0">
+              <a:latin typeface="Noto Sans" panose="020B0502040504020204" pitchFamily="34" charset="0"/>
+              <a:ea typeface="Noto Sans" panose="020B0502040504020204" pitchFamily="34" charset="0"/>
+              <a:cs typeface="Noto Sans" panose="020B0502040504020204" pitchFamily="34" charset="0"/>
+            </a:endParaRPr>
+          </a:p>
+          <a:p>
+            <a:pPr marL="800100" lvl="1" indent="-342900" algn="just">
+              <a:buFont typeface="Arial" panose="020B0604020202020204" pitchFamily="34" charset="0"/>
+              <a:buChar char="•"/>
+            </a:pPr>
+            <a:endParaRPr lang="en-US" sz="1200" dirty="0">
+              <a:latin typeface="Noto Sans" panose="020B0502040504020204" pitchFamily="34" charset="0"/>
+              <a:ea typeface="Noto Sans" panose="020B0502040504020204" pitchFamily="34" charset="0"/>
+              <a:cs typeface="Noto Sans" panose="020B0502040504020204" pitchFamily="34" charset="0"/>
+            </a:endParaRPr>
+          </a:p>
+          <a:p>
+            <a:pPr marL="800100" lvl="1" indent="-342900" algn="just">
+              <a:buFont typeface="Arial" panose="020B0604020202020204" pitchFamily="34" charset="0"/>
+              <a:buChar char="•"/>
+            </a:pPr>
+            <a:endParaRPr lang="en-US" sz="1200" dirty="0">
+              <a:latin typeface="Noto Sans" panose="020B0502040504020204" pitchFamily="34" charset="0"/>
+              <a:ea typeface="Noto Sans" panose="020B0502040504020204" pitchFamily="34" charset="0"/>
+              <a:cs typeface="Noto Sans" panose="020B0502040504020204" pitchFamily="34" charset="0"/>
+            </a:endParaRPr>
+          </a:p>
+          <a:p>
+            <a:pPr marL="800100" lvl="1" indent="-342900" algn="just">
+              <a:buFont typeface="Arial" panose="020B0604020202020204" pitchFamily="34" charset="0"/>
+              <a:buChar char="•"/>
+            </a:pPr>
+            <a:endParaRPr lang="en-US" sz="1200" dirty="0">
+              <a:latin typeface="Noto Sans" panose="020B0502040504020204" pitchFamily="34" charset="0"/>
+              <a:ea typeface="Noto Sans" panose="020B0502040504020204" pitchFamily="34" charset="0"/>
+              <a:cs typeface="Noto Sans" panose="020B0502040504020204" pitchFamily="34" charset="0"/>
+            </a:endParaRPr>
+          </a:p>
+          <a:p>
+            <a:pPr marL="800100" lvl="1" indent="-342900" algn="just">
+              <a:buFont typeface="Arial" panose="020B0604020202020204" pitchFamily="34" charset="0"/>
+              <a:buChar char="•"/>
+            </a:pPr>
+            <a:r>
+              <a:rPr lang="en-US" sz="1200" dirty="0">
+                <a:latin typeface="Noto Sans" panose="020B0502040504020204" pitchFamily="34" charset="0"/>
+                <a:ea typeface="Noto Sans" panose="020B0502040504020204" pitchFamily="34" charset="0"/>
+                <a:cs typeface="Noto Sans" panose="020B0502040504020204" pitchFamily="34" charset="0"/>
+              </a:rPr>
               <a:t>After creating the project, go to the Project Settings &gt; API</a:t>
             </a:r>
           </a:p>
@@ -5910,173 +6684,173 @@
               <a:buFont typeface="Arial" panose="020B0604020202020204" pitchFamily="34" charset="0"/>
               <a:buChar char="•"/>
             </a:pPr>
-            <a:endParaRPr lang="en-US" sz="1200">
-              <a:latin typeface="Noto Sans" panose="020B0502040504020204" pitchFamily="34" charset="0"/>
-              <a:ea typeface="Noto Sans" panose="020B0502040504020204" pitchFamily="34" charset="0"/>
-              <a:cs typeface="Noto Sans" panose="020B0502040504020204" pitchFamily="34" charset="0"/>
-            </a:endParaRPr>
-          </a:p>
-          <a:p>
-            <a:pPr marL="800100" lvl="1" indent="-342900" algn="just">
-              <a:buFont typeface="Arial" panose="020B0604020202020204" pitchFamily="34" charset="0"/>
-              <a:buChar char="•"/>
-            </a:pPr>
-            <a:endParaRPr lang="en-US" sz="1200">
-              <a:latin typeface="Noto Sans" panose="020B0502040504020204" pitchFamily="34" charset="0"/>
-              <a:ea typeface="Noto Sans" panose="020B0502040504020204" pitchFamily="34" charset="0"/>
-              <a:cs typeface="Noto Sans" panose="020B0502040504020204" pitchFamily="34" charset="0"/>
-            </a:endParaRPr>
-          </a:p>
-          <a:p>
-            <a:pPr marL="800100" lvl="1" indent="-342900" algn="just">
-              <a:buFont typeface="Arial" panose="020B0604020202020204" pitchFamily="34" charset="0"/>
-              <a:buChar char="•"/>
-            </a:pPr>
-            <a:endParaRPr lang="en-US" sz="1200">
-              <a:latin typeface="Noto Sans" panose="020B0502040504020204" pitchFamily="34" charset="0"/>
-              <a:ea typeface="Noto Sans" panose="020B0502040504020204" pitchFamily="34" charset="0"/>
-              <a:cs typeface="Noto Sans" panose="020B0502040504020204" pitchFamily="34" charset="0"/>
-            </a:endParaRPr>
-          </a:p>
-          <a:p>
-            <a:pPr marL="800100" lvl="1" indent="-342900" algn="just">
-              <a:buFont typeface="Arial" panose="020B0604020202020204" pitchFamily="34" charset="0"/>
-              <a:buChar char="•"/>
-            </a:pPr>
-            <a:endParaRPr lang="en-US" sz="1200">
-              <a:latin typeface="Noto Sans" panose="020B0502040504020204" pitchFamily="34" charset="0"/>
-              <a:ea typeface="Noto Sans" panose="020B0502040504020204" pitchFamily="34" charset="0"/>
-              <a:cs typeface="Noto Sans" panose="020B0502040504020204" pitchFamily="34" charset="0"/>
-            </a:endParaRPr>
-          </a:p>
-          <a:p>
-            <a:pPr marL="800100" lvl="1" indent="-342900" algn="just">
-              <a:buFont typeface="Arial" panose="020B0604020202020204" pitchFamily="34" charset="0"/>
-              <a:buChar char="•"/>
-            </a:pPr>
-            <a:endParaRPr lang="en-US" sz="1200">
-              <a:latin typeface="Noto Sans" panose="020B0502040504020204" pitchFamily="34" charset="0"/>
-              <a:ea typeface="Noto Sans" panose="020B0502040504020204" pitchFamily="34" charset="0"/>
-              <a:cs typeface="Noto Sans" panose="020B0502040504020204" pitchFamily="34" charset="0"/>
-            </a:endParaRPr>
-          </a:p>
-          <a:p>
-            <a:pPr marL="800100" lvl="1" indent="-342900" algn="just">
-              <a:buFont typeface="Arial" panose="020B0604020202020204" pitchFamily="34" charset="0"/>
-              <a:buChar char="•"/>
-            </a:pPr>
-            <a:endParaRPr lang="en-US" sz="1200">
-              <a:latin typeface="Noto Sans" panose="020B0502040504020204" pitchFamily="34" charset="0"/>
-              <a:ea typeface="Noto Sans" panose="020B0502040504020204" pitchFamily="34" charset="0"/>
-              <a:cs typeface="Noto Sans" panose="020B0502040504020204" pitchFamily="34" charset="0"/>
-            </a:endParaRPr>
-          </a:p>
-          <a:p>
-            <a:pPr marL="800100" lvl="1" indent="-342900" algn="just">
-              <a:buFont typeface="Arial" panose="020B0604020202020204" pitchFamily="34" charset="0"/>
-              <a:buChar char="•"/>
-            </a:pPr>
-            <a:endParaRPr lang="en-US" sz="1200">
-              <a:latin typeface="Noto Sans" panose="020B0502040504020204" pitchFamily="34" charset="0"/>
-              <a:ea typeface="Noto Sans" panose="020B0502040504020204" pitchFamily="34" charset="0"/>
-              <a:cs typeface="Noto Sans" panose="020B0502040504020204" pitchFamily="34" charset="0"/>
-            </a:endParaRPr>
-          </a:p>
-          <a:p>
-            <a:pPr marL="800100" lvl="1" indent="-342900" algn="just">
-              <a:buFont typeface="Arial" panose="020B0604020202020204" pitchFamily="34" charset="0"/>
-              <a:buChar char="•"/>
-            </a:pPr>
-            <a:endParaRPr lang="en-US" sz="1200">
-              <a:latin typeface="Noto Sans" panose="020B0502040504020204" pitchFamily="34" charset="0"/>
-              <a:ea typeface="Noto Sans" panose="020B0502040504020204" pitchFamily="34" charset="0"/>
-              <a:cs typeface="Noto Sans" panose="020B0502040504020204" pitchFamily="34" charset="0"/>
-            </a:endParaRPr>
-          </a:p>
-          <a:p>
-            <a:pPr marL="800100" lvl="1" indent="-342900" algn="just">
-              <a:buFont typeface="Arial" panose="020B0604020202020204" pitchFamily="34" charset="0"/>
-              <a:buChar char="•"/>
-            </a:pPr>
-            <a:endParaRPr lang="en-US" sz="1200">
-              <a:latin typeface="Noto Sans" panose="020B0502040504020204" pitchFamily="34" charset="0"/>
-              <a:ea typeface="Noto Sans" panose="020B0502040504020204" pitchFamily="34" charset="0"/>
-              <a:cs typeface="Noto Sans" panose="020B0502040504020204" pitchFamily="34" charset="0"/>
-            </a:endParaRPr>
-          </a:p>
-          <a:p>
-            <a:pPr marL="800100" lvl="1" indent="-342900" algn="just">
-              <a:buFont typeface="Arial" panose="020B0604020202020204" pitchFamily="34" charset="0"/>
-              <a:buChar char="•"/>
-            </a:pPr>
-            <a:endParaRPr lang="en-US" sz="1200">
-              <a:latin typeface="Noto Sans" panose="020B0502040504020204" pitchFamily="34" charset="0"/>
-              <a:ea typeface="Noto Sans" panose="020B0502040504020204" pitchFamily="34" charset="0"/>
-              <a:cs typeface="Noto Sans" panose="020B0502040504020204" pitchFamily="34" charset="0"/>
-            </a:endParaRPr>
-          </a:p>
-          <a:p>
-            <a:pPr marL="800100" lvl="1" indent="-342900" algn="just">
-              <a:buFont typeface="Arial" panose="020B0604020202020204" pitchFamily="34" charset="0"/>
-              <a:buChar char="•"/>
-            </a:pPr>
-            <a:endParaRPr lang="en-US" sz="1200">
-              <a:latin typeface="Noto Sans" panose="020B0502040504020204" pitchFamily="34" charset="0"/>
-              <a:ea typeface="Noto Sans" panose="020B0502040504020204" pitchFamily="34" charset="0"/>
-              <a:cs typeface="Noto Sans" panose="020B0502040504020204" pitchFamily="34" charset="0"/>
-            </a:endParaRPr>
-          </a:p>
-          <a:p>
-            <a:pPr marL="800100" lvl="1" indent="-342900" algn="just">
-              <a:buFont typeface="Arial" panose="020B0604020202020204" pitchFamily="34" charset="0"/>
-              <a:buChar char="•"/>
-            </a:pPr>
-            <a:endParaRPr lang="en-US" sz="1200">
-              <a:latin typeface="Noto Sans" panose="020B0502040504020204" pitchFamily="34" charset="0"/>
-              <a:ea typeface="Noto Sans" panose="020B0502040504020204" pitchFamily="34" charset="0"/>
-              <a:cs typeface="Noto Sans" panose="020B0502040504020204" pitchFamily="34" charset="0"/>
-            </a:endParaRPr>
-          </a:p>
-          <a:p>
-            <a:pPr marL="800100" lvl="1" indent="-342900" algn="just">
-              <a:buFont typeface="Arial" panose="020B0604020202020204" pitchFamily="34" charset="0"/>
-              <a:buChar char="•"/>
-            </a:pPr>
-            <a:endParaRPr lang="en-US" sz="1200">
-              <a:latin typeface="Noto Sans" panose="020B0502040504020204" pitchFamily="34" charset="0"/>
-              <a:ea typeface="Noto Sans" panose="020B0502040504020204" pitchFamily="34" charset="0"/>
-              <a:cs typeface="Noto Sans" panose="020B0502040504020204" pitchFamily="34" charset="0"/>
-            </a:endParaRPr>
-          </a:p>
-          <a:p>
-            <a:pPr marL="800100" lvl="1" indent="-342900" algn="just">
-              <a:buFont typeface="Arial" panose="020B0604020202020204" pitchFamily="34" charset="0"/>
-              <a:buChar char="•"/>
-            </a:pPr>
-            <a:endParaRPr lang="en-US" sz="1200">
-              <a:latin typeface="Noto Sans" panose="020B0502040504020204" pitchFamily="34" charset="0"/>
-              <a:ea typeface="Noto Sans" panose="020B0502040504020204" pitchFamily="34" charset="0"/>
-              <a:cs typeface="Noto Sans" panose="020B0502040504020204" pitchFamily="34" charset="0"/>
-            </a:endParaRPr>
-          </a:p>
-          <a:p>
-            <a:pPr marL="800100" lvl="1" indent="-342900" algn="just">
-              <a:buFont typeface="Arial" panose="020B0604020202020204" pitchFamily="34" charset="0"/>
-              <a:buChar char="•"/>
-            </a:pPr>
-            <a:endParaRPr lang="en-US" sz="1200">
-              <a:latin typeface="Noto Sans" panose="020B0502040504020204" pitchFamily="34" charset="0"/>
-              <a:ea typeface="Noto Sans" panose="020B0502040504020204" pitchFamily="34" charset="0"/>
-              <a:cs typeface="Noto Sans" panose="020B0502040504020204" pitchFamily="34" charset="0"/>
-            </a:endParaRPr>
-          </a:p>
-          <a:p>
-            <a:pPr marL="800100" lvl="1" indent="-342900" algn="just">
-              <a:buFont typeface="Arial" panose="020B0604020202020204" pitchFamily="34" charset="0"/>
-              <a:buChar char="•"/>
-            </a:pPr>
-            <a:r>
-              <a:rPr lang="en-US" sz="1200">
+            <a:endParaRPr lang="en-US" sz="1200" dirty="0">
+              <a:latin typeface="Noto Sans" panose="020B0502040504020204" pitchFamily="34" charset="0"/>
+              <a:ea typeface="Noto Sans" panose="020B0502040504020204" pitchFamily="34" charset="0"/>
+              <a:cs typeface="Noto Sans" panose="020B0502040504020204" pitchFamily="34" charset="0"/>
+            </a:endParaRPr>
+          </a:p>
+          <a:p>
+            <a:pPr marL="800100" lvl="1" indent="-342900" algn="just">
+              <a:buFont typeface="Arial" panose="020B0604020202020204" pitchFamily="34" charset="0"/>
+              <a:buChar char="•"/>
+            </a:pPr>
+            <a:endParaRPr lang="en-US" sz="1200" dirty="0">
+              <a:latin typeface="Noto Sans" panose="020B0502040504020204" pitchFamily="34" charset="0"/>
+              <a:ea typeface="Noto Sans" panose="020B0502040504020204" pitchFamily="34" charset="0"/>
+              <a:cs typeface="Noto Sans" panose="020B0502040504020204" pitchFamily="34" charset="0"/>
+            </a:endParaRPr>
+          </a:p>
+          <a:p>
+            <a:pPr marL="800100" lvl="1" indent="-342900" algn="just">
+              <a:buFont typeface="Arial" panose="020B0604020202020204" pitchFamily="34" charset="0"/>
+              <a:buChar char="•"/>
+            </a:pPr>
+            <a:endParaRPr lang="en-US" sz="1200" dirty="0">
+              <a:latin typeface="Noto Sans" panose="020B0502040504020204" pitchFamily="34" charset="0"/>
+              <a:ea typeface="Noto Sans" panose="020B0502040504020204" pitchFamily="34" charset="0"/>
+              <a:cs typeface="Noto Sans" panose="020B0502040504020204" pitchFamily="34" charset="0"/>
+            </a:endParaRPr>
+          </a:p>
+          <a:p>
+            <a:pPr marL="800100" lvl="1" indent="-342900" algn="just">
+              <a:buFont typeface="Arial" panose="020B0604020202020204" pitchFamily="34" charset="0"/>
+              <a:buChar char="•"/>
+            </a:pPr>
+            <a:endParaRPr lang="en-US" sz="1200" dirty="0">
+              <a:latin typeface="Noto Sans" panose="020B0502040504020204" pitchFamily="34" charset="0"/>
+              <a:ea typeface="Noto Sans" panose="020B0502040504020204" pitchFamily="34" charset="0"/>
+              <a:cs typeface="Noto Sans" panose="020B0502040504020204" pitchFamily="34" charset="0"/>
+            </a:endParaRPr>
+          </a:p>
+          <a:p>
+            <a:pPr marL="800100" lvl="1" indent="-342900" algn="just">
+              <a:buFont typeface="Arial" panose="020B0604020202020204" pitchFamily="34" charset="0"/>
+              <a:buChar char="•"/>
+            </a:pPr>
+            <a:endParaRPr lang="en-US" sz="1200" dirty="0">
+              <a:latin typeface="Noto Sans" panose="020B0502040504020204" pitchFamily="34" charset="0"/>
+              <a:ea typeface="Noto Sans" panose="020B0502040504020204" pitchFamily="34" charset="0"/>
+              <a:cs typeface="Noto Sans" panose="020B0502040504020204" pitchFamily="34" charset="0"/>
+            </a:endParaRPr>
+          </a:p>
+          <a:p>
+            <a:pPr marL="800100" lvl="1" indent="-342900" algn="just">
+              <a:buFont typeface="Arial" panose="020B0604020202020204" pitchFamily="34" charset="0"/>
+              <a:buChar char="•"/>
+            </a:pPr>
+            <a:endParaRPr lang="en-US" sz="1200" dirty="0">
+              <a:latin typeface="Noto Sans" panose="020B0502040504020204" pitchFamily="34" charset="0"/>
+              <a:ea typeface="Noto Sans" panose="020B0502040504020204" pitchFamily="34" charset="0"/>
+              <a:cs typeface="Noto Sans" panose="020B0502040504020204" pitchFamily="34" charset="0"/>
+            </a:endParaRPr>
+          </a:p>
+          <a:p>
+            <a:pPr marL="800100" lvl="1" indent="-342900" algn="just">
+              <a:buFont typeface="Arial" panose="020B0604020202020204" pitchFamily="34" charset="0"/>
+              <a:buChar char="•"/>
+            </a:pPr>
+            <a:endParaRPr lang="en-US" sz="1200" dirty="0">
+              <a:latin typeface="Noto Sans" panose="020B0502040504020204" pitchFamily="34" charset="0"/>
+              <a:ea typeface="Noto Sans" panose="020B0502040504020204" pitchFamily="34" charset="0"/>
+              <a:cs typeface="Noto Sans" panose="020B0502040504020204" pitchFamily="34" charset="0"/>
+            </a:endParaRPr>
+          </a:p>
+          <a:p>
+            <a:pPr marL="800100" lvl="1" indent="-342900" algn="just">
+              <a:buFont typeface="Arial" panose="020B0604020202020204" pitchFamily="34" charset="0"/>
+              <a:buChar char="•"/>
+            </a:pPr>
+            <a:endParaRPr lang="en-US" sz="1200" dirty="0">
+              <a:latin typeface="Noto Sans" panose="020B0502040504020204" pitchFamily="34" charset="0"/>
+              <a:ea typeface="Noto Sans" panose="020B0502040504020204" pitchFamily="34" charset="0"/>
+              <a:cs typeface="Noto Sans" panose="020B0502040504020204" pitchFamily="34" charset="0"/>
+            </a:endParaRPr>
+          </a:p>
+          <a:p>
+            <a:pPr marL="800100" lvl="1" indent="-342900" algn="just">
+              <a:buFont typeface="Arial" panose="020B0604020202020204" pitchFamily="34" charset="0"/>
+              <a:buChar char="•"/>
+            </a:pPr>
+            <a:endParaRPr lang="en-US" sz="1200" dirty="0">
+              <a:latin typeface="Noto Sans" panose="020B0502040504020204" pitchFamily="34" charset="0"/>
+              <a:ea typeface="Noto Sans" panose="020B0502040504020204" pitchFamily="34" charset="0"/>
+              <a:cs typeface="Noto Sans" panose="020B0502040504020204" pitchFamily="34" charset="0"/>
+            </a:endParaRPr>
+          </a:p>
+          <a:p>
+            <a:pPr marL="800100" lvl="1" indent="-342900" algn="just">
+              <a:buFont typeface="Arial" panose="020B0604020202020204" pitchFamily="34" charset="0"/>
+              <a:buChar char="•"/>
+            </a:pPr>
+            <a:endParaRPr lang="en-US" sz="1200" dirty="0">
+              <a:latin typeface="Noto Sans" panose="020B0502040504020204" pitchFamily="34" charset="0"/>
+              <a:ea typeface="Noto Sans" panose="020B0502040504020204" pitchFamily="34" charset="0"/>
+              <a:cs typeface="Noto Sans" panose="020B0502040504020204" pitchFamily="34" charset="0"/>
+            </a:endParaRPr>
+          </a:p>
+          <a:p>
+            <a:pPr marL="800100" lvl="1" indent="-342900" algn="just">
+              <a:buFont typeface="Arial" panose="020B0604020202020204" pitchFamily="34" charset="0"/>
+              <a:buChar char="•"/>
+            </a:pPr>
+            <a:endParaRPr lang="en-US" sz="1200" dirty="0">
+              <a:latin typeface="Noto Sans" panose="020B0502040504020204" pitchFamily="34" charset="0"/>
+              <a:ea typeface="Noto Sans" panose="020B0502040504020204" pitchFamily="34" charset="0"/>
+              <a:cs typeface="Noto Sans" panose="020B0502040504020204" pitchFamily="34" charset="0"/>
+            </a:endParaRPr>
+          </a:p>
+          <a:p>
+            <a:pPr marL="800100" lvl="1" indent="-342900" algn="just">
+              <a:buFont typeface="Arial" panose="020B0604020202020204" pitchFamily="34" charset="0"/>
+              <a:buChar char="•"/>
+            </a:pPr>
+            <a:endParaRPr lang="en-US" sz="1200" dirty="0">
+              <a:latin typeface="Noto Sans" panose="020B0502040504020204" pitchFamily="34" charset="0"/>
+              <a:ea typeface="Noto Sans" panose="020B0502040504020204" pitchFamily="34" charset="0"/>
+              <a:cs typeface="Noto Sans" panose="020B0502040504020204" pitchFamily="34" charset="0"/>
+            </a:endParaRPr>
+          </a:p>
+          <a:p>
+            <a:pPr marL="800100" lvl="1" indent="-342900" algn="just">
+              <a:buFont typeface="Arial" panose="020B0604020202020204" pitchFamily="34" charset="0"/>
+              <a:buChar char="•"/>
+            </a:pPr>
+            <a:endParaRPr lang="en-US" sz="1200" dirty="0">
+              <a:latin typeface="Noto Sans" panose="020B0502040504020204" pitchFamily="34" charset="0"/>
+              <a:ea typeface="Noto Sans" panose="020B0502040504020204" pitchFamily="34" charset="0"/>
+              <a:cs typeface="Noto Sans" panose="020B0502040504020204" pitchFamily="34" charset="0"/>
+            </a:endParaRPr>
+          </a:p>
+          <a:p>
+            <a:pPr marL="800100" lvl="1" indent="-342900" algn="just">
+              <a:buFont typeface="Arial" panose="020B0604020202020204" pitchFamily="34" charset="0"/>
+              <a:buChar char="•"/>
+            </a:pPr>
+            <a:endParaRPr lang="en-US" sz="1200" dirty="0">
+              <a:latin typeface="Noto Sans" panose="020B0502040504020204" pitchFamily="34" charset="0"/>
+              <a:ea typeface="Noto Sans" panose="020B0502040504020204" pitchFamily="34" charset="0"/>
+              <a:cs typeface="Noto Sans" panose="020B0502040504020204" pitchFamily="34" charset="0"/>
+            </a:endParaRPr>
+          </a:p>
+          <a:p>
+            <a:pPr marL="800100" lvl="1" indent="-342900" algn="just">
+              <a:buFont typeface="Arial" panose="020B0604020202020204" pitchFamily="34" charset="0"/>
+              <a:buChar char="•"/>
+            </a:pPr>
+            <a:endParaRPr lang="en-US" sz="1200" dirty="0">
+              <a:latin typeface="Noto Sans" panose="020B0502040504020204" pitchFamily="34" charset="0"/>
+              <a:ea typeface="Noto Sans" panose="020B0502040504020204" pitchFamily="34" charset="0"/>
+              <a:cs typeface="Noto Sans" panose="020B0502040504020204" pitchFamily="34" charset="0"/>
+            </a:endParaRPr>
+          </a:p>
+          <a:p>
+            <a:pPr marL="800100" lvl="1" indent="-342900" algn="just">
+              <a:buFont typeface="Arial" panose="020B0604020202020204" pitchFamily="34" charset="0"/>
+              <a:buChar char="•"/>
+            </a:pPr>
+            <a:r>
+              <a:rPr lang="en-US" sz="1200" dirty="0">
                 <a:latin typeface="Noto Sans" panose="020B0502040504020204" pitchFamily="34" charset="0"/>
                 <a:ea typeface="Noto Sans" panose="020B0502040504020204" pitchFamily="34" charset="0"/>
                 <a:cs typeface="Noto Sans" panose="020B0502040504020204" pitchFamily="34" charset="0"/>
@@ -6089,19 +6863,19 @@
               <a:buFont typeface="Arial" panose="020B0604020202020204" pitchFamily="34" charset="0"/>
               <a:buChar char="•"/>
             </a:pPr>
-            <a:endParaRPr lang="en-US" sz="1200">
-              <a:latin typeface="Noto Sans" panose="020B0502040504020204" pitchFamily="34" charset="0"/>
-              <a:ea typeface="Noto Sans" panose="020B0502040504020204" pitchFamily="34" charset="0"/>
-              <a:cs typeface="Noto Sans" panose="020B0502040504020204" pitchFamily="34" charset="0"/>
-            </a:endParaRPr>
-          </a:p>
-          <a:p>
-            <a:pPr marL="800100" lvl="1" indent="-342900" algn="just">
-              <a:buFont typeface="Arial" panose="020B0604020202020204" pitchFamily="34" charset="0"/>
-              <a:buChar char="•"/>
-            </a:pPr>
-            <a:r>
-              <a:rPr lang="en-US" sz="1200">
+            <a:endParaRPr lang="en-US" sz="1200" dirty="0">
+              <a:latin typeface="Noto Sans" panose="020B0502040504020204" pitchFamily="34" charset="0"/>
+              <a:ea typeface="Noto Sans" panose="020B0502040504020204" pitchFamily="34" charset="0"/>
+              <a:cs typeface="Noto Sans" panose="020B0502040504020204" pitchFamily="34" charset="0"/>
+            </a:endParaRPr>
+          </a:p>
+          <a:p>
+            <a:pPr marL="800100" lvl="1" indent="-342900" algn="just">
+              <a:buFont typeface="Arial" panose="020B0604020202020204" pitchFamily="34" charset="0"/>
+              <a:buChar char="•"/>
+            </a:pPr>
+            <a:r>
+              <a:rPr lang="en-US" sz="1200" dirty="0">
                 <a:latin typeface="Noto Sans" panose="020B0502040504020204" pitchFamily="34" charset="0"/>
                 <a:ea typeface="Noto Sans" panose="020B0502040504020204" pitchFamily="34" charset="0"/>
                 <a:cs typeface="Noto Sans" panose="020B0502040504020204" pitchFamily="34" charset="0"/>
@@ -6114,19 +6888,19 @@
               <a:buFont typeface="Arial" panose="020B0604020202020204" pitchFamily="34" charset="0"/>
               <a:buChar char="•"/>
             </a:pPr>
-            <a:endParaRPr lang="en-US" sz="1200">
-              <a:latin typeface="Noto Sans" panose="020B0502040504020204" pitchFamily="34" charset="0"/>
-              <a:ea typeface="Noto Sans" panose="020B0502040504020204" pitchFamily="34" charset="0"/>
-              <a:cs typeface="Noto Sans" panose="020B0502040504020204" pitchFamily="34" charset="0"/>
-            </a:endParaRPr>
-          </a:p>
-          <a:p>
-            <a:pPr marL="800100" lvl="1" indent="-342900" algn="just">
-              <a:buFont typeface="Arial" panose="020B0604020202020204" pitchFamily="34" charset="0"/>
-              <a:buChar char="•"/>
-            </a:pPr>
-            <a:r>
-              <a:rPr lang="en-US" sz="1200">
+            <a:endParaRPr lang="en-US" sz="1200" dirty="0">
+              <a:latin typeface="Noto Sans" panose="020B0502040504020204" pitchFamily="34" charset="0"/>
+              <a:ea typeface="Noto Sans" panose="020B0502040504020204" pitchFamily="34" charset="0"/>
+              <a:cs typeface="Noto Sans" panose="020B0502040504020204" pitchFamily="34" charset="0"/>
+            </a:endParaRPr>
+          </a:p>
+          <a:p>
+            <a:pPr marL="800100" lvl="1" indent="-342900" algn="just">
+              <a:buFont typeface="Arial" panose="020B0604020202020204" pitchFamily="34" charset="0"/>
+              <a:buChar char="•"/>
+            </a:pPr>
+            <a:r>
+              <a:rPr lang="en-US" sz="1200" dirty="0">
                 <a:latin typeface="Noto Sans" panose="020B0502040504020204" pitchFamily="34" charset="0"/>
                 <a:ea typeface="Noto Sans" panose="020B0502040504020204" pitchFamily="34" charset="0"/>
                 <a:cs typeface="Noto Sans" panose="020B0502040504020204" pitchFamily="34" charset="0"/>
@@ -6209,7 +6983,7 @@
 </p:sld>
 </file>
 
-<file path=ppt/slides/slide5.xml><?xml version="1.0" encoding="utf-8"?>
+<file path=ppt/slides/slide6.xml><?xml version="1.0" encoding="utf-8"?>
 <p:sld xmlns:a="http://schemas.openxmlformats.org/drawingml/2006/main" xmlns:r="http://schemas.openxmlformats.org/officeDocument/2006/relationships" xmlns:p="http://schemas.openxmlformats.org/presentationml/2006/main">
   <p:cSld>
     <p:spTree>
@@ -6256,10 +7030,10 @@
           <a:p>
             <a:pPr marL="342900" indent="-342900">
               <a:buFont typeface="+mj-lt"/>
-              <a:buAutoNum type="arabicParenR" startAt="5"/>
-            </a:pPr>
-            <a:r>
-              <a:rPr lang="en-US" sz="1400">
+              <a:buAutoNum type="arabicParenR" startAt="6"/>
+            </a:pPr>
+            <a:r>
+              <a:rPr lang="en-US" sz="1400" dirty="0">
                 <a:solidFill>
                   <a:schemeClr val="accent1"/>
                 </a:solidFill>
@@ -6273,141 +7047,141 @@
           <a:p>
             <a:pPr marL="342900" indent="-342900">
               <a:buFont typeface="+mj-lt"/>
-              <a:buAutoNum type="arabicParenR" startAt="5"/>
-            </a:pPr>
-            <a:endParaRPr lang="en-US" sz="1200">
-              <a:latin typeface="Noto Sans" panose="020B0502040504020204" pitchFamily="34" charset="0"/>
-              <a:ea typeface="Noto Sans" panose="020B0502040504020204" pitchFamily="34" charset="0"/>
-              <a:cs typeface="Noto Sans" panose="020B0502040504020204" pitchFamily="34" charset="0"/>
-            </a:endParaRPr>
-          </a:p>
-          <a:p>
-            <a:pPr marL="800100" lvl="1" indent="-342900" algn="just">
-              <a:buFont typeface="Arial" panose="020B0604020202020204" pitchFamily="34" charset="0"/>
-              <a:buChar char="•"/>
-            </a:pPr>
-            <a:endParaRPr lang="en-US" sz="1200">
-              <a:latin typeface="Noto Sans" panose="020B0502040504020204" pitchFamily="34" charset="0"/>
-              <a:ea typeface="Noto Sans" panose="020B0502040504020204" pitchFamily="34" charset="0"/>
-              <a:cs typeface="Noto Sans" panose="020B0502040504020204" pitchFamily="34" charset="0"/>
-            </a:endParaRPr>
-          </a:p>
-          <a:p>
-            <a:pPr marL="800100" lvl="1" indent="-342900" algn="just">
-              <a:buFont typeface="Arial" panose="020B0604020202020204" pitchFamily="34" charset="0"/>
-              <a:buChar char="•"/>
-            </a:pPr>
-            <a:endParaRPr lang="en-US" sz="1200">
-              <a:latin typeface="Noto Sans" panose="020B0502040504020204" pitchFamily="34" charset="0"/>
-              <a:ea typeface="Noto Sans" panose="020B0502040504020204" pitchFamily="34" charset="0"/>
-              <a:cs typeface="Noto Sans" panose="020B0502040504020204" pitchFamily="34" charset="0"/>
-            </a:endParaRPr>
-          </a:p>
-          <a:p>
-            <a:pPr marL="800100" lvl="1" indent="-342900" algn="just">
-              <a:buFont typeface="Arial" panose="020B0604020202020204" pitchFamily="34" charset="0"/>
-              <a:buChar char="•"/>
-            </a:pPr>
-            <a:endParaRPr lang="en-US" sz="1200">
-              <a:latin typeface="Noto Sans" panose="020B0502040504020204" pitchFamily="34" charset="0"/>
-              <a:ea typeface="Noto Sans" panose="020B0502040504020204" pitchFamily="34" charset="0"/>
-              <a:cs typeface="Noto Sans" panose="020B0502040504020204" pitchFamily="34" charset="0"/>
-            </a:endParaRPr>
-          </a:p>
-          <a:p>
-            <a:pPr marL="800100" lvl="1" indent="-342900" algn="just">
-              <a:buFont typeface="Arial" panose="020B0604020202020204" pitchFamily="34" charset="0"/>
-              <a:buChar char="•"/>
-            </a:pPr>
-            <a:endParaRPr lang="en-US" sz="1200">
-              <a:latin typeface="Noto Sans" panose="020B0502040504020204" pitchFamily="34" charset="0"/>
-              <a:ea typeface="Noto Sans" panose="020B0502040504020204" pitchFamily="34" charset="0"/>
-              <a:cs typeface="Noto Sans" panose="020B0502040504020204" pitchFamily="34" charset="0"/>
-            </a:endParaRPr>
-          </a:p>
-          <a:p>
-            <a:pPr marL="800100" lvl="1" indent="-342900" algn="just">
-              <a:buFont typeface="Arial" panose="020B0604020202020204" pitchFamily="34" charset="0"/>
-              <a:buChar char="•"/>
-            </a:pPr>
-            <a:endParaRPr lang="en-US" sz="1200">
-              <a:latin typeface="Noto Sans" panose="020B0502040504020204" pitchFamily="34" charset="0"/>
-              <a:ea typeface="Noto Sans" panose="020B0502040504020204" pitchFamily="34" charset="0"/>
-              <a:cs typeface="Noto Sans" panose="020B0502040504020204" pitchFamily="34" charset="0"/>
-            </a:endParaRPr>
-          </a:p>
-          <a:p>
-            <a:pPr marL="800100" lvl="1" indent="-342900" algn="just">
-              <a:buFont typeface="Arial" panose="020B0604020202020204" pitchFamily="34" charset="0"/>
-              <a:buChar char="•"/>
-            </a:pPr>
-            <a:endParaRPr lang="en-US" sz="1200">
-              <a:latin typeface="Noto Sans" panose="020B0502040504020204" pitchFamily="34" charset="0"/>
-              <a:ea typeface="Noto Sans" panose="020B0502040504020204" pitchFamily="34" charset="0"/>
-              <a:cs typeface="Noto Sans" panose="020B0502040504020204" pitchFamily="34" charset="0"/>
-            </a:endParaRPr>
-          </a:p>
-          <a:p>
-            <a:pPr marL="800100" lvl="1" indent="-342900" algn="just">
-              <a:buFont typeface="Arial" panose="020B0604020202020204" pitchFamily="34" charset="0"/>
-              <a:buChar char="•"/>
-            </a:pPr>
-            <a:endParaRPr lang="en-US" sz="1200">
-              <a:latin typeface="Noto Sans" panose="020B0502040504020204" pitchFamily="34" charset="0"/>
-              <a:ea typeface="Noto Sans" panose="020B0502040504020204" pitchFamily="34" charset="0"/>
-              <a:cs typeface="Noto Sans" panose="020B0502040504020204" pitchFamily="34" charset="0"/>
-            </a:endParaRPr>
-          </a:p>
-          <a:p>
-            <a:pPr marL="800100" lvl="1" indent="-342900" algn="just">
-              <a:buFont typeface="Arial" panose="020B0604020202020204" pitchFamily="34" charset="0"/>
-              <a:buChar char="•"/>
-            </a:pPr>
-            <a:endParaRPr lang="en-US" sz="1200">
-              <a:latin typeface="Noto Sans" panose="020B0502040504020204" pitchFamily="34" charset="0"/>
-              <a:ea typeface="Noto Sans" panose="020B0502040504020204" pitchFamily="34" charset="0"/>
-              <a:cs typeface="Noto Sans" panose="020B0502040504020204" pitchFamily="34" charset="0"/>
-            </a:endParaRPr>
-          </a:p>
-          <a:p>
-            <a:pPr marL="800100" lvl="1" indent="-342900" algn="just">
-              <a:buFont typeface="Arial" panose="020B0604020202020204" pitchFamily="34" charset="0"/>
-              <a:buChar char="•"/>
-            </a:pPr>
-            <a:endParaRPr lang="en-US" sz="1200">
-              <a:latin typeface="Noto Sans" panose="020B0502040504020204" pitchFamily="34" charset="0"/>
-              <a:ea typeface="Noto Sans" panose="020B0502040504020204" pitchFamily="34" charset="0"/>
-              <a:cs typeface="Noto Sans" panose="020B0502040504020204" pitchFamily="34" charset="0"/>
-            </a:endParaRPr>
-          </a:p>
-          <a:p>
-            <a:pPr marL="800100" lvl="1" indent="-342900" algn="just">
-              <a:buFont typeface="Arial" panose="020B0604020202020204" pitchFamily="34" charset="0"/>
-              <a:buChar char="•"/>
-            </a:pPr>
-            <a:endParaRPr lang="en-US" sz="1200">
-              <a:latin typeface="Noto Sans" panose="020B0502040504020204" pitchFamily="34" charset="0"/>
-              <a:ea typeface="Noto Sans" panose="020B0502040504020204" pitchFamily="34" charset="0"/>
-              <a:cs typeface="Noto Sans" panose="020B0502040504020204" pitchFamily="34" charset="0"/>
-            </a:endParaRPr>
-          </a:p>
-          <a:p>
-            <a:pPr marL="800100" lvl="1" indent="-342900" algn="just">
-              <a:buFont typeface="Arial" panose="020B0604020202020204" pitchFamily="34" charset="0"/>
-              <a:buChar char="•"/>
-            </a:pPr>
-            <a:endParaRPr lang="en-US" sz="1200">
-              <a:latin typeface="Noto Sans" panose="020B0502040504020204" pitchFamily="34" charset="0"/>
-              <a:ea typeface="Noto Sans" panose="020B0502040504020204" pitchFamily="34" charset="0"/>
-              <a:cs typeface="Noto Sans" panose="020B0502040504020204" pitchFamily="34" charset="0"/>
-            </a:endParaRPr>
-          </a:p>
-          <a:p>
-            <a:pPr marL="800100" lvl="1" indent="-342900" algn="just">
-              <a:buFont typeface="Arial" panose="020B0604020202020204" pitchFamily="34" charset="0"/>
-              <a:buChar char="•"/>
-            </a:pPr>
-            <a:endParaRPr lang="en-US" sz="1200">
+              <a:buAutoNum type="arabicParenR" startAt="6"/>
+            </a:pPr>
+            <a:endParaRPr lang="en-US" sz="1200" dirty="0">
+              <a:latin typeface="Noto Sans" panose="020B0502040504020204" pitchFamily="34" charset="0"/>
+              <a:ea typeface="Noto Sans" panose="020B0502040504020204" pitchFamily="34" charset="0"/>
+              <a:cs typeface="Noto Sans" panose="020B0502040504020204" pitchFamily="34" charset="0"/>
+            </a:endParaRPr>
+          </a:p>
+          <a:p>
+            <a:pPr marL="800100" lvl="1" indent="-342900" algn="just">
+              <a:buFont typeface="Arial" panose="020B0604020202020204" pitchFamily="34" charset="0"/>
+              <a:buChar char="•"/>
+            </a:pPr>
+            <a:endParaRPr lang="en-US" sz="1200" dirty="0">
+              <a:latin typeface="Noto Sans" panose="020B0502040504020204" pitchFamily="34" charset="0"/>
+              <a:ea typeface="Noto Sans" panose="020B0502040504020204" pitchFamily="34" charset="0"/>
+              <a:cs typeface="Noto Sans" panose="020B0502040504020204" pitchFamily="34" charset="0"/>
+            </a:endParaRPr>
+          </a:p>
+          <a:p>
+            <a:pPr marL="800100" lvl="1" indent="-342900" algn="just">
+              <a:buFont typeface="Arial" panose="020B0604020202020204" pitchFamily="34" charset="0"/>
+              <a:buChar char="•"/>
+            </a:pPr>
+            <a:endParaRPr lang="en-US" sz="1200" dirty="0">
+              <a:latin typeface="Noto Sans" panose="020B0502040504020204" pitchFamily="34" charset="0"/>
+              <a:ea typeface="Noto Sans" panose="020B0502040504020204" pitchFamily="34" charset="0"/>
+              <a:cs typeface="Noto Sans" panose="020B0502040504020204" pitchFamily="34" charset="0"/>
+            </a:endParaRPr>
+          </a:p>
+          <a:p>
+            <a:pPr marL="800100" lvl="1" indent="-342900" algn="just">
+              <a:buFont typeface="Arial" panose="020B0604020202020204" pitchFamily="34" charset="0"/>
+              <a:buChar char="•"/>
+            </a:pPr>
+            <a:endParaRPr lang="en-US" sz="1200" dirty="0">
+              <a:latin typeface="Noto Sans" panose="020B0502040504020204" pitchFamily="34" charset="0"/>
+              <a:ea typeface="Noto Sans" panose="020B0502040504020204" pitchFamily="34" charset="0"/>
+              <a:cs typeface="Noto Sans" panose="020B0502040504020204" pitchFamily="34" charset="0"/>
+            </a:endParaRPr>
+          </a:p>
+          <a:p>
+            <a:pPr marL="800100" lvl="1" indent="-342900" algn="just">
+              <a:buFont typeface="Arial" panose="020B0604020202020204" pitchFamily="34" charset="0"/>
+              <a:buChar char="•"/>
+            </a:pPr>
+            <a:endParaRPr lang="en-US" sz="1200" dirty="0">
+              <a:latin typeface="Noto Sans" panose="020B0502040504020204" pitchFamily="34" charset="0"/>
+              <a:ea typeface="Noto Sans" panose="020B0502040504020204" pitchFamily="34" charset="0"/>
+              <a:cs typeface="Noto Sans" panose="020B0502040504020204" pitchFamily="34" charset="0"/>
+            </a:endParaRPr>
+          </a:p>
+          <a:p>
+            <a:pPr marL="800100" lvl="1" indent="-342900" algn="just">
+              <a:buFont typeface="Arial" panose="020B0604020202020204" pitchFamily="34" charset="0"/>
+              <a:buChar char="•"/>
+            </a:pPr>
+            <a:endParaRPr lang="en-US" sz="1200" dirty="0">
+              <a:latin typeface="Noto Sans" panose="020B0502040504020204" pitchFamily="34" charset="0"/>
+              <a:ea typeface="Noto Sans" panose="020B0502040504020204" pitchFamily="34" charset="0"/>
+              <a:cs typeface="Noto Sans" panose="020B0502040504020204" pitchFamily="34" charset="0"/>
+            </a:endParaRPr>
+          </a:p>
+          <a:p>
+            <a:pPr marL="800100" lvl="1" indent="-342900" algn="just">
+              <a:buFont typeface="Arial" panose="020B0604020202020204" pitchFamily="34" charset="0"/>
+              <a:buChar char="•"/>
+            </a:pPr>
+            <a:endParaRPr lang="en-US" sz="1200" dirty="0">
+              <a:latin typeface="Noto Sans" panose="020B0502040504020204" pitchFamily="34" charset="0"/>
+              <a:ea typeface="Noto Sans" panose="020B0502040504020204" pitchFamily="34" charset="0"/>
+              <a:cs typeface="Noto Sans" panose="020B0502040504020204" pitchFamily="34" charset="0"/>
+            </a:endParaRPr>
+          </a:p>
+          <a:p>
+            <a:pPr marL="800100" lvl="1" indent="-342900" algn="just">
+              <a:buFont typeface="Arial" panose="020B0604020202020204" pitchFamily="34" charset="0"/>
+              <a:buChar char="•"/>
+            </a:pPr>
+            <a:endParaRPr lang="en-US" sz="1200" dirty="0">
+              <a:latin typeface="Noto Sans" panose="020B0502040504020204" pitchFamily="34" charset="0"/>
+              <a:ea typeface="Noto Sans" panose="020B0502040504020204" pitchFamily="34" charset="0"/>
+              <a:cs typeface="Noto Sans" panose="020B0502040504020204" pitchFamily="34" charset="0"/>
+            </a:endParaRPr>
+          </a:p>
+          <a:p>
+            <a:pPr marL="800100" lvl="1" indent="-342900" algn="just">
+              <a:buFont typeface="Arial" panose="020B0604020202020204" pitchFamily="34" charset="0"/>
+              <a:buChar char="•"/>
+            </a:pPr>
+            <a:endParaRPr lang="en-US" sz="1200" dirty="0">
+              <a:latin typeface="Noto Sans" panose="020B0502040504020204" pitchFamily="34" charset="0"/>
+              <a:ea typeface="Noto Sans" panose="020B0502040504020204" pitchFamily="34" charset="0"/>
+              <a:cs typeface="Noto Sans" panose="020B0502040504020204" pitchFamily="34" charset="0"/>
+            </a:endParaRPr>
+          </a:p>
+          <a:p>
+            <a:pPr marL="800100" lvl="1" indent="-342900" algn="just">
+              <a:buFont typeface="Arial" panose="020B0604020202020204" pitchFamily="34" charset="0"/>
+              <a:buChar char="•"/>
+            </a:pPr>
+            <a:endParaRPr lang="en-US" sz="1200" dirty="0">
+              <a:latin typeface="Noto Sans" panose="020B0502040504020204" pitchFamily="34" charset="0"/>
+              <a:ea typeface="Noto Sans" panose="020B0502040504020204" pitchFamily="34" charset="0"/>
+              <a:cs typeface="Noto Sans" panose="020B0502040504020204" pitchFamily="34" charset="0"/>
+            </a:endParaRPr>
+          </a:p>
+          <a:p>
+            <a:pPr marL="800100" lvl="1" indent="-342900" algn="just">
+              <a:buFont typeface="Arial" panose="020B0604020202020204" pitchFamily="34" charset="0"/>
+              <a:buChar char="•"/>
+            </a:pPr>
+            <a:endParaRPr lang="en-US" sz="1200" dirty="0">
+              <a:latin typeface="Noto Sans" panose="020B0502040504020204" pitchFamily="34" charset="0"/>
+              <a:ea typeface="Noto Sans" panose="020B0502040504020204" pitchFamily="34" charset="0"/>
+              <a:cs typeface="Noto Sans" panose="020B0502040504020204" pitchFamily="34" charset="0"/>
+            </a:endParaRPr>
+          </a:p>
+          <a:p>
+            <a:pPr marL="800100" lvl="1" indent="-342900" algn="just">
+              <a:buFont typeface="Arial" panose="020B0604020202020204" pitchFamily="34" charset="0"/>
+              <a:buChar char="•"/>
+            </a:pPr>
+            <a:endParaRPr lang="en-US" sz="1200" dirty="0">
+              <a:latin typeface="Noto Sans" panose="020B0502040504020204" pitchFamily="34" charset="0"/>
+              <a:ea typeface="Noto Sans" panose="020B0502040504020204" pitchFamily="34" charset="0"/>
+              <a:cs typeface="Noto Sans" panose="020B0502040504020204" pitchFamily="34" charset="0"/>
+            </a:endParaRPr>
+          </a:p>
+          <a:p>
+            <a:pPr marL="800100" lvl="1" indent="-342900" algn="just">
+              <a:buFont typeface="Arial" panose="020B0604020202020204" pitchFamily="34" charset="0"/>
+              <a:buChar char="•"/>
+            </a:pPr>
+            <a:endParaRPr lang="en-US" sz="1200" dirty="0">
               <a:latin typeface="Noto Sans" panose="020B0502040504020204" pitchFamily="34" charset="0"/>
               <a:ea typeface="Noto Sans" panose="020B0502040504020204" pitchFamily="34" charset="0"/>
               <a:cs typeface="Noto Sans" panose="020B0502040504020204" pitchFamily="34" charset="0"/>
@@ -6824,7 +7598,7 @@
 </p:sld>
 </file>
 
-<file path=ppt/slides/slide6.xml><?xml version="1.0" encoding="utf-8"?>
+<file path=ppt/slides/slide7.xml><?xml version="1.0" encoding="utf-8"?>
 <p:sld xmlns:a="http://schemas.openxmlformats.org/drawingml/2006/main" xmlns:r="http://schemas.openxmlformats.org/officeDocument/2006/relationships" xmlns:p="http://schemas.openxmlformats.org/presentationml/2006/main">
   <p:cSld>
     <p:spTree>
@@ -6871,10 +7645,10 @@
           <a:p>
             <a:pPr marL="342900" indent="-342900">
               <a:buFont typeface="+mj-lt"/>
-              <a:buAutoNum type="arabicParenR" startAt="5"/>
-            </a:pPr>
-            <a:r>
-              <a:rPr lang="en-US" sz="1400">
+              <a:buAutoNum type="arabicParenR" startAt="6"/>
+            </a:pPr>
+            <a:r>
+              <a:rPr lang="en-US" sz="1400" dirty="0">
                 <a:solidFill>
                   <a:schemeClr val="accent1"/>
                 </a:solidFill>
@@ -6888,21 +7662,21 @@
           <a:p>
             <a:pPr marL="342900" indent="-342900">
               <a:buFont typeface="+mj-lt"/>
-              <a:buAutoNum type="arabicParenR" startAt="5"/>
-            </a:pPr>
-            <a:endParaRPr lang="en-US" sz="1200">
-              <a:latin typeface="Noto Sans" panose="020B0502040504020204" pitchFamily="34" charset="0"/>
-              <a:ea typeface="Noto Sans" panose="020B0502040504020204" pitchFamily="34" charset="0"/>
-              <a:cs typeface="Noto Sans" panose="020B0502040504020204" pitchFamily="34" charset="0"/>
-            </a:endParaRPr>
-          </a:p>
-          <a:p>
-            <a:pPr marL="800100" lvl="1" indent="-342900" algn="just">
-              <a:buFont typeface="Arial" panose="020B0604020202020204" pitchFamily="34" charset="0"/>
-              <a:buChar char="•"/>
-            </a:pPr>
-            <a:r>
-              <a:rPr lang="en-US" sz="1200">
+              <a:buAutoNum type="arabicParenR" startAt="6"/>
+            </a:pPr>
+            <a:endParaRPr lang="en-US" sz="1200" dirty="0">
+              <a:latin typeface="Noto Sans" panose="020B0502040504020204" pitchFamily="34" charset="0"/>
+              <a:ea typeface="Noto Sans" panose="020B0502040504020204" pitchFamily="34" charset="0"/>
+              <a:cs typeface="Noto Sans" panose="020B0502040504020204" pitchFamily="34" charset="0"/>
+            </a:endParaRPr>
+          </a:p>
+          <a:p>
+            <a:pPr marL="800100" lvl="1" indent="-342900" algn="just">
+              <a:buFont typeface="Arial" panose="020B0604020202020204" pitchFamily="34" charset="0"/>
+              <a:buChar char="•"/>
+            </a:pPr>
+            <a:r>
+              <a:rPr lang="en-US" sz="1200" dirty="0">
                 <a:latin typeface="Noto Sans" panose="020B0502040504020204" pitchFamily="34" charset="0"/>
                 <a:ea typeface="Noto Sans" panose="020B0502040504020204" pitchFamily="34" charset="0"/>
                 <a:cs typeface="Noto Sans" panose="020B0502040504020204" pitchFamily="34" charset="0"/>
@@ -6915,129 +7689,129 @@
               <a:buFont typeface="Arial" panose="020B0604020202020204" pitchFamily="34" charset="0"/>
               <a:buChar char="•"/>
             </a:pPr>
-            <a:endParaRPr lang="en-US" sz="1200">
-              <a:latin typeface="Noto Sans" panose="020B0502040504020204" pitchFamily="34" charset="0"/>
-              <a:ea typeface="Noto Sans" panose="020B0502040504020204" pitchFamily="34" charset="0"/>
-              <a:cs typeface="Noto Sans" panose="020B0502040504020204" pitchFamily="34" charset="0"/>
-            </a:endParaRPr>
-          </a:p>
-          <a:p>
-            <a:pPr marL="800100" lvl="1" indent="-342900" algn="just">
-              <a:buFont typeface="Arial" panose="020B0604020202020204" pitchFamily="34" charset="0"/>
-              <a:buChar char="•"/>
-            </a:pPr>
-            <a:endParaRPr lang="en-US" sz="1200">
-              <a:latin typeface="Noto Sans" panose="020B0502040504020204" pitchFamily="34" charset="0"/>
-              <a:ea typeface="Noto Sans" panose="020B0502040504020204" pitchFamily="34" charset="0"/>
-              <a:cs typeface="Noto Sans" panose="020B0502040504020204" pitchFamily="34" charset="0"/>
-            </a:endParaRPr>
-          </a:p>
-          <a:p>
-            <a:pPr marL="800100" lvl="1" indent="-342900" algn="just">
-              <a:buFont typeface="Arial" panose="020B0604020202020204" pitchFamily="34" charset="0"/>
-              <a:buChar char="•"/>
-            </a:pPr>
-            <a:endParaRPr lang="en-US" sz="1200">
-              <a:latin typeface="Noto Sans" panose="020B0502040504020204" pitchFamily="34" charset="0"/>
-              <a:ea typeface="Noto Sans" panose="020B0502040504020204" pitchFamily="34" charset="0"/>
-              <a:cs typeface="Noto Sans" panose="020B0502040504020204" pitchFamily="34" charset="0"/>
-            </a:endParaRPr>
-          </a:p>
-          <a:p>
-            <a:pPr marL="800100" lvl="1" indent="-342900" algn="just">
-              <a:buFont typeface="Arial" panose="020B0604020202020204" pitchFamily="34" charset="0"/>
-              <a:buChar char="•"/>
-            </a:pPr>
-            <a:endParaRPr lang="en-US" sz="1200">
-              <a:latin typeface="Noto Sans" panose="020B0502040504020204" pitchFamily="34" charset="0"/>
-              <a:ea typeface="Noto Sans" panose="020B0502040504020204" pitchFamily="34" charset="0"/>
-              <a:cs typeface="Noto Sans" panose="020B0502040504020204" pitchFamily="34" charset="0"/>
-            </a:endParaRPr>
-          </a:p>
-          <a:p>
-            <a:pPr marL="800100" lvl="1" indent="-342900" algn="just">
-              <a:buFont typeface="Arial" panose="020B0604020202020204" pitchFamily="34" charset="0"/>
-              <a:buChar char="•"/>
-            </a:pPr>
-            <a:endParaRPr lang="en-US" sz="1200">
-              <a:latin typeface="Noto Sans" panose="020B0502040504020204" pitchFamily="34" charset="0"/>
-              <a:ea typeface="Noto Sans" panose="020B0502040504020204" pitchFamily="34" charset="0"/>
-              <a:cs typeface="Noto Sans" panose="020B0502040504020204" pitchFamily="34" charset="0"/>
-            </a:endParaRPr>
-          </a:p>
-          <a:p>
-            <a:pPr marL="800100" lvl="1" indent="-342900" algn="just">
-              <a:buFont typeface="Arial" panose="020B0604020202020204" pitchFamily="34" charset="0"/>
-              <a:buChar char="•"/>
-            </a:pPr>
-            <a:endParaRPr lang="en-US" sz="1200">
-              <a:latin typeface="Noto Sans" panose="020B0502040504020204" pitchFamily="34" charset="0"/>
-              <a:ea typeface="Noto Sans" panose="020B0502040504020204" pitchFamily="34" charset="0"/>
-              <a:cs typeface="Noto Sans" panose="020B0502040504020204" pitchFamily="34" charset="0"/>
-            </a:endParaRPr>
-          </a:p>
-          <a:p>
-            <a:pPr marL="800100" lvl="1" indent="-342900" algn="just">
-              <a:buFont typeface="Arial" panose="020B0604020202020204" pitchFamily="34" charset="0"/>
-              <a:buChar char="•"/>
-            </a:pPr>
-            <a:endParaRPr lang="en-US" sz="1200">
-              <a:latin typeface="Noto Sans" panose="020B0502040504020204" pitchFamily="34" charset="0"/>
-              <a:ea typeface="Noto Sans" panose="020B0502040504020204" pitchFamily="34" charset="0"/>
-              <a:cs typeface="Noto Sans" panose="020B0502040504020204" pitchFamily="34" charset="0"/>
-            </a:endParaRPr>
-          </a:p>
-          <a:p>
-            <a:pPr marL="800100" lvl="1" indent="-342900" algn="just">
-              <a:buFont typeface="Arial" panose="020B0604020202020204" pitchFamily="34" charset="0"/>
-              <a:buChar char="•"/>
-            </a:pPr>
-            <a:endParaRPr lang="en-US" sz="1200">
-              <a:latin typeface="Noto Sans" panose="020B0502040504020204" pitchFamily="34" charset="0"/>
-              <a:ea typeface="Noto Sans" panose="020B0502040504020204" pitchFamily="34" charset="0"/>
-              <a:cs typeface="Noto Sans" panose="020B0502040504020204" pitchFamily="34" charset="0"/>
-            </a:endParaRPr>
-          </a:p>
-          <a:p>
-            <a:pPr marL="800100" lvl="1" indent="-342900" algn="just">
-              <a:buFont typeface="Arial" panose="020B0604020202020204" pitchFamily="34" charset="0"/>
-              <a:buChar char="•"/>
-            </a:pPr>
-            <a:endParaRPr lang="en-US" sz="1200">
-              <a:latin typeface="Noto Sans" panose="020B0502040504020204" pitchFamily="34" charset="0"/>
-              <a:ea typeface="Noto Sans" panose="020B0502040504020204" pitchFamily="34" charset="0"/>
-              <a:cs typeface="Noto Sans" panose="020B0502040504020204" pitchFamily="34" charset="0"/>
-            </a:endParaRPr>
-          </a:p>
-          <a:p>
-            <a:pPr marL="800100" lvl="1" indent="-342900" algn="just">
-              <a:buFont typeface="Arial" panose="020B0604020202020204" pitchFamily="34" charset="0"/>
-              <a:buChar char="•"/>
-            </a:pPr>
-            <a:endParaRPr lang="en-US" sz="1200">
-              <a:latin typeface="Noto Sans" panose="020B0502040504020204" pitchFamily="34" charset="0"/>
-              <a:ea typeface="Noto Sans" panose="020B0502040504020204" pitchFamily="34" charset="0"/>
-              <a:cs typeface="Noto Sans" panose="020B0502040504020204" pitchFamily="34" charset="0"/>
-            </a:endParaRPr>
-          </a:p>
-          <a:p>
-            <a:pPr marL="800100" lvl="1" indent="-342900" algn="just">
-              <a:buFont typeface="Arial" panose="020B0604020202020204" pitchFamily="34" charset="0"/>
-              <a:buChar char="•"/>
-            </a:pPr>
-            <a:endParaRPr lang="en-US" sz="1200">
-              <a:latin typeface="Noto Sans" panose="020B0502040504020204" pitchFamily="34" charset="0"/>
-              <a:ea typeface="Noto Sans" panose="020B0502040504020204" pitchFamily="34" charset="0"/>
-              <a:cs typeface="Noto Sans" panose="020B0502040504020204" pitchFamily="34" charset="0"/>
-            </a:endParaRPr>
-          </a:p>
-          <a:p>
-            <a:pPr marL="800100" lvl="1" indent="-342900" algn="just">
-              <a:buFont typeface="Arial" panose="020B0604020202020204" pitchFamily="34" charset="0"/>
-              <a:buChar char="•"/>
-            </a:pPr>
-            <a:r>
-              <a:rPr lang="en-US" sz="1200">
+            <a:endParaRPr lang="en-US" sz="1200" dirty="0">
+              <a:latin typeface="Noto Sans" panose="020B0502040504020204" pitchFamily="34" charset="0"/>
+              <a:ea typeface="Noto Sans" panose="020B0502040504020204" pitchFamily="34" charset="0"/>
+              <a:cs typeface="Noto Sans" panose="020B0502040504020204" pitchFamily="34" charset="0"/>
+            </a:endParaRPr>
+          </a:p>
+          <a:p>
+            <a:pPr marL="800100" lvl="1" indent="-342900" algn="just">
+              <a:buFont typeface="Arial" panose="020B0604020202020204" pitchFamily="34" charset="0"/>
+              <a:buChar char="•"/>
+            </a:pPr>
+            <a:endParaRPr lang="en-US" sz="1200" dirty="0">
+              <a:latin typeface="Noto Sans" panose="020B0502040504020204" pitchFamily="34" charset="0"/>
+              <a:ea typeface="Noto Sans" panose="020B0502040504020204" pitchFamily="34" charset="0"/>
+              <a:cs typeface="Noto Sans" panose="020B0502040504020204" pitchFamily="34" charset="0"/>
+            </a:endParaRPr>
+          </a:p>
+          <a:p>
+            <a:pPr marL="800100" lvl="1" indent="-342900" algn="just">
+              <a:buFont typeface="Arial" panose="020B0604020202020204" pitchFamily="34" charset="0"/>
+              <a:buChar char="•"/>
+            </a:pPr>
+            <a:endParaRPr lang="en-US" sz="1200" dirty="0">
+              <a:latin typeface="Noto Sans" panose="020B0502040504020204" pitchFamily="34" charset="0"/>
+              <a:ea typeface="Noto Sans" panose="020B0502040504020204" pitchFamily="34" charset="0"/>
+              <a:cs typeface="Noto Sans" panose="020B0502040504020204" pitchFamily="34" charset="0"/>
+            </a:endParaRPr>
+          </a:p>
+          <a:p>
+            <a:pPr marL="800100" lvl="1" indent="-342900" algn="just">
+              <a:buFont typeface="Arial" panose="020B0604020202020204" pitchFamily="34" charset="0"/>
+              <a:buChar char="•"/>
+            </a:pPr>
+            <a:endParaRPr lang="en-US" sz="1200" dirty="0">
+              <a:latin typeface="Noto Sans" panose="020B0502040504020204" pitchFamily="34" charset="0"/>
+              <a:ea typeface="Noto Sans" panose="020B0502040504020204" pitchFamily="34" charset="0"/>
+              <a:cs typeface="Noto Sans" panose="020B0502040504020204" pitchFamily="34" charset="0"/>
+            </a:endParaRPr>
+          </a:p>
+          <a:p>
+            <a:pPr marL="800100" lvl="1" indent="-342900" algn="just">
+              <a:buFont typeface="Arial" panose="020B0604020202020204" pitchFamily="34" charset="0"/>
+              <a:buChar char="•"/>
+            </a:pPr>
+            <a:endParaRPr lang="en-US" sz="1200" dirty="0">
+              <a:latin typeface="Noto Sans" panose="020B0502040504020204" pitchFamily="34" charset="0"/>
+              <a:ea typeface="Noto Sans" panose="020B0502040504020204" pitchFamily="34" charset="0"/>
+              <a:cs typeface="Noto Sans" panose="020B0502040504020204" pitchFamily="34" charset="0"/>
+            </a:endParaRPr>
+          </a:p>
+          <a:p>
+            <a:pPr marL="800100" lvl="1" indent="-342900" algn="just">
+              <a:buFont typeface="Arial" panose="020B0604020202020204" pitchFamily="34" charset="0"/>
+              <a:buChar char="•"/>
+            </a:pPr>
+            <a:endParaRPr lang="en-US" sz="1200" dirty="0">
+              <a:latin typeface="Noto Sans" panose="020B0502040504020204" pitchFamily="34" charset="0"/>
+              <a:ea typeface="Noto Sans" panose="020B0502040504020204" pitchFamily="34" charset="0"/>
+              <a:cs typeface="Noto Sans" panose="020B0502040504020204" pitchFamily="34" charset="0"/>
+            </a:endParaRPr>
+          </a:p>
+          <a:p>
+            <a:pPr marL="800100" lvl="1" indent="-342900" algn="just">
+              <a:buFont typeface="Arial" panose="020B0604020202020204" pitchFamily="34" charset="0"/>
+              <a:buChar char="•"/>
+            </a:pPr>
+            <a:endParaRPr lang="en-US" sz="1200" dirty="0">
+              <a:latin typeface="Noto Sans" panose="020B0502040504020204" pitchFamily="34" charset="0"/>
+              <a:ea typeface="Noto Sans" panose="020B0502040504020204" pitchFamily="34" charset="0"/>
+              <a:cs typeface="Noto Sans" panose="020B0502040504020204" pitchFamily="34" charset="0"/>
+            </a:endParaRPr>
+          </a:p>
+          <a:p>
+            <a:pPr marL="800100" lvl="1" indent="-342900" algn="just">
+              <a:buFont typeface="Arial" panose="020B0604020202020204" pitchFamily="34" charset="0"/>
+              <a:buChar char="•"/>
+            </a:pPr>
+            <a:endParaRPr lang="en-US" sz="1200" dirty="0">
+              <a:latin typeface="Noto Sans" panose="020B0502040504020204" pitchFamily="34" charset="0"/>
+              <a:ea typeface="Noto Sans" panose="020B0502040504020204" pitchFamily="34" charset="0"/>
+              <a:cs typeface="Noto Sans" panose="020B0502040504020204" pitchFamily="34" charset="0"/>
+            </a:endParaRPr>
+          </a:p>
+          <a:p>
+            <a:pPr marL="800100" lvl="1" indent="-342900" algn="just">
+              <a:buFont typeface="Arial" panose="020B0604020202020204" pitchFamily="34" charset="0"/>
+              <a:buChar char="•"/>
+            </a:pPr>
+            <a:endParaRPr lang="en-US" sz="1200" dirty="0">
+              <a:latin typeface="Noto Sans" panose="020B0502040504020204" pitchFamily="34" charset="0"/>
+              <a:ea typeface="Noto Sans" panose="020B0502040504020204" pitchFamily="34" charset="0"/>
+              <a:cs typeface="Noto Sans" panose="020B0502040504020204" pitchFamily="34" charset="0"/>
+            </a:endParaRPr>
+          </a:p>
+          <a:p>
+            <a:pPr marL="800100" lvl="1" indent="-342900" algn="just">
+              <a:buFont typeface="Arial" panose="020B0604020202020204" pitchFamily="34" charset="0"/>
+              <a:buChar char="•"/>
+            </a:pPr>
+            <a:endParaRPr lang="en-US" sz="1200" dirty="0">
+              <a:latin typeface="Noto Sans" panose="020B0502040504020204" pitchFamily="34" charset="0"/>
+              <a:ea typeface="Noto Sans" panose="020B0502040504020204" pitchFamily="34" charset="0"/>
+              <a:cs typeface="Noto Sans" panose="020B0502040504020204" pitchFamily="34" charset="0"/>
+            </a:endParaRPr>
+          </a:p>
+          <a:p>
+            <a:pPr marL="800100" lvl="1" indent="-342900" algn="just">
+              <a:buFont typeface="Arial" panose="020B0604020202020204" pitchFamily="34" charset="0"/>
+              <a:buChar char="•"/>
+            </a:pPr>
+            <a:endParaRPr lang="en-US" sz="1200" dirty="0">
+              <a:latin typeface="Noto Sans" panose="020B0502040504020204" pitchFamily="34" charset="0"/>
+              <a:ea typeface="Noto Sans" panose="020B0502040504020204" pitchFamily="34" charset="0"/>
+              <a:cs typeface="Noto Sans" panose="020B0502040504020204" pitchFamily="34" charset="0"/>
+            </a:endParaRPr>
+          </a:p>
+          <a:p>
+            <a:pPr marL="800100" lvl="1" indent="-342900" algn="just">
+              <a:buFont typeface="Arial" panose="020B0604020202020204" pitchFamily="34" charset="0"/>
+              <a:buChar char="•"/>
+            </a:pPr>
+            <a:r>
+              <a:rPr lang="en-US" sz="1200" dirty="0">
                 <a:latin typeface="Noto Sans" panose="020B0502040504020204" pitchFamily="34" charset="0"/>
                 <a:ea typeface="Noto Sans" panose="020B0502040504020204" pitchFamily="34" charset="0"/>
                 <a:cs typeface="Noto Sans" panose="020B0502040504020204" pitchFamily="34" charset="0"/>
@@ -7050,151 +7824,151 @@
               <a:buFont typeface="Arial" panose="020B0604020202020204" pitchFamily="34" charset="0"/>
               <a:buChar char="•"/>
             </a:pPr>
-            <a:endParaRPr lang="en-US" sz="1200">
-              <a:latin typeface="Noto Sans" panose="020B0502040504020204" pitchFamily="34" charset="0"/>
-              <a:ea typeface="Noto Sans" panose="020B0502040504020204" pitchFamily="34" charset="0"/>
-              <a:cs typeface="Noto Sans" panose="020B0502040504020204" pitchFamily="34" charset="0"/>
-            </a:endParaRPr>
-          </a:p>
-          <a:p>
-            <a:pPr marL="800100" lvl="1" indent="-342900" algn="just">
-              <a:buFont typeface="Arial" panose="020B0604020202020204" pitchFamily="34" charset="0"/>
-              <a:buChar char="•"/>
-            </a:pPr>
-            <a:endParaRPr lang="en-US" sz="1200">
-              <a:latin typeface="Noto Sans" panose="020B0502040504020204" pitchFamily="34" charset="0"/>
-              <a:ea typeface="Noto Sans" panose="020B0502040504020204" pitchFamily="34" charset="0"/>
-              <a:cs typeface="Noto Sans" panose="020B0502040504020204" pitchFamily="34" charset="0"/>
-            </a:endParaRPr>
-          </a:p>
-          <a:p>
-            <a:pPr marL="800100" lvl="1" indent="-342900" algn="just">
-              <a:buFont typeface="Arial" panose="020B0604020202020204" pitchFamily="34" charset="0"/>
-              <a:buChar char="•"/>
-            </a:pPr>
-            <a:endParaRPr lang="en-US" sz="1200">
-              <a:latin typeface="Noto Sans" panose="020B0502040504020204" pitchFamily="34" charset="0"/>
-              <a:ea typeface="Noto Sans" panose="020B0502040504020204" pitchFamily="34" charset="0"/>
-              <a:cs typeface="Noto Sans" panose="020B0502040504020204" pitchFamily="34" charset="0"/>
-            </a:endParaRPr>
-          </a:p>
-          <a:p>
-            <a:pPr marL="800100" lvl="1" indent="-342900" algn="just">
-              <a:buFont typeface="Arial" panose="020B0604020202020204" pitchFamily="34" charset="0"/>
-              <a:buChar char="•"/>
-            </a:pPr>
-            <a:endParaRPr lang="en-US" sz="1200">
-              <a:latin typeface="Noto Sans" panose="020B0502040504020204" pitchFamily="34" charset="0"/>
-              <a:ea typeface="Noto Sans" panose="020B0502040504020204" pitchFamily="34" charset="0"/>
-              <a:cs typeface="Noto Sans" panose="020B0502040504020204" pitchFamily="34" charset="0"/>
-            </a:endParaRPr>
-          </a:p>
-          <a:p>
-            <a:pPr marL="800100" lvl="1" indent="-342900" algn="just">
-              <a:buFont typeface="Arial" panose="020B0604020202020204" pitchFamily="34" charset="0"/>
-              <a:buChar char="•"/>
-            </a:pPr>
-            <a:endParaRPr lang="en-US" sz="1200">
-              <a:latin typeface="Noto Sans" panose="020B0502040504020204" pitchFamily="34" charset="0"/>
-              <a:ea typeface="Noto Sans" panose="020B0502040504020204" pitchFamily="34" charset="0"/>
-              <a:cs typeface="Noto Sans" panose="020B0502040504020204" pitchFamily="34" charset="0"/>
-            </a:endParaRPr>
-          </a:p>
-          <a:p>
-            <a:pPr marL="800100" lvl="1" indent="-342900" algn="just">
-              <a:buFont typeface="Arial" panose="020B0604020202020204" pitchFamily="34" charset="0"/>
-              <a:buChar char="•"/>
-            </a:pPr>
-            <a:endParaRPr lang="en-US" sz="1200">
-              <a:latin typeface="Noto Sans" panose="020B0502040504020204" pitchFamily="34" charset="0"/>
-              <a:ea typeface="Noto Sans" panose="020B0502040504020204" pitchFamily="34" charset="0"/>
-              <a:cs typeface="Noto Sans" panose="020B0502040504020204" pitchFamily="34" charset="0"/>
-            </a:endParaRPr>
-          </a:p>
-          <a:p>
-            <a:pPr marL="800100" lvl="1" indent="-342900" algn="just">
-              <a:buFont typeface="Arial" panose="020B0604020202020204" pitchFamily="34" charset="0"/>
-              <a:buChar char="•"/>
-            </a:pPr>
-            <a:endParaRPr lang="en-US" sz="1200">
-              <a:latin typeface="Noto Sans" panose="020B0502040504020204" pitchFamily="34" charset="0"/>
-              <a:ea typeface="Noto Sans" panose="020B0502040504020204" pitchFamily="34" charset="0"/>
-              <a:cs typeface="Noto Sans" panose="020B0502040504020204" pitchFamily="34" charset="0"/>
-            </a:endParaRPr>
-          </a:p>
-          <a:p>
-            <a:pPr marL="800100" lvl="1" indent="-342900" algn="just">
-              <a:buFont typeface="Arial" panose="020B0604020202020204" pitchFamily="34" charset="0"/>
-              <a:buChar char="•"/>
-            </a:pPr>
-            <a:endParaRPr lang="en-US" sz="1200">
-              <a:latin typeface="Noto Sans" panose="020B0502040504020204" pitchFamily="34" charset="0"/>
-              <a:ea typeface="Noto Sans" panose="020B0502040504020204" pitchFamily="34" charset="0"/>
-              <a:cs typeface="Noto Sans" panose="020B0502040504020204" pitchFamily="34" charset="0"/>
-            </a:endParaRPr>
-          </a:p>
-          <a:p>
-            <a:pPr marL="800100" lvl="1" indent="-342900" algn="just">
-              <a:buFont typeface="Arial" panose="020B0604020202020204" pitchFamily="34" charset="0"/>
-              <a:buChar char="•"/>
-            </a:pPr>
-            <a:endParaRPr lang="en-US" sz="1200">
-              <a:latin typeface="Noto Sans" panose="020B0502040504020204" pitchFamily="34" charset="0"/>
-              <a:ea typeface="Noto Sans" panose="020B0502040504020204" pitchFamily="34" charset="0"/>
-              <a:cs typeface="Noto Sans" panose="020B0502040504020204" pitchFamily="34" charset="0"/>
-            </a:endParaRPr>
-          </a:p>
-          <a:p>
-            <a:pPr marL="800100" lvl="1" indent="-342900" algn="just">
-              <a:buFont typeface="Arial" panose="020B0604020202020204" pitchFamily="34" charset="0"/>
-              <a:buChar char="•"/>
-            </a:pPr>
-            <a:endParaRPr lang="en-US" sz="1200">
-              <a:latin typeface="Noto Sans" panose="020B0502040504020204" pitchFamily="34" charset="0"/>
-              <a:ea typeface="Noto Sans" panose="020B0502040504020204" pitchFamily="34" charset="0"/>
-              <a:cs typeface="Noto Sans" panose="020B0502040504020204" pitchFamily="34" charset="0"/>
-            </a:endParaRPr>
-          </a:p>
-          <a:p>
-            <a:pPr marL="800100" lvl="1" indent="-342900" algn="just">
-              <a:buFont typeface="Arial" panose="020B0604020202020204" pitchFamily="34" charset="0"/>
-              <a:buChar char="•"/>
-            </a:pPr>
-            <a:endParaRPr lang="en-US" sz="1200">
-              <a:latin typeface="Noto Sans" panose="020B0502040504020204" pitchFamily="34" charset="0"/>
-              <a:ea typeface="Noto Sans" panose="020B0502040504020204" pitchFamily="34" charset="0"/>
-              <a:cs typeface="Noto Sans" panose="020B0502040504020204" pitchFamily="34" charset="0"/>
-            </a:endParaRPr>
-          </a:p>
-          <a:p>
-            <a:pPr marL="800100" lvl="1" indent="-342900" algn="just">
-              <a:buFont typeface="Arial" panose="020B0604020202020204" pitchFamily="34" charset="0"/>
-              <a:buChar char="•"/>
-            </a:pPr>
-            <a:endParaRPr lang="en-US" sz="1200">
-              <a:latin typeface="Noto Sans" panose="020B0502040504020204" pitchFamily="34" charset="0"/>
-              <a:ea typeface="Noto Sans" panose="020B0502040504020204" pitchFamily="34" charset="0"/>
-              <a:cs typeface="Noto Sans" panose="020B0502040504020204" pitchFamily="34" charset="0"/>
-            </a:endParaRPr>
-          </a:p>
-          <a:p>
-            <a:pPr marL="800100" lvl="1" indent="-342900" algn="just">
-              <a:buFont typeface="Arial" panose="020B0604020202020204" pitchFamily="34" charset="0"/>
-              <a:buChar char="•"/>
-            </a:pPr>
-            <a:endParaRPr lang="en-US" sz="1200">
-              <a:latin typeface="Noto Sans" panose="020B0502040504020204" pitchFamily="34" charset="0"/>
-              <a:ea typeface="Noto Sans" panose="020B0502040504020204" pitchFamily="34" charset="0"/>
-              <a:cs typeface="Noto Sans" panose="020B0502040504020204" pitchFamily="34" charset="0"/>
-            </a:endParaRPr>
-          </a:p>
-          <a:p>
-            <a:pPr marL="800100" lvl="1" indent="-342900" algn="just">
-              <a:buFont typeface="Arial" panose="020B0604020202020204" pitchFamily="34" charset="0"/>
-              <a:buChar char="•"/>
-            </a:pPr>
-            <a:r>
-              <a:rPr lang="en-US" sz="1200">
+            <a:endParaRPr lang="en-US" sz="1200" dirty="0">
+              <a:latin typeface="Noto Sans" panose="020B0502040504020204" pitchFamily="34" charset="0"/>
+              <a:ea typeface="Noto Sans" panose="020B0502040504020204" pitchFamily="34" charset="0"/>
+              <a:cs typeface="Noto Sans" panose="020B0502040504020204" pitchFamily="34" charset="0"/>
+            </a:endParaRPr>
+          </a:p>
+          <a:p>
+            <a:pPr marL="800100" lvl="1" indent="-342900" algn="just">
+              <a:buFont typeface="Arial" panose="020B0604020202020204" pitchFamily="34" charset="0"/>
+              <a:buChar char="•"/>
+            </a:pPr>
+            <a:endParaRPr lang="en-US" sz="1200" dirty="0">
+              <a:latin typeface="Noto Sans" panose="020B0502040504020204" pitchFamily="34" charset="0"/>
+              <a:ea typeface="Noto Sans" panose="020B0502040504020204" pitchFamily="34" charset="0"/>
+              <a:cs typeface="Noto Sans" panose="020B0502040504020204" pitchFamily="34" charset="0"/>
+            </a:endParaRPr>
+          </a:p>
+          <a:p>
+            <a:pPr marL="800100" lvl="1" indent="-342900" algn="just">
+              <a:buFont typeface="Arial" panose="020B0604020202020204" pitchFamily="34" charset="0"/>
+              <a:buChar char="•"/>
+            </a:pPr>
+            <a:endParaRPr lang="en-US" sz="1200" dirty="0">
+              <a:latin typeface="Noto Sans" panose="020B0502040504020204" pitchFamily="34" charset="0"/>
+              <a:ea typeface="Noto Sans" panose="020B0502040504020204" pitchFamily="34" charset="0"/>
+              <a:cs typeface="Noto Sans" panose="020B0502040504020204" pitchFamily="34" charset="0"/>
+            </a:endParaRPr>
+          </a:p>
+          <a:p>
+            <a:pPr marL="800100" lvl="1" indent="-342900" algn="just">
+              <a:buFont typeface="Arial" panose="020B0604020202020204" pitchFamily="34" charset="0"/>
+              <a:buChar char="•"/>
+            </a:pPr>
+            <a:endParaRPr lang="en-US" sz="1200" dirty="0">
+              <a:latin typeface="Noto Sans" panose="020B0502040504020204" pitchFamily="34" charset="0"/>
+              <a:ea typeface="Noto Sans" panose="020B0502040504020204" pitchFamily="34" charset="0"/>
+              <a:cs typeface="Noto Sans" panose="020B0502040504020204" pitchFamily="34" charset="0"/>
+            </a:endParaRPr>
+          </a:p>
+          <a:p>
+            <a:pPr marL="800100" lvl="1" indent="-342900" algn="just">
+              <a:buFont typeface="Arial" panose="020B0604020202020204" pitchFamily="34" charset="0"/>
+              <a:buChar char="•"/>
+            </a:pPr>
+            <a:endParaRPr lang="en-US" sz="1200" dirty="0">
+              <a:latin typeface="Noto Sans" panose="020B0502040504020204" pitchFamily="34" charset="0"/>
+              <a:ea typeface="Noto Sans" panose="020B0502040504020204" pitchFamily="34" charset="0"/>
+              <a:cs typeface="Noto Sans" panose="020B0502040504020204" pitchFamily="34" charset="0"/>
+            </a:endParaRPr>
+          </a:p>
+          <a:p>
+            <a:pPr marL="800100" lvl="1" indent="-342900" algn="just">
+              <a:buFont typeface="Arial" panose="020B0604020202020204" pitchFamily="34" charset="0"/>
+              <a:buChar char="•"/>
+            </a:pPr>
+            <a:endParaRPr lang="en-US" sz="1200" dirty="0">
+              <a:latin typeface="Noto Sans" panose="020B0502040504020204" pitchFamily="34" charset="0"/>
+              <a:ea typeface="Noto Sans" panose="020B0502040504020204" pitchFamily="34" charset="0"/>
+              <a:cs typeface="Noto Sans" panose="020B0502040504020204" pitchFamily="34" charset="0"/>
+            </a:endParaRPr>
+          </a:p>
+          <a:p>
+            <a:pPr marL="800100" lvl="1" indent="-342900" algn="just">
+              <a:buFont typeface="Arial" panose="020B0604020202020204" pitchFamily="34" charset="0"/>
+              <a:buChar char="•"/>
+            </a:pPr>
+            <a:endParaRPr lang="en-US" sz="1200" dirty="0">
+              <a:latin typeface="Noto Sans" panose="020B0502040504020204" pitchFamily="34" charset="0"/>
+              <a:ea typeface="Noto Sans" panose="020B0502040504020204" pitchFamily="34" charset="0"/>
+              <a:cs typeface="Noto Sans" panose="020B0502040504020204" pitchFamily="34" charset="0"/>
+            </a:endParaRPr>
+          </a:p>
+          <a:p>
+            <a:pPr marL="800100" lvl="1" indent="-342900" algn="just">
+              <a:buFont typeface="Arial" panose="020B0604020202020204" pitchFamily="34" charset="0"/>
+              <a:buChar char="•"/>
+            </a:pPr>
+            <a:endParaRPr lang="en-US" sz="1200" dirty="0">
+              <a:latin typeface="Noto Sans" panose="020B0502040504020204" pitchFamily="34" charset="0"/>
+              <a:ea typeface="Noto Sans" panose="020B0502040504020204" pitchFamily="34" charset="0"/>
+              <a:cs typeface="Noto Sans" panose="020B0502040504020204" pitchFamily="34" charset="0"/>
+            </a:endParaRPr>
+          </a:p>
+          <a:p>
+            <a:pPr marL="800100" lvl="1" indent="-342900" algn="just">
+              <a:buFont typeface="Arial" panose="020B0604020202020204" pitchFamily="34" charset="0"/>
+              <a:buChar char="•"/>
+            </a:pPr>
+            <a:endParaRPr lang="en-US" sz="1200" dirty="0">
+              <a:latin typeface="Noto Sans" panose="020B0502040504020204" pitchFamily="34" charset="0"/>
+              <a:ea typeface="Noto Sans" panose="020B0502040504020204" pitchFamily="34" charset="0"/>
+              <a:cs typeface="Noto Sans" panose="020B0502040504020204" pitchFamily="34" charset="0"/>
+            </a:endParaRPr>
+          </a:p>
+          <a:p>
+            <a:pPr marL="800100" lvl="1" indent="-342900" algn="just">
+              <a:buFont typeface="Arial" panose="020B0604020202020204" pitchFamily="34" charset="0"/>
+              <a:buChar char="•"/>
+            </a:pPr>
+            <a:endParaRPr lang="en-US" sz="1200" dirty="0">
+              <a:latin typeface="Noto Sans" panose="020B0502040504020204" pitchFamily="34" charset="0"/>
+              <a:ea typeface="Noto Sans" panose="020B0502040504020204" pitchFamily="34" charset="0"/>
+              <a:cs typeface="Noto Sans" panose="020B0502040504020204" pitchFamily="34" charset="0"/>
+            </a:endParaRPr>
+          </a:p>
+          <a:p>
+            <a:pPr marL="800100" lvl="1" indent="-342900" algn="just">
+              <a:buFont typeface="Arial" panose="020B0604020202020204" pitchFamily="34" charset="0"/>
+              <a:buChar char="•"/>
+            </a:pPr>
+            <a:endParaRPr lang="en-US" sz="1200" dirty="0">
+              <a:latin typeface="Noto Sans" panose="020B0502040504020204" pitchFamily="34" charset="0"/>
+              <a:ea typeface="Noto Sans" panose="020B0502040504020204" pitchFamily="34" charset="0"/>
+              <a:cs typeface="Noto Sans" panose="020B0502040504020204" pitchFamily="34" charset="0"/>
+            </a:endParaRPr>
+          </a:p>
+          <a:p>
+            <a:pPr marL="800100" lvl="1" indent="-342900" algn="just">
+              <a:buFont typeface="Arial" panose="020B0604020202020204" pitchFamily="34" charset="0"/>
+              <a:buChar char="•"/>
+            </a:pPr>
+            <a:endParaRPr lang="en-US" sz="1200" dirty="0">
+              <a:latin typeface="Noto Sans" panose="020B0502040504020204" pitchFamily="34" charset="0"/>
+              <a:ea typeface="Noto Sans" panose="020B0502040504020204" pitchFamily="34" charset="0"/>
+              <a:cs typeface="Noto Sans" panose="020B0502040504020204" pitchFamily="34" charset="0"/>
+            </a:endParaRPr>
+          </a:p>
+          <a:p>
+            <a:pPr marL="800100" lvl="1" indent="-342900" algn="just">
+              <a:buFont typeface="Arial" panose="020B0604020202020204" pitchFamily="34" charset="0"/>
+              <a:buChar char="•"/>
+            </a:pPr>
+            <a:endParaRPr lang="en-US" sz="1200" dirty="0">
+              <a:latin typeface="Noto Sans" panose="020B0502040504020204" pitchFamily="34" charset="0"/>
+              <a:ea typeface="Noto Sans" panose="020B0502040504020204" pitchFamily="34" charset="0"/>
+              <a:cs typeface="Noto Sans" panose="020B0502040504020204" pitchFamily="34" charset="0"/>
+            </a:endParaRPr>
+          </a:p>
+          <a:p>
+            <a:pPr marL="800100" lvl="1" indent="-342900" algn="just">
+              <a:buFont typeface="Arial" panose="020B0604020202020204" pitchFamily="34" charset="0"/>
+              <a:buChar char="•"/>
+            </a:pPr>
+            <a:r>
+              <a:rPr lang="en-US" sz="1200" dirty="0">
                 <a:latin typeface="Noto Sans" panose="020B0502040504020204" pitchFamily="34" charset="0"/>
                 <a:ea typeface="Noto Sans" panose="020B0502040504020204" pitchFamily="34" charset="0"/>
                 <a:cs typeface="Noto Sans" panose="020B0502040504020204" pitchFamily="34" charset="0"/>
@@ -7207,18 +7981,18 @@
               <a:buFont typeface="Arial" panose="020B0604020202020204" pitchFamily="34" charset="0"/>
               <a:buChar char="•"/>
             </a:pPr>
-            <a:endParaRPr lang="en-US" sz="1200">
-              <a:latin typeface="Noto Sans" panose="020B0502040504020204" pitchFamily="34" charset="0"/>
-              <a:ea typeface="Noto Sans" panose="020B0502040504020204" pitchFamily="34" charset="0"/>
-              <a:cs typeface="Noto Sans" panose="020B0502040504020204" pitchFamily="34" charset="0"/>
-            </a:endParaRPr>
-          </a:p>
-          <a:p>
-            <a:pPr marL="800100" lvl="1" indent="-342900" algn="just">
-              <a:buFont typeface="Arial" panose="020B0604020202020204" pitchFamily="34" charset="0"/>
-              <a:buChar char="•"/>
-            </a:pPr>
-            <a:endParaRPr lang="en-US" sz="1200">
+            <a:endParaRPr lang="en-US" sz="1200" dirty="0">
+              <a:latin typeface="Noto Sans" panose="020B0502040504020204" pitchFamily="34" charset="0"/>
+              <a:ea typeface="Noto Sans" panose="020B0502040504020204" pitchFamily="34" charset="0"/>
+              <a:cs typeface="Noto Sans" panose="020B0502040504020204" pitchFamily="34" charset="0"/>
+            </a:endParaRPr>
+          </a:p>
+          <a:p>
+            <a:pPr marL="800100" lvl="1" indent="-342900" algn="just">
+              <a:buFont typeface="Arial" panose="020B0604020202020204" pitchFamily="34" charset="0"/>
+              <a:buChar char="•"/>
+            </a:pPr>
+            <a:endParaRPr lang="en-US" sz="1200" dirty="0">
               <a:latin typeface="Noto Sans" panose="020B0502040504020204" pitchFamily="34" charset="0"/>
               <a:ea typeface="Noto Sans" panose="020B0502040504020204" pitchFamily="34" charset="0"/>
               <a:cs typeface="Noto Sans" panose="020B0502040504020204" pitchFamily="34" charset="0"/>
@@ -7328,7 +8102,7 @@
 </p:sld>
 </file>
 
-<file path=ppt/slides/slide7.xml><?xml version="1.0" encoding="utf-8"?>
+<file path=ppt/slides/slide8.xml><?xml version="1.0" encoding="utf-8"?>
 <p:sld xmlns:a="http://schemas.openxmlformats.org/drawingml/2006/main" xmlns:r="http://schemas.openxmlformats.org/officeDocument/2006/relationships" xmlns:p="http://schemas.openxmlformats.org/presentationml/2006/main">
   <p:cSld>
     <p:spTree>
@@ -7375,10 +8149,10 @@
           <a:p>
             <a:pPr marL="342900" indent="-342900">
               <a:buFont typeface="+mj-lt"/>
-              <a:buAutoNum type="arabicParenR" startAt="6"/>
-            </a:pPr>
-            <a:r>
-              <a:rPr lang="en-US" sz="1400">
+              <a:buAutoNum type="arabicParenR" startAt="7"/>
+            </a:pPr>
+            <a:r>
+              <a:rPr lang="en-US" sz="1400" dirty="0">
                 <a:solidFill>
                   <a:schemeClr val="accent1"/>
                 </a:solidFill>
@@ -7392,50 +8166,66 @@
           <a:p>
             <a:pPr marL="342900" indent="-342900">
               <a:buFont typeface="+mj-lt"/>
-              <a:buAutoNum type="arabicParenR" startAt="6"/>
-            </a:pPr>
-            <a:endParaRPr lang="en-US" sz="1200">
-              <a:latin typeface="Noto Sans" panose="020B0502040504020204" pitchFamily="34" charset="0"/>
-              <a:ea typeface="Noto Sans" panose="020B0502040504020204" pitchFamily="34" charset="0"/>
-              <a:cs typeface="Noto Sans" panose="020B0502040504020204" pitchFamily="34" charset="0"/>
-            </a:endParaRPr>
-          </a:p>
-          <a:p>
-            <a:pPr marL="800100" lvl="1" indent="-342900" algn="just">
-              <a:buFont typeface="Arial" panose="020B0604020202020204" pitchFamily="34" charset="0"/>
-              <a:buChar char="•"/>
-            </a:pPr>
-            <a:r>
-              <a:rPr lang="en-US" sz="1200">
+              <a:buAutoNum type="arabicParenR" startAt="7"/>
+            </a:pPr>
+            <a:endParaRPr lang="en-US" sz="1200" dirty="0">
+              <a:latin typeface="Noto Sans" panose="020B0502040504020204" pitchFamily="34" charset="0"/>
+              <a:ea typeface="Noto Sans" panose="020B0502040504020204" pitchFamily="34" charset="0"/>
+              <a:cs typeface="Noto Sans" panose="020B0502040504020204" pitchFamily="34" charset="0"/>
+            </a:endParaRPr>
+          </a:p>
+          <a:p>
+            <a:pPr marL="800100" lvl="1" indent="-342900" algn="just">
+              <a:buFont typeface="Arial" panose="020B0604020202020204" pitchFamily="34" charset="0"/>
+              <a:buChar char="•"/>
+            </a:pPr>
+            <a:r>
+              <a:rPr lang="en-US" sz="1200" dirty="0">
                 <a:latin typeface="Noto Sans" panose="020B0502040504020204" pitchFamily="34" charset="0"/>
                 <a:ea typeface="Noto Sans" panose="020B0502040504020204" pitchFamily="34" charset="0"/>
                 <a:cs typeface="Noto Sans" panose="020B0502040504020204" pitchFamily="34" charset="0"/>
               </a:rPr>
-              <a:t>I have used a config.json, supabase.js file to store my project URL, public key, service role, and port, as it is easier to update a config file rather than the code</a:t>
-            </a:r>
-          </a:p>
-          <a:p>
-            <a:pPr marL="800100" lvl="1" indent="-342900" algn="just">
-              <a:buFont typeface="Arial" panose="020B0604020202020204" pitchFamily="34" charset="0"/>
-              <a:buChar char="•"/>
-            </a:pPr>
-            <a:endParaRPr lang="en-US" sz="1200">
-              <a:latin typeface="Noto Sans" panose="020B0502040504020204" pitchFamily="34" charset="0"/>
-              <a:ea typeface="Noto Sans" panose="020B0502040504020204" pitchFamily="34" charset="0"/>
-              <a:cs typeface="Noto Sans" panose="020B0502040504020204" pitchFamily="34" charset="0"/>
-            </a:endParaRPr>
-          </a:p>
-          <a:p>
-            <a:pPr marL="800100" lvl="1" indent="-342900" algn="just">
-              <a:buFont typeface="Arial" panose="020B0604020202020204" pitchFamily="34" charset="0"/>
-              <a:buChar char="•"/>
-            </a:pPr>
-            <a:r>
-              <a:rPr lang="en-US" sz="1200">
+              <a:t>I have used a </a:t>
+            </a:r>
+            <a:r>
+              <a:rPr lang="en-US" sz="1200" dirty="0" err="1">
                 <a:latin typeface="Noto Sans" panose="020B0502040504020204" pitchFamily="34" charset="0"/>
                 <a:ea typeface="Noto Sans" panose="020B0502040504020204" pitchFamily="34" charset="0"/>
                 <a:cs typeface="Noto Sans" panose="020B0502040504020204" pitchFamily="34" charset="0"/>
               </a:rPr>
+              <a:t>config.json</a:t>
+            </a:r>
+            <a:r>
+              <a:rPr lang="en-US" sz="1200" dirty="0">
+                <a:latin typeface="Noto Sans" panose="020B0502040504020204" pitchFamily="34" charset="0"/>
+                <a:ea typeface="Noto Sans" panose="020B0502040504020204" pitchFamily="34" charset="0"/>
+                <a:cs typeface="Noto Sans" panose="020B0502040504020204" pitchFamily="34" charset="0"/>
+              </a:rPr>
+              <a:t>, supabase.js file to store my project URL, public key, service role, and port, as it is easier to update a config file rather than the code</a:t>
+            </a:r>
+          </a:p>
+          <a:p>
+            <a:pPr marL="800100" lvl="1" indent="-342900" algn="just">
+              <a:buFont typeface="Arial" panose="020B0604020202020204" pitchFamily="34" charset="0"/>
+              <a:buChar char="•"/>
+            </a:pPr>
+            <a:endParaRPr lang="en-US" sz="1200" dirty="0">
+              <a:latin typeface="Noto Sans" panose="020B0502040504020204" pitchFamily="34" charset="0"/>
+              <a:ea typeface="Noto Sans" panose="020B0502040504020204" pitchFamily="34" charset="0"/>
+              <a:cs typeface="Noto Sans" panose="020B0502040504020204" pitchFamily="34" charset="0"/>
+            </a:endParaRPr>
+          </a:p>
+          <a:p>
+            <a:pPr marL="800100" lvl="1" indent="-342900" algn="just">
+              <a:buFont typeface="Arial" panose="020B0604020202020204" pitchFamily="34" charset="0"/>
+              <a:buChar char="•"/>
+            </a:pPr>
+            <a:r>
+              <a:rPr lang="en-US" sz="1200" dirty="0">
+                <a:latin typeface="Noto Sans" panose="020B0502040504020204" pitchFamily="34" charset="0"/>
+                <a:ea typeface="Noto Sans" panose="020B0502040504020204" pitchFamily="34" charset="0"/>
+                <a:cs typeface="Noto Sans" panose="020B0502040504020204" pitchFamily="34" charset="0"/>
+              </a:rPr>
               <a:t>In the directory of the project, run the following commands to edit the config files and paste the project URL, public key, service role, and JWT secret in the "" </a:t>
             </a:r>
           </a:p>
@@ -7444,63 +8234,63 @@
               <a:buFont typeface="Arial" panose="020B0604020202020204" pitchFamily="34" charset="0"/>
               <a:buChar char="•"/>
             </a:pPr>
-            <a:endParaRPr lang="en-US" sz="1200">
-              <a:latin typeface="Noto Sans" panose="020B0502040504020204" pitchFamily="34" charset="0"/>
-              <a:ea typeface="Noto Sans" panose="020B0502040504020204" pitchFamily="34" charset="0"/>
-              <a:cs typeface="Noto Sans" panose="020B0502040504020204" pitchFamily="34" charset="0"/>
-            </a:endParaRPr>
-          </a:p>
-          <a:p>
-            <a:pPr marL="800100" lvl="1" indent="-342900" algn="just">
-              <a:buFont typeface="Arial" panose="020B0604020202020204" pitchFamily="34" charset="0"/>
-              <a:buChar char="•"/>
-            </a:pPr>
-            <a:endParaRPr lang="en-US" sz="1200">
-              <a:latin typeface="Noto Sans" panose="020B0502040504020204" pitchFamily="34" charset="0"/>
-              <a:ea typeface="Noto Sans" panose="020B0502040504020204" pitchFamily="34" charset="0"/>
-              <a:cs typeface="Noto Sans" panose="020B0502040504020204" pitchFamily="34" charset="0"/>
-            </a:endParaRPr>
-          </a:p>
-          <a:p>
-            <a:pPr marL="800100" lvl="1" indent="-342900" algn="just">
-              <a:buFont typeface="Arial" panose="020B0604020202020204" pitchFamily="34" charset="0"/>
-              <a:buChar char="•"/>
-            </a:pPr>
-            <a:endParaRPr lang="en-US" sz="1200">
-              <a:latin typeface="Noto Sans" panose="020B0502040504020204" pitchFamily="34" charset="0"/>
-              <a:ea typeface="Noto Sans" panose="020B0502040504020204" pitchFamily="34" charset="0"/>
-              <a:cs typeface="Noto Sans" panose="020B0502040504020204" pitchFamily="34" charset="0"/>
-            </a:endParaRPr>
-          </a:p>
-          <a:p>
-            <a:pPr marL="800100" lvl="1" indent="-342900" algn="just">
-              <a:buFont typeface="Arial" panose="020B0604020202020204" pitchFamily="34" charset="0"/>
-              <a:buChar char="•"/>
-            </a:pPr>
-            <a:endParaRPr lang="en-US" sz="1200">
-              <a:latin typeface="Noto Sans" panose="020B0502040504020204" pitchFamily="34" charset="0"/>
-              <a:ea typeface="Noto Sans" panose="020B0502040504020204" pitchFamily="34" charset="0"/>
-              <a:cs typeface="Noto Sans" panose="020B0502040504020204" pitchFamily="34" charset="0"/>
-            </a:endParaRPr>
-          </a:p>
-          <a:p>
-            <a:pPr marL="800100" lvl="1" indent="-342900" algn="just">
-              <a:buFont typeface="Arial" panose="020B0604020202020204" pitchFamily="34" charset="0"/>
-              <a:buChar char="•"/>
-            </a:pPr>
-            <a:endParaRPr lang="en-US" sz="1200">
-              <a:latin typeface="Noto Sans" panose="020B0502040504020204" pitchFamily="34" charset="0"/>
-              <a:ea typeface="Noto Sans" panose="020B0502040504020204" pitchFamily="34" charset="0"/>
-              <a:cs typeface="Noto Sans" panose="020B0502040504020204" pitchFamily="34" charset="0"/>
-            </a:endParaRPr>
-          </a:p>
-          <a:p>
-            <a:pPr marL="800100" lvl="1" indent="-342900" algn="just">
-              <a:buFont typeface="Arial" panose="020B0604020202020204" pitchFamily="34" charset="0"/>
-              <a:buChar char="•"/>
-            </a:pPr>
-            <a:r>
-              <a:rPr lang="en-US" sz="1200">
+            <a:endParaRPr lang="en-US" sz="1200" dirty="0">
+              <a:latin typeface="Noto Sans" panose="020B0502040504020204" pitchFamily="34" charset="0"/>
+              <a:ea typeface="Noto Sans" panose="020B0502040504020204" pitchFamily="34" charset="0"/>
+              <a:cs typeface="Noto Sans" panose="020B0502040504020204" pitchFamily="34" charset="0"/>
+            </a:endParaRPr>
+          </a:p>
+          <a:p>
+            <a:pPr marL="800100" lvl="1" indent="-342900" algn="just">
+              <a:buFont typeface="Arial" panose="020B0604020202020204" pitchFamily="34" charset="0"/>
+              <a:buChar char="•"/>
+            </a:pPr>
+            <a:endParaRPr lang="en-US" sz="1200" dirty="0">
+              <a:latin typeface="Noto Sans" panose="020B0502040504020204" pitchFamily="34" charset="0"/>
+              <a:ea typeface="Noto Sans" panose="020B0502040504020204" pitchFamily="34" charset="0"/>
+              <a:cs typeface="Noto Sans" panose="020B0502040504020204" pitchFamily="34" charset="0"/>
+            </a:endParaRPr>
+          </a:p>
+          <a:p>
+            <a:pPr marL="800100" lvl="1" indent="-342900" algn="just">
+              <a:buFont typeface="Arial" panose="020B0604020202020204" pitchFamily="34" charset="0"/>
+              <a:buChar char="•"/>
+            </a:pPr>
+            <a:endParaRPr lang="en-US" sz="1200" dirty="0">
+              <a:latin typeface="Noto Sans" panose="020B0502040504020204" pitchFamily="34" charset="0"/>
+              <a:ea typeface="Noto Sans" panose="020B0502040504020204" pitchFamily="34" charset="0"/>
+              <a:cs typeface="Noto Sans" panose="020B0502040504020204" pitchFamily="34" charset="0"/>
+            </a:endParaRPr>
+          </a:p>
+          <a:p>
+            <a:pPr marL="800100" lvl="1" indent="-342900" algn="just">
+              <a:buFont typeface="Arial" panose="020B0604020202020204" pitchFamily="34" charset="0"/>
+              <a:buChar char="•"/>
+            </a:pPr>
+            <a:endParaRPr lang="en-US" sz="1200" dirty="0">
+              <a:latin typeface="Noto Sans" panose="020B0502040504020204" pitchFamily="34" charset="0"/>
+              <a:ea typeface="Noto Sans" panose="020B0502040504020204" pitchFamily="34" charset="0"/>
+              <a:cs typeface="Noto Sans" panose="020B0502040504020204" pitchFamily="34" charset="0"/>
+            </a:endParaRPr>
+          </a:p>
+          <a:p>
+            <a:pPr marL="800100" lvl="1" indent="-342900" algn="just">
+              <a:buFont typeface="Arial" panose="020B0604020202020204" pitchFamily="34" charset="0"/>
+              <a:buChar char="•"/>
+            </a:pPr>
+            <a:endParaRPr lang="en-US" sz="1200" dirty="0">
+              <a:latin typeface="Noto Sans" panose="020B0502040504020204" pitchFamily="34" charset="0"/>
+              <a:ea typeface="Noto Sans" panose="020B0502040504020204" pitchFamily="34" charset="0"/>
+              <a:cs typeface="Noto Sans" panose="020B0502040504020204" pitchFamily="34" charset="0"/>
+            </a:endParaRPr>
+          </a:p>
+          <a:p>
+            <a:pPr marL="800100" lvl="1" indent="-342900" algn="just">
+              <a:buFont typeface="Arial" panose="020B0604020202020204" pitchFamily="34" charset="0"/>
+              <a:buChar char="•"/>
+            </a:pPr>
+            <a:r>
+              <a:rPr lang="en-US" sz="1200" dirty="0">
                 <a:latin typeface="Noto Sans" panose="020B0502040504020204" pitchFamily="34" charset="0"/>
                 <a:ea typeface="Noto Sans" panose="020B0502040504020204" pitchFamily="34" charset="0"/>
                 <a:cs typeface="Noto Sans" panose="020B0502040504020204" pitchFamily="34" charset="0"/>
@@ -7513,52 +8303,52 @@
               <a:buFont typeface="Arial" panose="020B0604020202020204" pitchFamily="34" charset="0"/>
               <a:buChar char="•"/>
             </a:pPr>
-            <a:endParaRPr lang="en-US" sz="1200">
-              <a:latin typeface="Noto Sans" panose="020B0502040504020204" pitchFamily="34" charset="0"/>
-              <a:ea typeface="Noto Sans" panose="020B0502040504020204" pitchFamily="34" charset="0"/>
-              <a:cs typeface="Noto Sans" panose="020B0502040504020204" pitchFamily="34" charset="0"/>
-            </a:endParaRPr>
-          </a:p>
-          <a:p>
-            <a:pPr marL="800100" lvl="1" indent="-342900" algn="just">
-              <a:buFont typeface="Arial" panose="020B0604020202020204" pitchFamily="34" charset="0"/>
-              <a:buChar char="•"/>
-            </a:pPr>
-            <a:endParaRPr lang="en-US" sz="1200">
-              <a:latin typeface="Noto Sans" panose="020B0502040504020204" pitchFamily="34" charset="0"/>
-              <a:ea typeface="Noto Sans" panose="020B0502040504020204" pitchFamily="34" charset="0"/>
-              <a:cs typeface="Noto Sans" panose="020B0502040504020204" pitchFamily="34" charset="0"/>
-            </a:endParaRPr>
-          </a:p>
-          <a:p>
-            <a:pPr marL="800100" lvl="1" indent="-342900" algn="just">
-              <a:buFont typeface="Arial" panose="020B0604020202020204" pitchFamily="34" charset="0"/>
-              <a:buChar char="•"/>
-            </a:pPr>
-            <a:endParaRPr lang="en-US" sz="1200">
-              <a:latin typeface="Noto Sans" panose="020B0502040504020204" pitchFamily="34" charset="0"/>
-              <a:ea typeface="Noto Sans" panose="020B0502040504020204" pitchFamily="34" charset="0"/>
-              <a:cs typeface="Noto Sans" panose="020B0502040504020204" pitchFamily="34" charset="0"/>
-            </a:endParaRPr>
-          </a:p>
-          <a:p>
-            <a:pPr marL="800100" lvl="1" indent="-342900" algn="just">
-              <a:buFont typeface="Arial" panose="020B0604020202020204" pitchFamily="34" charset="0"/>
-              <a:buChar char="•"/>
-            </a:pPr>
-            <a:endParaRPr lang="en-US" sz="1200">
-              <a:latin typeface="Noto Sans" panose="020B0502040504020204" pitchFamily="34" charset="0"/>
-              <a:ea typeface="Noto Sans" panose="020B0502040504020204" pitchFamily="34" charset="0"/>
-              <a:cs typeface="Noto Sans" panose="020B0502040504020204" pitchFamily="34" charset="0"/>
-            </a:endParaRPr>
-          </a:p>
-          <a:p>
-            <a:pPr marL="800100" lvl="1" indent="-342900" algn="just">
-              <a:buFont typeface="Arial" panose="020B0604020202020204" pitchFamily="34" charset="0"/>
-              <a:buChar char="•"/>
-            </a:pPr>
-            <a:r>
-              <a:rPr lang="en-US" sz="1200">
+            <a:endParaRPr lang="en-US" sz="1200" dirty="0">
+              <a:latin typeface="Noto Sans" panose="020B0502040504020204" pitchFamily="34" charset="0"/>
+              <a:ea typeface="Noto Sans" panose="020B0502040504020204" pitchFamily="34" charset="0"/>
+              <a:cs typeface="Noto Sans" panose="020B0502040504020204" pitchFamily="34" charset="0"/>
+            </a:endParaRPr>
+          </a:p>
+          <a:p>
+            <a:pPr marL="800100" lvl="1" indent="-342900" algn="just">
+              <a:buFont typeface="Arial" panose="020B0604020202020204" pitchFamily="34" charset="0"/>
+              <a:buChar char="•"/>
+            </a:pPr>
+            <a:endParaRPr lang="en-US" sz="1200" dirty="0">
+              <a:latin typeface="Noto Sans" panose="020B0502040504020204" pitchFamily="34" charset="0"/>
+              <a:ea typeface="Noto Sans" panose="020B0502040504020204" pitchFamily="34" charset="0"/>
+              <a:cs typeface="Noto Sans" panose="020B0502040504020204" pitchFamily="34" charset="0"/>
+            </a:endParaRPr>
+          </a:p>
+          <a:p>
+            <a:pPr marL="800100" lvl="1" indent="-342900" algn="just">
+              <a:buFont typeface="Arial" panose="020B0604020202020204" pitchFamily="34" charset="0"/>
+              <a:buChar char="•"/>
+            </a:pPr>
+            <a:endParaRPr lang="en-US" sz="1200" dirty="0">
+              <a:latin typeface="Noto Sans" panose="020B0502040504020204" pitchFamily="34" charset="0"/>
+              <a:ea typeface="Noto Sans" panose="020B0502040504020204" pitchFamily="34" charset="0"/>
+              <a:cs typeface="Noto Sans" panose="020B0502040504020204" pitchFamily="34" charset="0"/>
+            </a:endParaRPr>
+          </a:p>
+          <a:p>
+            <a:pPr marL="800100" lvl="1" indent="-342900" algn="just">
+              <a:buFont typeface="Arial" panose="020B0604020202020204" pitchFamily="34" charset="0"/>
+              <a:buChar char="•"/>
+            </a:pPr>
+            <a:endParaRPr lang="en-US" sz="1200" dirty="0">
+              <a:latin typeface="Noto Sans" panose="020B0502040504020204" pitchFamily="34" charset="0"/>
+              <a:ea typeface="Noto Sans" panose="020B0502040504020204" pitchFamily="34" charset="0"/>
+              <a:cs typeface="Noto Sans" panose="020B0502040504020204" pitchFamily="34" charset="0"/>
+            </a:endParaRPr>
+          </a:p>
+          <a:p>
+            <a:pPr marL="800100" lvl="1" indent="-342900" algn="just">
+              <a:buFont typeface="Arial" panose="020B0604020202020204" pitchFamily="34" charset="0"/>
+              <a:buChar char="•"/>
+            </a:pPr>
+            <a:r>
+              <a:rPr lang="en-US" sz="1200" dirty="0">
                 <a:latin typeface="Noto Sans" panose="020B0502040504020204" pitchFamily="34" charset="0"/>
                 <a:ea typeface="Noto Sans" panose="020B0502040504020204" pitchFamily="34" charset="0"/>
                 <a:cs typeface="Noto Sans" panose="020B0502040504020204" pitchFamily="34" charset="0"/>
@@ -7571,52 +8361,52 @@
               <a:buFont typeface="Arial" panose="020B0604020202020204" pitchFamily="34" charset="0"/>
               <a:buChar char="•"/>
             </a:pPr>
-            <a:endParaRPr lang="en-US" sz="1200">
-              <a:latin typeface="Noto Sans" panose="020B0502040504020204" pitchFamily="34" charset="0"/>
-              <a:ea typeface="Noto Sans" panose="020B0502040504020204" pitchFamily="34" charset="0"/>
-              <a:cs typeface="Noto Sans" panose="020B0502040504020204" pitchFamily="34" charset="0"/>
-            </a:endParaRPr>
-          </a:p>
-          <a:p>
-            <a:pPr marL="800100" lvl="1" indent="-342900" algn="just">
-              <a:buFont typeface="Arial" panose="020B0604020202020204" pitchFamily="34" charset="0"/>
-              <a:buChar char="•"/>
-            </a:pPr>
-            <a:endParaRPr lang="en-US" sz="1200">
-              <a:latin typeface="Noto Sans" panose="020B0502040504020204" pitchFamily="34" charset="0"/>
-              <a:ea typeface="Noto Sans" panose="020B0502040504020204" pitchFamily="34" charset="0"/>
-              <a:cs typeface="Noto Sans" panose="020B0502040504020204" pitchFamily="34" charset="0"/>
-            </a:endParaRPr>
-          </a:p>
-          <a:p>
-            <a:pPr marL="800100" lvl="1" indent="-342900" algn="just">
-              <a:buFont typeface="Arial" panose="020B0604020202020204" pitchFamily="34" charset="0"/>
-              <a:buChar char="•"/>
-            </a:pPr>
-            <a:endParaRPr lang="en-US" sz="1200">
-              <a:latin typeface="Noto Sans" panose="020B0502040504020204" pitchFamily="34" charset="0"/>
-              <a:ea typeface="Noto Sans" panose="020B0502040504020204" pitchFamily="34" charset="0"/>
-              <a:cs typeface="Noto Sans" panose="020B0502040504020204" pitchFamily="34" charset="0"/>
-            </a:endParaRPr>
-          </a:p>
-          <a:p>
-            <a:pPr marL="800100" lvl="1" indent="-342900" algn="just">
-              <a:buFont typeface="Arial" panose="020B0604020202020204" pitchFamily="34" charset="0"/>
-              <a:buChar char="•"/>
-            </a:pPr>
-            <a:endParaRPr lang="en-US" sz="1200">
-              <a:latin typeface="Noto Sans" panose="020B0502040504020204" pitchFamily="34" charset="0"/>
-              <a:ea typeface="Noto Sans" panose="020B0502040504020204" pitchFamily="34" charset="0"/>
-              <a:cs typeface="Noto Sans" panose="020B0502040504020204" pitchFamily="34" charset="0"/>
-            </a:endParaRPr>
-          </a:p>
-          <a:p>
-            <a:pPr marL="800100" lvl="1" indent="-342900" algn="just">
-              <a:buFont typeface="Arial" panose="020B0604020202020204" pitchFamily="34" charset="0"/>
-              <a:buChar char="•"/>
-            </a:pPr>
-            <a:r>
-              <a:rPr lang="en-US" sz="1200">
+            <a:endParaRPr lang="en-US" sz="1200" dirty="0">
+              <a:latin typeface="Noto Sans" panose="020B0502040504020204" pitchFamily="34" charset="0"/>
+              <a:ea typeface="Noto Sans" panose="020B0502040504020204" pitchFamily="34" charset="0"/>
+              <a:cs typeface="Noto Sans" panose="020B0502040504020204" pitchFamily="34" charset="0"/>
+            </a:endParaRPr>
+          </a:p>
+          <a:p>
+            <a:pPr marL="800100" lvl="1" indent="-342900" algn="just">
+              <a:buFont typeface="Arial" panose="020B0604020202020204" pitchFamily="34" charset="0"/>
+              <a:buChar char="•"/>
+            </a:pPr>
+            <a:endParaRPr lang="en-US" sz="1200" dirty="0">
+              <a:latin typeface="Noto Sans" panose="020B0502040504020204" pitchFamily="34" charset="0"/>
+              <a:ea typeface="Noto Sans" panose="020B0502040504020204" pitchFamily="34" charset="0"/>
+              <a:cs typeface="Noto Sans" panose="020B0502040504020204" pitchFamily="34" charset="0"/>
+            </a:endParaRPr>
+          </a:p>
+          <a:p>
+            <a:pPr marL="800100" lvl="1" indent="-342900" algn="just">
+              <a:buFont typeface="Arial" panose="020B0604020202020204" pitchFamily="34" charset="0"/>
+              <a:buChar char="•"/>
+            </a:pPr>
+            <a:endParaRPr lang="en-US" sz="1200" dirty="0">
+              <a:latin typeface="Noto Sans" panose="020B0502040504020204" pitchFamily="34" charset="0"/>
+              <a:ea typeface="Noto Sans" panose="020B0502040504020204" pitchFamily="34" charset="0"/>
+              <a:cs typeface="Noto Sans" panose="020B0502040504020204" pitchFamily="34" charset="0"/>
+            </a:endParaRPr>
+          </a:p>
+          <a:p>
+            <a:pPr marL="800100" lvl="1" indent="-342900" algn="just">
+              <a:buFont typeface="Arial" panose="020B0604020202020204" pitchFamily="34" charset="0"/>
+              <a:buChar char="•"/>
+            </a:pPr>
+            <a:endParaRPr lang="en-US" sz="1200" dirty="0">
+              <a:latin typeface="Noto Sans" panose="020B0502040504020204" pitchFamily="34" charset="0"/>
+              <a:ea typeface="Noto Sans" panose="020B0502040504020204" pitchFamily="34" charset="0"/>
+              <a:cs typeface="Noto Sans" panose="020B0502040504020204" pitchFamily="34" charset="0"/>
+            </a:endParaRPr>
+          </a:p>
+          <a:p>
+            <a:pPr marL="800100" lvl="1" indent="-342900" algn="just">
+              <a:buFont typeface="Arial" panose="020B0604020202020204" pitchFamily="34" charset="0"/>
+              <a:buChar char="•"/>
+            </a:pPr>
+            <a:r>
+              <a:rPr lang="en-US" sz="1200" dirty="0">
                 <a:latin typeface="Noto Sans" panose="020B0502040504020204" pitchFamily="34" charset="0"/>
                 <a:ea typeface="Noto Sans" panose="020B0502040504020204" pitchFamily="34" charset="0"/>
                 <a:cs typeface="Noto Sans" panose="020B0502040504020204" pitchFamily="34" charset="0"/>
@@ -7629,41 +8419,41 @@
               <a:buFont typeface="Arial" panose="020B0604020202020204" pitchFamily="34" charset="0"/>
               <a:buChar char="•"/>
             </a:pPr>
-            <a:endParaRPr lang="en-US" sz="1200">
-              <a:latin typeface="Noto Sans" panose="020B0502040504020204" pitchFamily="34" charset="0"/>
-              <a:ea typeface="Noto Sans" panose="020B0502040504020204" pitchFamily="34" charset="0"/>
-              <a:cs typeface="Noto Sans" panose="020B0502040504020204" pitchFamily="34" charset="0"/>
-            </a:endParaRPr>
-          </a:p>
-          <a:p>
-            <a:pPr marL="800100" lvl="1" indent="-342900" algn="just">
-              <a:buFont typeface="Arial" panose="020B0604020202020204" pitchFamily="34" charset="0"/>
-              <a:buChar char="•"/>
-            </a:pPr>
-            <a:endParaRPr lang="en-US" sz="1200">
-              <a:latin typeface="Noto Sans" panose="020B0502040504020204" pitchFamily="34" charset="0"/>
-              <a:ea typeface="Noto Sans" panose="020B0502040504020204" pitchFamily="34" charset="0"/>
-              <a:cs typeface="Noto Sans" panose="020B0502040504020204" pitchFamily="34" charset="0"/>
-            </a:endParaRPr>
-          </a:p>
-          <a:p>
-            <a:pPr marL="800100" lvl="1" indent="-342900" algn="just">
-              <a:buFont typeface="Arial" panose="020B0604020202020204" pitchFamily="34" charset="0"/>
-              <a:buChar char="•"/>
-            </a:pPr>
-            <a:endParaRPr lang="en-US" sz="1200">
-              <a:latin typeface="Noto Sans" panose="020B0502040504020204" pitchFamily="34" charset="0"/>
-              <a:ea typeface="Noto Sans" panose="020B0502040504020204" pitchFamily="34" charset="0"/>
-              <a:cs typeface="Noto Sans" panose="020B0502040504020204" pitchFamily="34" charset="0"/>
-            </a:endParaRPr>
-          </a:p>
-          <a:p>
-            <a:pPr marL="800100" lvl="1" indent="-342900" algn="just">
-              <a:buFont typeface="Arial" panose="020B0604020202020204" pitchFamily="34" charset="0"/>
-              <a:buChar char="•"/>
-            </a:pPr>
-            <a:r>
-              <a:rPr lang="en-US" sz="1200">
+            <a:endParaRPr lang="en-US" sz="1200" dirty="0">
+              <a:latin typeface="Noto Sans" panose="020B0502040504020204" pitchFamily="34" charset="0"/>
+              <a:ea typeface="Noto Sans" panose="020B0502040504020204" pitchFamily="34" charset="0"/>
+              <a:cs typeface="Noto Sans" panose="020B0502040504020204" pitchFamily="34" charset="0"/>
+            </a:endParaRPr>
+          </a:p>
+          <a:p>
+            <a:pPr marL="800100" lvl="1" indent="-342900" algn="just">
+              <a:buFont typeface="Arial" panose="020B0604020202020204" pitchFamily="34" charset="0"/>
+              <a:buChar char="•"/>
+            </a:pPr>
+            <a:endParaRPr lang="en-US" sz="1200" dirty="0">
+              <a:latin typeface="Noto Sans" panose="020B0502040504020204" pitchFamily="34" charset="0"/>
+              <a:ea typeface="Noto Sans" panose="020B0502040504020204" pitchFamily="34" charset="0"/>
+              <a:cs typeface="Noto Sans" panose="020B0502040504020204" pitchFamily="34" charset="0"/>
+            </a:endParaRPr>
+          </a:p>
+          <a:p>
+            <a:pPr marL="800100" lvl="1" indent="-342900" algn="just">
+              <a:buFont typeface="Arial" panose="020B0604020202020204" pitchFamily="34" charset="0"/>
+              <a:buChar char="•"/>
+            </a:pPr>
+            <a:endParaRPr lang="en-US" sz="1200" dirty="0">
+              <a:latin typeface="Noto Sans" panose="020B0502040504020204" pitchFamily="34" charset="0"/>
+              <a:ea typeface="Noto Sans" panose="020B0502040504020204" pitchFamily="34" charset="0"/>
+              <a:cs typeface="Noto Sans" panose="020B0502040504020204" pitchFamily="34" charset="0"/>
+            </a:endParaRPr>
+          </a:p>
+          <a:p>
+            <a:pPr marL="800100" lvl="1" indent="-342900" algn="just">
+              <a:buFont typeface="Arial" panose="020B0604020202020204" pitchFamily="34" charset="0"/>
+              <a:buChar char="•"/>
+            </a:pPr>
+            <a:r>
+              <a:rPr lang="en-US" sz="1200" dirty="0">
                 <a:latin typeface="Noto Sans" panose="020B0502040504020204" pitchFamily="34" charset="0"/>
                 <a:ea typeface="Noto Sans" panose="020B0502040504020204" pitchFamily="34" charset="0"/>
                 <a:cs typeface="Noto Sans" panose="020B0502040504020204" pitchFamily="34" charset="0"/>

</xml_diff>